<commit_message>
more detailed analysis on gender, age, and BMI
</commit_message>
<xml_diff>
--- a/DataClean.pptx
+++ b/DataClean.pptx
@@ -8,6 +8,7 @@
     <p:sldId id="256" r:id="rId2"/>
     <p:sldId id="257" r:id="rId3"/>
     <p:sldId id="258" r:id="rId4"/>
+    <p:sldId id="259" r:id="rId5"/>
   </p:sldIdLst>
   <p:sldSz cx="12192000" cy="6858000"/>
   <p:notesSz cx="6858000" cy="9144000"/>
@@ -131,7 +132,7 @@
           <p:cNvPr id="2" name="Title 1">
             <a:extLst>
               <a:ext uri="{FF2B5EF4-FFF2-40B4-BE49-F238E27FC236}">
-                <a16:creationId xmlns:a16="http://schemas.microsoft.com/office/drawing/2014/main" id="{5A2FBCD9-46CE-4A1E-A062-ED7837F1C525}"/>
+                <a16:creationId xmlns:a16="http://schemas.microsoft.com/office/drawing/2014/main" xmlns="" id="{5A2FBCD9-46CE-4A1E-A062-ED7837F1C525}"/>
               </a:ext>
             </a:extLst>
           </p:cNvPr>
@@ -168,7 +169,7 @@
           <p:cNvPr id="3" name="Subtitle 2">
             <a:extLst>
               <a:ext uri="{FF2B5EF4-FFF2-40B4-BE49-F238E27FC236}">
-                <a16:creationId xmlns:a16="http://schemas.microsoft.com/office/drawing/2014/main" id="{8DE56C4E-87AA-4F7E-A589-A6AEB91B0215}"/>
+                <a16:creationId xmlns:a16="http://schemas.microsoft.com/office/drawing/2014/main" xmlns="" id="{8DE56C4E-87AA-4F7E-A589-A6AEB91B0215}"/>
               </a:ext>
             </a:extLst>
           </p:cNvPr>
@@ -238,7 +239,7 @@
           <p:cNvPr id="4" name="Date Placeholder 3">
             <a:extLst>
               <a:ext uri="{FF2B5EF4-FFF2-40B4-BE49-F238E27FC236}">
-                <a16:creationId xmlns:a16="http://schemas.microsoft.com/office/drawing/2014/main" id="{A834E252-A189-4C37-888E-FE6332545423}"/>
+                <a16:creationId xmlns:a16="http://schemas.microsoft.com/office/drawing/2014/main" xmlns="" id="{A834E252-A189-4C37-888E-FE6332545423}"/>
               </a:ext>
             </a:extLst>
           </p:cNvPr>
@@ -256,7 +257,8 @@
           <a:p>
             <a:fld id="{A84BBA84-8968-45AA-A313-365A0906B983}" type="datetimeFigureOut">
               <a:rPr lang="en-US" smtClean="0"/>
-              <a:t>8/18/2020</a:t>
+              <a:pPr/>
+              <a:t>8/19/2020</a:t>
             </a:fld>
             <a:endParaRPr lang="en-US"/>
           </a:p>
@@ -267,7 +269,7 @@
           <p:cNvPr id="5" name="Footer Placeholder 4">
             <a:extLst>
               <a:ext uri="{FF2B5EF4-FFF2-40B4-BE49-F238E27FC236}">
-                <a16:creationId xmlns:a16="http://schemas.microsoft.com/office/drawing/2014/main" id="{2ED073CA-2640-4402-8CFD-A707E4063979}"/>
+                <a16:creationId xmlns:a16="http://schemas.microsoft.com/office/drawing/2014/main" xmlns="" id="{2ED073CA-2640-4402-8CFD-A707E4063979}"/>
               </a:ext>
             </a:extLst>
           </p:cNvPr>
@@ -292,7 +294,7 @@
           <p:cNvPr id="6" name="Slide Number Placeholder 5">
             <a:extLst>
               <a:ext uri="{FF2B5EF4-FFF2-40B4-BE49-F238E27FC236}">
-                <a16:creationId xmlns:a16="http://schemas.microsoft.com/office/drawing/2014/main" id="{FCCC8ABB-0937-4FE4-94D5-EE2A1E2F019C}"/>
+                <a16:creationId xmlns:a16="http://schemas.microsoft.com/office/drawing/2014/main" xmlns="" id="{FCCC8ABB-0937-4FE4-94D5-EE2A1E2F019C}"/>
               </a:ext>
             </a:extLst>
           </p:cNvPr>
@@ -310,6 +312,7 @@
           <a:p>
             <a:fld id="{225427EA-E275-401E-8EE6-6294AB62AF0F}" type="slidenum">
               <a:rPr lang="en-US" smtClean="0"/>
+              <a:pPr/>
               <a:t>‹#›</a:t>
             </a:fld>
             <a:endParaRPr lang="en-US"/>
@@ -319,7 +322,7 @@
     </p:spTree>
     <p:extLst>
       <p:ext uri="{BB962C8B-B14F-4D97-AF65-F5344CB8AC3E}">
-        <p14:creationId xmlns:p14="http://schemas.microsoft.com/office/powerpoint/2010/main" val="1140682073"/>
+        <p14:creationId xmlns:p14="http://schemas.microsoft.com/office/powerpoint/2010/main" xmlns="" val="1140682073"/>
       </p:ext>
     </p:extLst>
   </p:cSld>
@@ -351,7 +354,7 @@
           <p:cNvPr id="2" name="Title 1">
             <a:extLst>
               <a:ext uri="{FF2B5EF4-FFF2-40B4-BE49-F238E27FC236}">
-                <a16:creationId xmlns:a16="http://schemas.microsoft.com/office/drawing/2014/main" id="{FDE9945E-9418-4871-9B0A-EE2877166D21}"/>
+                <a16:creationId xmlns:a16="http://schemas.microsoft.com/office/drawing/2014/main" xmlns="" id="{FDE9945E-9418-4871-9B0A-EE2877166D21}"/>
               </a:ext>
             </a:extLst>
           </p:cNvPr>
@@ -379,7 +382,7 @@
           <p:cNvPr id="3" name="Vertical Text Placeholder 2">
             <a:extLst>
               <a:ext uri="{FF2B5EF4-FFF2-40B4-BE49-F238E27FC236}">
-                <a16:creationId xmlns:a16="http://schemas.microsoft.com/office/drawing/2014/main" id="{4D5619E4-0B24-448D-9163-5249A9EA6A3F}"/>
+                <a16:creationId xmlns:a16="http://schemas.microsoft.com/office/drawing/2014/main" xmlns="" id="{4D5619E4-0B24-448D-9163-5249A9EA6A3F}"/>
               </a:ext>
             </a:extLst>
           </p:cNvPr>
@@ -436,7 +439,7 @@
           <p:cNvPr id="4" name="Date Placeholder 3">
             <a:extLst>
               <a:ext uri="{FF2B5EF4-FFF2-40B4-BE49-F238E27FC236}">
-                <a16:creationId xmlns:a16="http://schemas.microsoft.com/office/drawing/2014/main" id="{69476014-69FB-44A8-911C-7E906EB1F92C}"/>
+                <a16:creationId xmlns:a16="http://schemas.microsoft.com/office/drawing/2014/main" xmlns="" id="{69476014-69FB-44A8-911C-7E906EB1F92C}"/>
               </a:ext>
             </a:extLst>
           </p:cNvPr>
@@ -454,7 +457,8 @@
           <a:p>
             <a:fld id="{A84BBA84-8968-45AA-A313-365A0906B983}" type="datetimeFigureOut">
               <a:rPr lang="en-US" smtClean="0"/>
-              <a:t>8/18/2020</a:t>
+              <a:pPr/>
+              <a:t>8/19/2020</a:t>
             </a:fld>
             <a:endParaRPr lang="en-US"/>
           </a:p>
@@ -465,7 +469,7 @@
           <p:cNvPr id="5" name="Footer Placeholder 4">
             <a:extLst>
               <a:ext uri="{FF2B5EF4-FFF2-40B4-BE49-F238E27FC236}">
-                <a16:creationId xmlns:a16="http://schemas.microsoft.com/office/drawing/2014/main" id="{CAD36083-B379-4D93-859B-A314E3FD6A62}"/>
+                <a16:creationId xmlns:a16="http://schemas.microsoft.com/office/drawing/2014/main" xmlns="" id="{CAD36083-B379-4D93-859B-A314E3FD6A62}"/>
               </a:ext>
             </a:extLst>
           </p:cNvPr>
@@ -490,7 +494,7 @@
           <p:cNvPr id="6" name="Slide Number Placeholder 5">
             <a:extLst>
               <a:ext uri="{FF2B5EF4-FFF2-40B4-BE49-F238E27FC236}">
-                <a16:creationId xmlns:a16="http://schemas.microsoft.com/office/drawing/2014/main" id="{C8EE3A88-D710-44AE-90A1-E9DC05874C02}"/>
+                <a16:creationId xmlns:a16="http://schemas.microsoft.com/office/drawing/2014/main" xmlns="" id="{C8EE3A88-D710-44AE-90A1-E9DC05874C02}"/>
               </a:ext>
             </a:extLst>
           </p:cNvPr>
@@ -508,6 +512,7 @@
           <a:p>
             <a:fld id="{225427EA-E275-401E-8EE6-6294AB62AF0F}" type="slidenum">
               <a:rPr lang="en-US" smtClean="0"/>
+              <a:pPr/>
               <a:t>‹#›</a:t>
             </a:fld>
             <a:endParaRPr lang="en-US"/>
@@ -517,7 +522,7 @@
     </p:spTree>
     <p:extLst>
       <p:ext uri="{BB962C8B-B14F-4D97-AF65-F5344CB8AC3E}">
-        <p14:creationId xmlns:p14="http://schemas.microsoft.com/office/powerpoint/2010/main" val="1704559994"/>
+        <p14:creationId xmlns:p14="http://schemas.microsoft.com/office/powerpoint/2010/main" xmlns="" val="1704559994"/>
       </p:ext>
     </p:extLst>
   </p:cSld>
@@ -549,7 +554,7 @@
           <p:cNvPr id="2" name="Vertical Title 1">
             <a:extLst>
               <a:ext uri="{FF2B5EF4-FFF2-40B4-BE49-F238E27FC236}">
-                <a16:creationId xmlns:a16="http://schemas.microsoft.com/office/drawing/2014/main" id="{B23CEE0C-4F29-471A-A596-147F8D19308B}"/>
+                <a16:creationId xmlns:a16="http://schemas.microsoft.com/office/drawing/2014/main" xmlns="" id="{B23CEE0C-4F29-471A-A596-147F8D19308B}"/>
               </a:ext>
             </a:extLst>
           </p:cNvPr>
@@ -582,7 +587,7 @@
           <p:cNvPr id="3" name="Vertical Text Placeholder 2">
             <a:extLst>
               <a:ext uri="{FF2B5EF4-FFF2-40B4-BE49-F238E27FC236}">
-                <a16:creationId xmlns:a16="http://schemas.microsoft.com/office/drawing/2014/main" id="{8EBA662F-4513-4DE6-A81B-C97A1E00C353}"/>
+                <a16:creationId xmlns:a16="http://schemas.microsoft.com/office/drawing/2014/main" xmlns="" id="{8EBA662F-4513-4DE6-A81B-C97A1E00C353}"/>
               </a:ext>
             </a:extLst>
           </p:cNvPr>
@@ -644,7 +649,7 @@
           <p:cNvPr id="4" name="Date Placeholder 3">
             <a:extLst>
               <a:ext uri="{FF2B5EF4-FFF2-40B4-BE49-F238E27FC236}">
-                <a16:creationId xmlns:a16="http://schemas.microsoft.com/office/drawing/2014/main" id="{7F2B2ACE-630A-4DE3-9718-28307E0A7DBE}"/>
+                <a16:creationId xmlns:a16="http://schemas.microsoft.com/office/drawing/2014/main" xmlns="" id="{7F2B2ACE-630A-4DE3-9718-28307E0A7DBE}"/>
               </a:ext>
             </a:extLst>
           </p:cNvPr>
@@ -662,7 +667,8 @@
           <a:p>
             <a:fld id="{A84BBA84-8968-45AA-A313-365A0906B983}" type="datetimeFigureOut">
               <a:rPr lang="en-US" smtClean="0"/>
-              <a:t>8/18/2020</a:t>
+              <a:pPr/>
+              <a:t>8/19/2020</a:t>
             </a:fld>
             <a:endParaRPr lang="en-US"/>
           </a:p>
@@ -673,7 +679,7 @@
           <p:cNvPr id="5" name="Footer Placeholder 4">
             <a:extLst>
               <a:ext uri="{FF2B5EF4-FFF2-40B4-BE49-F238E27FC236}">
-                <a16:creationId xmlns:a16="http://schemas.microsoft.com/office/drawing/2014/main" id="{EE41BC99-2CEC-4DBB-906A-7CCCBC980F63}"/>
+                <a16:creationId xmlns:a16="http://schemas.microsoft.com/office/drawing/2014/main" xmlns="" id="{EE41BC99-2CEC-4DBB-906A-7CCCBC980F63}"/>
               </a:ext>
             </a:extLst>
           </p:cNvPr>
@@ -698,7 +704,7 @@
           <p:cNvPr id="6" name="Slide Number Placeholder 5">
             <a:extLst>
               <a:ext uri="{FF2B5EF4-FFF2-40B4-BE49-F238E27FC236}">
-                <a16:creationId xmlns:a16="http://schemas.microsoft.com/office/drawing/2014/main" id="{B4A90082-A214-4A05-BE78-124EFB6C2AC2}"/>
+                <a16:creationId xmlns:a16="http://schemas.microsoft.com/office/drawing/2014/main" xmlns="" id="{B4A90082-A214-4A05-BE78-124EFB6C2AC2}"/>
               </a:ext>
             </a:extLst>
           </p:cNvPr>
@@ -716,6 +722,7 @@
           <a:p>
             <a:fld id="{225427EA-E275-401E-8EE6-6294AB62AF0F}" type="slidenum">
               <a:rPr lang="en-US" smtClean="0"/>
+              <a:pPr/>
               <a:t>‹#›</a:t>
             </a:fld>
             <a:endParaRPr lang="en-US"/>
@@ -725,7 +732,7 @@
     </p:spTree>
     <p:extLst>
       <p:ext uri="{BB962C8B-B14F-4D97-AF65-F5344CB8AC3E}">
-        <p14:creationId xmlns:p14="http://schemas.microsoft.com/office/powerpoint/2010/main" val="3692220874"/>
+        <p14:creationId xmlns:p14="http://schemas.microsoft.com/office/powerpoint/2010/main" xmlns="" val="3692220874"/>
       </p:ext>
     </p:extLst>
   </p:cSld>
@@ -757,7 +764,7 @@
           <p:cNvPr id="2" name="Title 1">
             <a:extLst>
               <a:ext uri="{FF2B5EF4-FFF2-40B4-BE49-F238E27FC236}">
-                <a16:creationId xmlns:a16="http://schemas.microsoft.com/office/drawing/2014/main" id="{0A237CCD-70A4-4FD7-BB5D-574EECE34A10}"/>
+                <a16:creationId xmlns:a16="http://schemas.microsoft.com/office/drawing/2014/main" xmlns="" id="{0A237CCD-70A4-4FD7-BB5D-574EECE34A10}"/>
               </a:ext>
             </a:extLst>
           </p:cNvPr>
@@ -785,7 +792,7 @@
           <p:cNvPr id="3" name="Content Placeholder 2">
             <a:extLst>
               <a:ext uri="{FF2B5EF4-FFF2-40B4-BE49-F238E27FC236}">
-                <a16:creationId xmlns:a16="http://schemas.microsoft.com/office/drawing/2014/main" id="{C5CAF556-18BA-45E2-BC54-040897CAF3F5}"/>
+                <a16:creationId xmlns:a16="http://schemas.microsoft.com/office/drawing/2014/main" xmlns="" id="{C5CAF556-18BA-45E2-BC54-040897CAF3F5}"/>
               </a:ext>
             </a:extLst>
           </p:cNvPr>
@@ -842,7 +849,7 @@
           <p:cNvPr id="4" name="Date Placeholder 3">
             <a:extLst>
               <a:ext uri="{FF2B5EF4-FFF2-40B4-BE49-F238E27FC236}">
-                <a16:creationId xmlns:a16="http://schemas.microsoft.com/office/drawing/2014/main" id="{ACBEFC2A-1B69-4BCA-972C-181C7ADC863F}"/>
+                <a16:creationId xmlns:a16="http://schemas.microsoft.com/office/drawing/2014/main" xmlns="" id="{ACBEFC2A-1B69-4BCA-972C-181C7ADC863F}"/>
               </a:ext>
             </a:extLst>
           </p:cNvPr>
@@ -860,7 +867,8 @@
           <a:p>
             <a:fld id="{A84BBA84-8968-45AA-A313-365A0906B983}" type="datetimeFigureOut">
               <a:rPr lang="en-US" smtClean="0"/>
-              <a:t>8/18/2020</a:t>
+              <a:pPr/>
+              <a:t>8/19/2020</a:t>
             </a:fld>
             <a:endParaRPr lang="en-US"/>
           </a:p>
@@ -871,7 +879,7 @@
           <p:cNvPr id="5" name="Footer Placeholder 4">
             <a:extLst>
               <a:ext uri="{FF2B5EF4-FFF2-40B4-BE49-F238E27FC236}">
-                <a16:creationId xmlns:a16="http://schemas.microsoft.com/office/drawing/2014/main" id="{47DB737D-4934-4518-8160-E76A9762073F}"/>
+                <a16:creationId xmlns:a16="http://schemas.microsoft.com/office/drawing/2014/main" xmlns="" id="{47DB737D-4934-4518-8160-E76A9762073F}"/>
               </a:ext>
             </a:extLst>
           </p:cNvPr>
@@ -896,7 +904,7 @@
           <p:cNvPr id="6" name="Slide Number Placeholder 5">
             <a:extLst>
               <a:ext uri="{FF2B5EF4-FFF2-40B4-BE49-F238E27FC236}">
-                <a16:creationId xmlns:a16="http://schemas.microsoft.com/office/drawing/2014/main" id="{69CFE2F7-C5DE-4376-A0A7-A4A4B7E583A4}"/>
+                <a16:creationId xmlns:a16="http://schemas.microsoft.com/office/drawing/2014/main" xmlns="" id="{69CFE2F7-C5DE-4376-A0A7-A4A4B7E583A4}"/>
               </a:ext>
             </a:extLst>
           </p:cNvPr>
@@ -914,6 +922,7 @@
           <a:p>
             <a:fld id="{225427EA-E275-401E-8EE6-6294AB62AF0F}" type="slidenum">
               <a:rPr lang="en-US" smtClean="0"/>
+              <a:pPr/>
               <a:t>‹#›</a:t>
             </a:fld>
             <a:endParaRPr lang="en-US"/>
@@ -923,7 +932,7 @@
     </p:spTree>
     <p:extLst>
       <p:ext uri="{BB962C8B-B14F-4D97-AF65-F5344CB8AC3E}">
-        <p14:creationId xmlns:p14="http://schemas.microsoft.com/office/powerpoint/2010/main" val="3965573333"/>
+        <p14:creationId xmlns:p14="http://schemas.microsoft.com/office/powerpoint/2010/main" xmlns="" val="3965573333"/>
       </p:ext>
     </p:extLst>
   </p:cSld>
@@ -955,7 +964,7 @@
           <p:cNvPr id="2" name="Title 1">
             <a:extLst>
               <a:ext uri="{FF2B5EF4-FFF2-40B4-BE49-F238E27FC236}">
-                <a16:creationId xmlns:a16="http://schemas.microsoft.com/office/drawing/2014/main" id="{9D344DEB-AFAC-4A97-9179-894A3B52A6DB}"/>
+                <a16:creationId xmlns:a16="http://schemas.microsoft.com/office/drawing/2014/main" xmlns="" id="{9D344DEB-AFAC-4A97-9179-894A3B52A6DB}"/>
               </a:ext>
             </a:extLst>
           </p:cNvPr>
@@ -992,7 +1001,7 @@
           <p:cNvPr id="3" name="Text Placeholder 2">
             <a:extLst>
               <a:ext uri="{FF2B5EF4-FFF2-40B4-BE49-F238E27FC236}">
-                <a16:creationId xmlns:a16="http://schemas.microsoft.com/office/drawing/2014/main" id="{4B8614A0-9E53-4E88-B2C8-C26CD08F443F}"/>
+                <a16:creationId xmlns:a16="http://schemas.microsoft.com/office/drawing/2014/main" xmlns="" id="{4B8614A0-9E53-4E88-B2C8-C26CD08F443F}"/>
               </a:ext>
             </a:extLst>
           </p:cNvPr>
@@ -1117,7 +1126,7 @@
           <p:cNvPr id="4" name="Date Placeholder 3">
             <a:extLst>
               <a:ext uri="{FF2B5EF4-FFF2-40B4-BE49-F238E27FC236}">
-                <a16:creationId xmlns:a16="http://schemas.microsoft.com/office/drawing/2014/main" id="{0AC6F37C-907A-457C-8D7F-943CABBB78E8}"/>
+                <a16:creationId xmlns:a16="http://schemas.microsoft.com/office/drawing/2014/main" xmlns="" id="{0AC6F37C-907A-457C-8D7F-943CABBB78E8}"/>
               </a:ext>
             </a:extLst>
           </p:cNvPr>
@@ -1135,7 +1144,8 @@
           <a:p>
             <a:fld id="{A84BBA84-8968-45AA-A313-365A0906B983}" type="datetimeFigureOut">
               <a:rPr lang="en-US" smtClean="0"/>
-              <a:t>8/18/2020</a:t>
+              <a:pPr/>
+              <a:t>8/19/2020</a:t>
             </a:fld>
             <a:endParaRPr lang="en-US"/>
           </a:p>
@@ -1146,7 +1156,7 @@
           <p:cNvPr id="5" name="Footer Placeholder 4">
             <a:extLst>
               <a:ext uri="{FF2B5EF4-FFF2-40B4-BE49-F238E27FC236}">
-                <a16:creationId xmlns:a16="http://schemas.microsoft.com/office/drawing/2014/main" id="{9783BEBE-67B2-4C3D-AC50-EB7697AA5771}"/>
+                <a16:creationId xmlns:a16="http://schemas.microsoft.com/office/drawing/2014/main" xmlns="" id="{9783BEBE-67B2-4C3D-AC50-EB7697AA5771}"/>
               </a:ext>
             </a:extLst>
           </p:cNvPr>
@@ -1171,7 +1181,7 @@
           <p:cNvPr id="6" name="Slide Number Placeholder 5">
             <a:extLst>
               <a:ext uri="{FF2B5EF4-FFF2-40B4-BE49-F238E27FC236}">
-                <a16:creationId xmlns:a16="http://schemas.microsoft.com/office/drawing/2014/main" id="{2C1C006D-D0DA-4BC7-A364-9542A229E852}"/>
+                <a16:creationId xmlns:a16="http://schemas.microsoft.com/office/drawing/2014/main" xmlns="" id="{2C1C006D-D0DA-4BC7-A364-9542A229E852}"/>
               </a:ext>
             </a:extLst>
           </p:cNvPr>
@@ -1189,6 +1199,7 @@
           <a:p>
             <a:fld id="{225427EA-E275-401E-8EE6-6294AB62AF0F}" type="slidenum">
               <a:rPr lang="en-US" smtClean="0"/>
+              <a:pPr/>
               <a:t>‹#›</a:t>
             </a:fld>
             <a:endParaRPr lang="en-US"/>
@@ -1198,7 +1209,7 @@
     </p:spTree>
     <p:extLst>
       <p:ext uri="{BB962C8B-B14F-4D97-AF65-F5344CB8AC3E}">
-        <p14:creationId xmlns:p14="http://schemas.microsoft.com/office/powerpoint/2010/main" val="192735273"/>
+        <p14:creationId xmlns:p14="http://schemas.microsoft.com/office/powerpoint/2010/main" xmlns="" val="192735273"/>
       </p:ext>
     </p:extLst>
   </p:cSld>
@@ -1230,7 +1241,7 @@
           <p:cNvPr id="2" name="Title 1">
             <a:extLst>
               <a:ext uri="{FF2B5EF4-FFF2-40B4-BE49-F238E27FC236}">
-                <a16:creationId xmlns:a16="http://schemas.microsoft.com/office/drawing/2014/main" id="{912E5EFD-E63A-420A-94BC-F51D7A4E9A6E}"/>
+                <a16:creationId xmlns:a16="http://schemas.microsoft.com/office/drawing/2014/main" xmlns="" id="{912E5EFD-E63A-420A-94BC-F51D7A4E9A6E}"/>
               </a:ext>
             </a:extLst>
           </p:cNvPr>
@@ -1258,7 +1269,7 @@
           <p:cNvPr id="3" name="Content Placeholder 2">
             <a:extLst>
               <a:ext uri="{FF2B5EF4-FFF2-40B4-BE49-F238E27FC236}">
-                <a16:creationId xmlns:a16="http://schemas.microsoft.com/office/drawing/2014/main" id="{FA9CD570-A823-4217-B2A4-D603BEC50095}"/>
+                <a16:creationId xmlns:a16="http://schemas.microsoft.com/office/drawing/2014/main" xmlns="" id="{FA9CD570-A823-4217-B2A4-D603BEC50095}"/>
               </a:ext>
             </a:extLst>
           </p:cNvPr>
@@ -1320,7 +1331,7 @@
           <p:cNvPr id="4" name="Content Placeholder 3">
             <a:extLst>
               <a:ext uri="{FF2B5EF4-FFF2-40B4-BE49-F238E27FC236}">
-                <a16:creationId xmlns:a16="http://schemas.microsoft.com/office/drawing/2014/main" id="{64520B0D-0C4F-41D5-A51A-B74A9C11FC8B}"/>
+                <a16:creationId xmlns:a16="http://schemas.microsoft.com/office/drawing/2014/main" xmlns="" id="{64520B0D-0C4F-41D5-A51A-B74A9C11FC8B}"/>
               </a:ext>
             </a:extLst>
           </p:cNvPr>
@@ -1382,7 +1393,7 @@
           <p:cNvPr id="5" name="Date Placeholder 4">
             <a:extLst>
               <a:ext uri="{FF2B5EF4-FFF2-40B4-BE49-F238E27FC236}">
-                <a16:creationId xmlns:a16="http://schemas.microsoft.com/office/drawing/2014/main" id="{8FC617D0-F9FA-46A9-A3BA-B731CB922B5B}"/>
+                <a16:creationId xmlns:a16="http://schemas.microsoft.com/office/drawing/2014/main" xmlns="" id="{8FC617D0-F9FA-46A9-A3BA-B731CB922B5B}"/>
               </a:ext>
             </a:extLst>
           </p:cNvPr>
@@ -1400,7 +1411,8 @@
           <a:p>
             <a:fld id="{A84BBA84-8968-45AA-A313-365A0906B983}" type="datetimeFigureOut">
               <a:rPr lang="en-US" smtClean="0"/>
-              <a:t>8/18/2020</a:t>
+              <a:pPr/>
+              <a:t>8/19/2020</a:t>
             </a:fld>
             <a:endParaRPr lang="en-US"/>
           </a:p>
@@ -1411,7 +1423,7 @@
           <p:cNvPr id="6" name="Footer Placeholder 5">
             <a:extLst>
               <a:ext uri="{FF2B5EF4-FFF2-40B4-BE49-F238E27FC236}">
-                <a16:creationId xmlns:a16="http://schemas.microsoft.com/office/drawing/2014/main" id="{5C11E06D-C874-4D48-8032-D878582A1D4E}"/>
+                <a16:creationId xmlns:a16="http://schemas.microsoft.com/office/drawing/2014/main" xmlns="" id="{5C11E06D-C874-4D48-8032-D878582A1D4E}"/>
               </a:ext>
             </a:extLst>
           </p:cNvPr>
@@ -1436,7 +1448,7 @@
           <p:cNvPr id="7" name="Slide Number Placeholder 6">
             <a:extLst>
               <a:ext uri="{FF2B5EF4-FFF2-40B4-BE49-F238E27FC236}">
-                <a16:creationId xmlns:a16="http://schemas.microsoft.com/office/drawing/2014/main" id="{083DB44E-3D44-4BBA-948C-4AA94933130B}"/>
+                <a16:creationId xmlns:a16="http://schemas.microsoft.com/office/drawing/2014/main" xmlns="" id="{083DB44E-3D44-4BBA-948C-4AA94933130B}"/>
               </a:ext>
             </a:extLst>
           </p:cNvPr>
@@ -1454,6 +1466,7 @@
           <a:p>
             <a:fld id="{225427EA-E275-401E-8EE6-6294AB62AF0F}" type="slidenum">
               <a:rPr lang="en-US" smtClean="0"/>
+              <a:pPr/>
               <a:t>‹#›</a:t>
             </a:fld>
             <a:endParaRPr lang="en-US"/>
@@ -1463,7 +1476,7 @@
     </p:spTree>
     <p:extLst>
       <p:ext uri="{BB962C8B-B14F-4D97-AF65-F5344CB8AC3E}">
-        <p14:creationId xmlns:p14="http://schemas.microsoft.com/office/powerpoint/2010/main" val="3387072206"/>
+        <p14:creationId xmlns:p14="http://schemas.microsoft.com/office/powerpoint/2010/main" xmlns="" val="3387072206"/>
       </p:ext>
     </p:extLst>
   </p:cSld>
@@ -1495,7 +1508,7 @@
           <p:cNvPr id="2" name="Title 1">
             <a:extLst>
               <a:ext uri="{FF2B5EF4-FFF2-40B4-BE49-F238E27FC236}">
-                <a16:creationId xmlns:a16="http://schemas.microsoft.com/office/drawing/2014/main" id="{D23DC820-7F7E-450F-A69D-3018B2F9FAFE}"/>
+                <a16:creationId xmlns:a16="http://schemas.microsoft.com/office/drawing/2014/main" xmlns="" id="{D23DC820-7F7E-450F-A69D-3018B2F9FAFE}"/>
               </a:ext>
             </a:extLst>
           </p:cNvPr>
@@ -1528,7 +1541,7 @@
           <p:cNvPr id="3" name="Text Placeholder 2">
             <a:extLst>
               <a:ext uri="{FF2B5EF4-FFF2-40B4-BE49-F238E27FC236}">
-                <a16:creationId xmlns:a16="http://schemas.microsoft.com/office/drawing/2014/main" id="{9D6427FD-AE22-4E6E-B7E3-6AE0D26FF7DD}"/>
+                <a16:creationId xmlns:a16="http://schemas.microsoft.com/office/drawing/2014/main" xmlns="" id="{9D6427FD-AE22-4E6E-B7E3-6AE0D26FF7DD}"/>
               </a:ext>
             </a:extLst>
           </p:cNvPr>
@@ -1599,7 +1612,7 @@
           <p:cNvPr id="4" name="Content Placeholder 3">
             <a:extLst>
               <a:ext uri="{FF2B5EF4-FFF2-40B4-BE49-F238E27FC236}">
-                <a16:creationId xmlns:a16="http://schemas.microsoft.com/office/drawing/2014/main" id="{12844B46-2F53-473C-B218-55B4A9E922FE}"/>
+                <a16:creationId xmlns:a16="http://schemas.microsoft.com/office/drawing/2014/main" xmlns="" id="{12844B46-2F53-473C-B218-55B4A9E922FE}"/>
               </a:ext>
             </a:extLst>
           </p:cNvPr>
@@ -1661,7 +1674,7 @@
           <p:cNvPr id="5" name="Text Placeholder 4">
             <a:extLst>
               <a:ext uri="{FF2B5EF4-FFF2-40B4-BE49-F238E27FC236}">
-                <a16:creationId xmlns:a16="http://schemas.microsoft.com/office/drawing/2014/main" id="{A1684A79-753D-4843-9070-5B4217EB7D87}"/>
+                <a16:creationId xmlns:a16="http://schemas.microsoft.com/office/drawing/2014/main" xmlns="" id="{A1684A79-753D-4843-9070-5B4217EB7D87}"/>
               </a:ext>
             </a:extLst>
           </p:cNvPr>
@@ -1732,7 +1745,7 @@
           <p:cNvPr id="6" name="Content Placeholder 5">
             <a:extLst>
               <a:ext uri="{FF2B5EF4-FFF2-40B4-BE49-F238E27FC236}">
-                <a16:creationId xmlns:a16="http://schemas.microsoft.com/office/drawing/2014/main" id="{5909271A-21FB-46B9-95E9-7639015BAB93}"/>
+                <a16:creationId xmlns:a16="http://schemas.microsoft.com/office/drawing/2014/main" xmlns="" id="{5909271A-21FB-46B9-95E9-7639015BAB93}"/>
               </a:ext>
             </a:extLst>
           </p:cNvPr>
@@ -1794,7 +1807,7 @@
           <p:cNvPr id="7" name="Date Placeholder 6">
             <a:extLst>
               <a:ext uri="{FF2B5EF4-FFF2-40B4-BE49-F238E27FC236}">
-                <a16:creationId xmlns:a16="http://schemas.microsoft.com/office/drawing/2014/main" id="{91E0EB70-D288-4C92-A2BD-2A62FF8A5996}"/>
+                <a16:creationId xmlns:a16="http://schemas.microsoft.com/office/drawing/2014/main" xmlns="" id="{91E0EB70-D288-4C92-A2BD-2A62FF8A5996}"/>
               </a:ext>
             </a:extLst>
           </p:cNvPr>
@@ -1812,7 +1825,8 @@
           <a:p>
             <a:fld id="{A84BBA84-8968-45AA-A313-365A0906B983}" type="datetimeFigureOut">
               <a:rPr lang="en-US" smtClean="0"/>
-              <a:t>8/18/2020</a:t>
+              <a:pPr/>
+              <a:t>8/19/2020</a:t>
             </a:fld>
             <a:endParaRPr lang="en-US"/>
           </a:p>
@@ -1823,7 +1837,7 @@
           <p:cNvPr id="8" name="Footer Placeholder 7">
             <a:extLst>
               <a:ext uri="{FF2B5EF4-FFF2-40B4-BE49-F238E27FC236}">
-                <a16:creationId xmlns:a16="http://schemas.microsoft.com/office/drawing/2014/main" id="{04D5A95B-C464-4223-B361-8D6C6BCA2413}"/>
+                <a16:creationId xmlns:a16="http://schemas.microsoft.com/office/drawing/2014/main" xmlns="" id="{04D5A95B-C464-4223-B361-8D6C6BCA2413}"/>
               </a:ext>
             </a:extLst>
           </p:cNvPr>
@@ -1848,7 +1862,7 @@
           <p:cNvPr id="9" name="Slide Number Placeholder 8">
             <a:extLst>
               <a:ext uri="{FF2B5EF4-FFF2-40B4-BE49-F238E27FC236}">
-                <a16:creationId xmlns:a16="http://schemas.microsoft.com/office/drawing/2014/main" id="{8654711D-0C39-4DF6-9F40-303010A0888A}"/>
+                <a16:creationId xmlns:a16="http://schemas.microsoft.com/office/drawing/2014/main" xmlns="" id="{8654711D-0C39-4DF6-9F40-303010A0888A}"/>
               </a:ext>
             </a:extLst>
           </p:cNvPr>
@@ -1866,6 +1880,7 @@
           <a:p>
             <a:fld id="{225427EA-E275-401E-8EE6-6294AB62AF0F}" type="slidenum">
               <a:rPr lang="en-US" smtClean="0"/>
+              <a:pPr/>
               <a:t>‹#›</a:t>
             </a:fld>
             <a:endParaRPr lang="en-US"/>
@@ -1875,7 +1890,7 @@
     </p:spTree>
     <p:extLst>
       <p:ext uri="{BB962C8B-B14F-4D97-AF65-F5344CB8AC3E}">
-        <p14:creationId xmlns:p14="http://schemas.microsoft.com/office/powerpoint/2010/main" val="4212819130"/>
+        <p14:creationId xmlns:p14="http://schemas.microsoft.com/office/powerpoint/2010/main" xmlns="" val="4212819130"/>
       </p:ext>
     </p:extLst>
   </p:cSld>
@@ -1907,7 +1922,7 @@
           <p:cNvPr id="2" name="Title 1">
             <a:extLst>
               <a:ext uri="{FF2B5EF4-FFF2-40B4-BE49-F238E27FC236}">
-                <a16:creationId xmlns:a16="http://schemas.microsoft.com/office/drawing/2014/main" id="{F391C774-8FF3-46CB-8D76-136030A24A64}"/>
+                <a16:creationId xmlns:a16="http://schemas.microsoft.com/office/drawing/2014/main" xmlns="" id="{F391C774-8FF3-46CB-8D76-136030A24A64}"/>
               </a:ext>
             </a:extLst>
           </p:cNvPr>
@@ -1935,7 +1950,7 @@
           <p:cNvPr id="3" name="Date Placeholder 2">
             <a:extLst>
               <a:ext uri="{FF2B5EF4-FFF2-40B4-BE49-F238E27FC236}">
-                <a16:creationId xmlns:a16="http://schemas.microsoft.com/office/drawing/2014/main" id="{CDAD0960-6549-4450-B1E8-C70677E89C67}"/>
+                <a16:creationId xmlns:a16="http://schemas.microsoft.com/office/drawing/2014/main" xmlns="" id="{CDAD0960-6549-4450-B1E8-C70677E89C67}"/>
               </a:ext>
             </a:extLst>
           </p:cNvPr>
@@ -1953,7 +1968,8 @@
           <a:p>
             <a:fld id="{A84BBA84-8968-45AA-A313-365A0906B983}" type="datetimeFigureOut">
               <a:rPr lang="en-US" smtClean="0"/>
-              <a:t>8/18/2020</a:t>
+              <a:pPr/>
+              <a:t>8/19/2020</a:t>
             </a:fld>
             <a:endParaRPr lang="en-US"/>
           </a:p>
@@ -1964,7 +1980,7 @@
           <p:cNvPr id="4" name="Footer Placeholder 3">
             <a:extLst>
               <a:ext uri="{FF2B5EF4-FFF2-40B4-BE49-F238E27FC236}">
-                <a16:creationId xmlns:a16="http://schemas.microsoft.com/office/drawing/2014/main" id="{5F42E338-C77C-4D73-B2D4-9DFB0B06EBFF}"/>
+                <a16:creationId xmlns:a16="http://schemas.microsoft.com/office/drawing/2014/main" xmlns="" id="{5F42E338-C77C-4D73-B2D4-9DFB0B06EBFF}"/>
               </a:ext>
             </a:extLst>
           </p:cNvPr>
@@ -1989,7 +2005,7 @@
           <p:cNvPr id="5" name="Slide Number Placeholder 4">
             <a:extLst>
               <a:ext uri="{FF2B5EF4-FFF2-40B4-BE49-F238E27FC236}">
-                <a16:creationId xmlns:a16="http://schemas.microsoft.com/office/drawing/2014/main" id="{B3772123-F29D-48E7-B5DC-C7DA5DE10BB7}"/>
+                <a16:creationId xmlns:a16="http://schemas.microsoft.com/office/drawing/2014/main" xmlns="" id="{B3772123-F29D-48E7-B5DC-C7DA5DE10BB7}"/>
               </a:ext>
             </a:extLst>
           </p:cNvPr>
@@ -2007,6 +2023,7 @@
           <a:p>
             <a:fld id="{225427EA-E275-401E-8EE6-6294AB62AF0F}" type="slidenum">
               <a:rPr lang="en-US" smtClean="0"/>
+              <a:pPr/>
               <a:t>‹#›</a:t>
             </a:fld>
             <a:endParaRPr lang="en-US"/>
@@ -2016,7 +2033,7 @@
     </p:spTree>
     <p:extLst>
       <p:ext uri="{BB962C8B-B14F-4D97-AF65-F5344CB8AC3E}">
-        <p14:creationId xmlns:p14="http://schemas.microsoft.com/office/powerpoint/2010/main" val="1966136104"/>
+        <p14:creationId xmlns:p14="http://schemas.microsoft.com/office/powerpoint/2010/main" xmlns="" val="1966136104"/>
       </p:ext>
     </p:extLst>
   </p:cSld>
@@ -2048,7 +2065,7 @@
           <p:cNvPr id="2" name="Date Placeholder 1">
             <a:extLst>
               <a:ext uri="{FF2B5EF4-FFF2-40B4-BE49-F238E27FC236}">
-                <a16:creationId xmlns:a16="http://schemas.microsoft.com/office/drawing/2014/main" id="{E2394FE1-93E7-47DB-BA64-3BB12F6FF8C4}"/>
+                <a16:creationId xmlns:a16="http://schemas.microsoft.com/office/drawing/2014/main" xmlns="" id="{E2394FE1-93E7-47DB-BA64-3BB12F6FF8C4}"/>
               </a:ext>
             </a:extLst>
           </p:cNvPr>
@@ -2066,7 +2083,8 @@
           <a:p>
             <a:fld id="{A84BBA84-8968-45AA-A313-365A0906B983}" type="datetimeFigureOut">
               <a:rPr lang="en-US" smtClean="0"/>
-              <a:t>8/18/2020</a:t>
+              <a:pPr/>
+              <a:t>8/19/2020</a:t>
             </a:fld>
             <a:endParaRPr lang="en-US"/>
           </a:p>
@@ -2077,7 +2095,7 @@
           <p:cNvPr id="3" name="Footer Placeholder 2">
             <a:extLst>
               <a:ext uri="{FF2B5EF4-FFF2-40B4-BE49-F238E27FC236}">
-                <a16:creationId xmlns:a16="http://schemas.microsoft.com/office/drawing/2014/main" id="{CEAEDF47-3057-4358-A889-1ACB0485BED3}"/>
+                <a16:creationId xmlns:a16="http://schemas.microsoft.com/office/drawing/2014/main" xmlns="" id="{CEAEDF47-3057-4358-A889-1ACB0485BED3}"/>
               </a:ext>
             </a:extLst>
           </p:cNvPr>
@@ -2102,7 +2120,7 @@
           <p:cNvPr id="4" name="Slide Number Placeholder 3">
             <a:extLst>
               <a:ext uri="{FF2B5EF4-FFF2-40B4-BE49-F238E27FC236}">
-                <a16:creationId xmlns:a16="http://schemas.microsoft.com/office/drawing/2014/main" id="{A9B833C9-2839-447D-9784-4ACB614B4AD5}"/>
+                <a16:creationId xmlns:a16="http://schemas.microsoft.com/office/drawing/2014/main" xmlns="" id="{A9B833C9-2839-447D-9784-4ACB614B4AD5}"/>
               </a:ext>
             </a:extLst>
           </p:cNvPr>
@@ -2120,6 +2138,7 @@
           <a:p>
             <a:fld id="{225427EA-E275-401E-8EE6-6294AB62AF0F}" type="slidenum">
               <a:rPr lang="en-US" smtClean="0"/>
+              <a:pPr/>
               <a:t>‹#›</a:t>
             </a:fld>
             <a:endParaRPr lang="en-US"/>
@@ -2129,7 +2148,7 @@
     </p:spTree>
     <p:extLst>
       <p:ext uri="{BB962C8B-B14F-4D97-AF65-F5344CB8AC3E}">
-        <p14:creationId xmlns:p14="http://schemas.microsoft.com/office/powerpoint/2010/main" val="2567972609"/>
+        <p14:creationId xmlns:p14="http://schemas.microsoft.com/office/powerpoint/2010/main" xmlns="" val="2567972609"/>
       </p:ext>
     </p:extLst>
   </p:cSld>
@@ -2161,7 +2180,7 @@
           <p:cNvPr id="2" name="Title 1">
             <a:extLst>
               <a:ext uri="{FF2B5EF4-FFF2-40B4-BE49-F238E27FC236}">
-                <a16:creationId xmlns:a16="http://schemas.microsoft.com/office/drawing/2014/main" id="{82782AD8-80E1-4370-B512-6447A2971FA6}"/>
+                <a16:creationId xmlns:a16="http://schemas.microsoft.com/office/drawing/2014/main" xmlns="" id="{82782AD8-80E1-4370-B512-6447A2971FA6}"/>
               </a:ext>
             </a:extLst>
           </p:cNvPr>
@@ -2198,7 +2217,7 @@
           <p:cNvPr id="3" name="Content Placeholder 2">
             <a:extLst>
               <a:ext uri="{FF2B5EF4-FFF2-40B4-BE49-F238E27FC236}">
-                <a16:creationId xmlns:a16="http://schemas.microsoft.com/office/drawing/2014/main" id="{DED47C82-9FAC-4952-8702-E83372186B1B}"/>
+                <a16:creationId xmlns:a16="http://schemas.microsoft.com/office/drawing/2014/main" xmlns="" id="{DED47C82-9FAC-4952-8702-E83372186B1B}"/>
               </a:ext>
             </a:extLst>
           </p:cNvPr>
@@ -2288,7 +2307,7 @@
           <p:cNvPr id="4" name="Text Placeholder 3">
             <a:extLst>
               <a:ext uri="{FF2B5EF4-FFF2-40B4-BE49-F238E27FC236}">
-                <a16:creationId xmlns:a16="http://schemas.microsoft.com/office/drawing/2014/main" id="{7B8CD5E5-4A7D-45AB-AAFB-A29CDC64F4C0}"/>
+                <a16:creationId xmlns:a16="http://schemas.microsoft.com/office/drawing/2014/main" xmlns="" id="{7B8CD5E5-4A7D-45AB-AAFB-A29CDC64F4C0}"/>
               </a:ext>
             </a:extLst>
           </p:cNvPr>
@@ -2359,7 +2378,7 @@
           <p:cNvPr id="5" name="Date Placeholder 4">
             <a:extLst>
               <a:ext uri="{FF2B5EF4-FFF2-40B4-BE49-F238E27FC236}">
-                <a16:creationId xmlns:a16="http://schemas.microsoft.com/office/drawing/2014/main" id="{7ED281A6-3BD3-4226-B9A6-EE4448B5EBE4}"/>
+                <a16:creationId xmlns:a16="http://schemas.microsoft.com/office/drawing/2014/main" xmlns="" id="{7ED281A6-3BD3-4226-B9A6-EE4448B5EBE4}"/>
               </a:ext>
             </a:extLst>
           </p:cNvPr>
@@ -2377,7 +2396,8 @@
           <a:p>
             <a:fld id="{A84BBA84-8968-45AA-A313-365A0906B983}" type="datetimeFigureOut">
               <a:rPr lang="en-US" smtClean="0"/>
-              <a:t>8/18/2020</a:t>
+              <a:pPr/>
+              <a:t>8/19/2020</a:t>
             </a:fld>
             <a:endParaRPr lang="en-US"/>
           </a:p>
@@ -2388,7 +2408,7 @@
           <p:cNvPr id="6" name="Footer Placeholder 5">
             <a:extLst>
               <a:ext uri="{FF2B5EF4-FFF2-40B4-BE49-F238E27FC236}">
-                <a16:creationId xmlns:a16="http://schemas.microsoft.com/office/drawing/2014/main" id="{2188E19C-1785-4E00-8B16-8788691D89F7}"/>
+                <a16:creationId xmlns:a16="http://schemas.microsoft.com/office/drawing/2014/main" xmlns="" id="{2188E19C-1785-4E00-8B16-8788691D89F7}"/>
               </a:ext>
             </a:extLst>
           </p:cNvPr>
@@ -2413,7 +2433,7 @@
           <p:cNvPr id="7" name="Slide Number Placeholder 6">
             <a:extLst>
               <a:ext uri="{FF2B5EF4-FFF2-40B4-BE49-F238E27FC236}">
-                <a16:creationId xmlns:a16="http://schemas.microsoft.com/office/drawing/2014/main" id="{BA1A4871-0240-46DB-A59C-3AACCF8C4A2E}"/>
+                <a16:creationId xmlns:a16="http://schemas.microsoft.com/office/drawing/2014/main" xmlns="" id="{BA1A4871-0240-46DB-A59C-3AACCF8C4A2E}"/>
               </a:ext>
             </a:extLst>
           </p:cNvPr>
@@ -2431,6 +2451,7 @@
           <a:p>
             <a:fld id="{225427EA-E275-401E-8EE6-6294AB62AF0F}" type="slidenum">
               <a:rPr lang="en-US" smtClean="0"/>
+              <a:pPr/>
               <a:t>‹#›</a:t>
             </a:fld>
             <a:endParaRPr lang="en-US"/>
@@ -2440,7 +2461,7 @@
     </p:spTree>
     <p:extLst>
       <p:ext uri="{BB962C8B-B14F-4D97-AF65-F5344CB8AC3E}">
-        <p14:creationId xmlns:p14="http://schemas.microsoft.com/office/powerpoint/2010/main" val="713821137"/>
+        <p14:creationId xmlns:p14="http://schemas.microsoft.com/office/powerpoint/2010/main" xmlns="" val="713821137"/>
       </p:ext>
     </p:extLst>
   </p:cSld>
@@ -2472,7 +2493,7 @@
           <p:cNvPr id="2" name="Title 1">
             <a:extLst>
               <a:ext uri="{FF2B5EF4-FFF2-40B4-BE49-F238E27FC236}">
-                <a16:creationId xmlns:a16="http://schemas.microsoft.com/office/drawing/2014/main" id="{857821D8-6B03-40FB-BD5B-1538B5C5F495}"/>
+                <a16:creationId xmlns:a16="http://schemas.microsoft.com/office/drawing/2014/main" xmlns="" id="{857821D8-6B03-40FB-BD5B-1538B5C5F495}"/>
               </a:ext>
             </a:extLst>
           </p:cNvPr>
@@ -2509,7 +2530,7 @@
           <p:cNvPr id="3" name="Picture Placeholder 2">
             <a:extLst>
               <a:ext uri="{FF2B5EF4-FFF2-40B4-BE49-F238E27FC236}">
-                <a16:creationId xmlns:a16="http://schemas.microsoft.com/office/drawing/2014/main" id="{F9CD0DEF-0ECE-4162-A607-9F2D4DD5709E}"/>
+                <a16:creationId xmlns:a16="http://schemas.microsoft.com/office/drawing/2014/main" xmlns="" id="{F9CD0DEF-0ECE-4162-A607-9F2D4DD5709E}"/>
               </a:ext>
             </a:extLst>
           </p:cNvPr>
@@ -2576,7 +2597,7 @@
           <p:cNvPr id="4" name="Text Placeholder 3">
             <a:extLst>
               <a:ext uri="{FF2B5EF4-FFF2-40B4-BE49-F238E27FC236}">
-                <a16:creationId xmlns:a16="http://schemas.microsoft.com/office/drawing/2014/main" id="{5E44282F-C820-4F35-8D40-D59DAF03FF3E}"/>
+                <a16:creationId xmlns:a16="http://schemas.microsoft.com/office/drawing/2014/main" xmlns="" id="{5E44282F-C820-4F35-8D40-D59DAF03FF3E}"/>
               </a:ext>
             </a:extLst>
           </p:cNvPr>
@@ -2647,7 +2668,7 @@
           <p:cNvPr id="5" name="Date Placeholder 4">
             <a:extLst>
               <a:ext uri="{FF2B5EF4-FFF2-40B4-BE49-F238E27FC236}">
-                <a16:creationId xmlns:a16="http://schemas.microsoft.com/office/drawing/2014/main" id="{7B753E33-C360-49F9-845E-C92BDA4CEF49}"/>
+                <a16:creationId xmlns:a16="http://schemas.microsoft.com/office/drawing/2014/main" xmlns="" id="{7B753E33-C360-49F9-845E-C92BDA4CEF49}"/>
               </a:ext>
             </a:extLst>
           </p:cNvPr>
@@ -2665,7 +2686,8 @@
           <a:p>
             <a:fld id="{A84BBA84-8968-45AA-A313-365A0906B983}" type="datetimeFigureOut">
               <a:rPr lang="en-US" smtClean="0"/>
-              <a:t>8/18/2020</a:t>
+              <a:pPr/>
+              <a:t>8/19/2020</a:t>
             </a:fld>
             <a:endParaRPr lang="en-US"/>
           </a:p>
@@ -2676,7 +2698,7 @@
           <p:cNvPr id="6" name="Footer Placeholder 5">
             <a:extLst>
               <a:ext uri="{FF2B5EF4-FFF2-40B4-BE49-F238E27FC236}">
-                <a16:creationId xmlns:a16="http://schemas.microsoft.com/office/drawing/2014/main" id="{3172D3A9-EE08-4EF1-B45F-9B24FE4ACBC1}"/>
+                <a16:creationId xmlns:a16="http://schemas.microsoft.com/office/drawing/2014/main" xmlns="" id="{3172D3A9-EE08-4EF1-B45F-9B24FE4ACBC1}"/>
               </a:ext>
             </a:extLst>
           </p:cNvPr>
@@ -2701,7 +2723,7 @@
           <p:cNvPr id="7" name="Slide Number Placeholder 6">
             <a:extLst>
               <a:ext uri="{FF2B5EF4-FFF2-40B4-BE49-F238E27FC236}">
-                <a16:creationId xmlns:a16="http://schemas.microsoft.com/office/drawing/2014/main" id="{2FD0B004-39D4-45CC-BF5F-8239C652EAA8}"/>
+                <a16:creationId xmlns:a16="http://schemas.microsoft.com/office/drawing/2014/main" xmlns="" id="{2FD0B004-39D4-45CC-BF5F-8239C652EAA8}"/>
               </a:ext>
             </a:extLst>
           </p:cNvPr>
@@ -2719,6 +2741,7 @@
           <a:p>
             <a:fld id="{225427EA-E275-401E-8EE6-6294AB62AF0F}" type="slidenum">
               <a:rPr lang="en-US" smtClean="0"/>
+              <a:pPr/>
               <a:t>‹#›</a:t>
             </a:fld>
             <a:endParaRPr lang="en-US"/>
@@ -2728,7 +2751,7 @@
     </p:spTree>
     <p:extLst>
       <p:ext uri="{BB962C8B-B14F-4D97-AF65-F5344CB8AC3E}">
-        <p14:creationId xmlns:p14="http://schemas.microsoft.com/office/powerpoint/2010/main" val="3904715898"/>
+        <p14:creationId xmlns:p14="http://schemas.microsoft.com/office/powerpoint/2010/main" xmlns="" val="3904715898"/>
       </p:ext>
     </p:extLst>
   </p:cSld>
@@ -2765,7 +2788,7 @@
           <p:cNvPr id="2" name="Title Placeholder 1">
             <a:extLst>
               <a:ext uri="{FF2B5EF4-FFF2-40B4-BE49-F238E27FC236}">
-                <a16:creationId xmlns:a16="http://schemas.microsoft.com/office/drawing/2014/main" id="{FC3F75B9-2CEB-4B11-8B58-978A157EA64A}"/>
+                <a16:creationId xmlns:a16="http://schemas.microsoft.com/office/drawing/2014/main" xmlns="" id="{FC3F75B9-2CEB-4B11-8B58-978A157EA64A}"/>
               </a:ext>
             </a:extLst>
           </p:cNvPr>
@@ -2803,7 +2826,7 @@
           <p:cNvPr id="3" name="Text Placeholder 2">
             <a:extLst>
               <a:ext uri="{FF2B5EF4-FFF2-40B4-BE49-F238E27FC236}">
-                <a16:creationId xmlns:a16="http://schemas.microsoft.com/office/drawing/2014/main" id="{5532F74E-87BF-4D75-9E28-AE4CE3EFED08}"/>
+                <a16:creationId xmlns:a16="http://schemas.microsoft.com/office/drawing/2014/main" xmlns="" id="{5532F74E-87BF-4D75-9E28-AE4CE3EFED08}"/>
               </a:ext>
             </a:extLst>
           </p:cNvPr>
@@ -2870,7 +2893,7 @@
           <p:cNvPr id="4" name="Date Placeholder 3">
             <a:extLst>
               <a:ext uri="{FF2B5EF4-FFF2-40B4-BE49-F238E27FC236}">
-                <a16:creationId xmlns:a16="http://schemas.microsoft.com/office/drawing/2014/main" id="{ED64AC65-7791-4E14-86C5-8A05AECBAEDF}"/>
+                <a16:creationId xmlns:a16="http://schemas.microsoft.com/office/drawing/2014/main" xmlns="" id="{ED64AC65-7791-4E14-86C5-8A05AECBAEDF}"/>
               </a:ext>
             </a:extLst>
           </p:cNvPr>
@@ -2906,7 +2929,8 @@
           <a:p>
             <a:fld id="{A84BBA84-8968-45AA-A313-365A0906B983}" type="datetimeFigureOut">
               <a:rPr lang="en-US" smtClean="0"/>
-              <a:t>8/18/2020</a:t>
+              <a:pPr/>
+              <a:t>8/19/2020</a:t>
             </a:fld>
             <a:endParaRPr lang="en-US"/>
           </a:p>
@@ -2917,7 +2941,7 @@
           <p:cNvPr id="5" name="Footer Placeholder 4">
             <a:extLst>
               <a:ext uri="{FF2B5EF4-FFF2-40B4-BE49-F238E27FC236}">
-                <a16:creationId xmlns:a16="http://schemas.microsoft.com/office/drawing/2014/main" id="{639CCDB6-CABA-455A-B6A1-8EB158E30465}"/>
+                <a16:creationId xmlns:a16="http://schemas.microsoft.com/office/drawing/2014/main" xmlns="" id="{639CCDB6-CABA-455A-B6A1-8EB158E30465}"/>
               </a:ext>
             </a:extLst>
           </p:cNvPr>
@@ -2960,7 +2984,7 @@
           <p:cNvPr id="6" name="Slide Number Placeholder 5">
             <a:extLst>
               <a:ext uri="{FF2B5EF4-FFF2-40B4-BE49-F238E27FC236}">
-                <a16:creationId xmlns:a16="http://schemas.microsoft.com/office/drawing/2014/main" id="{D9EB3522-F593-41BA-8F0E-B255F34AE975}"/>
+                <a16:creationId xmlns:a16="http://schemas.microsoft.com/office/drawing/2014/main" xmlns="" id="{D9EB3522-F593-41BA-8F0E-B255F34AE975}"/>
               </a:ext>
             </a:extLst>
           </p:cNvPr>
@@ -2996,6 +3020,7 @@
           <a:p>
             <a:fld id="{225427EA-E275-401E-8EE6-6294AB62AF0F}" type="slidenum">
               <a:rPr lang="en-US" smtClean="0"/>
+              <a:pPr/>
               <a:t>‹#›</a:t>
             </a:fld>
             <a:endParaRPr lang="en-US"/>
@@ -3005,7 +3030,7 @@
     </p:spTree>
     <p:extLst>
       <p:ext uri="{BB962C8B-B14F-4D97-AF65-F5344CB8AC3E}">
-        <p14:creationId xmlns:p14="http://schemas.microsoft.com/office/powerpoint/2010/main" val="4100062918"/>
+        <p14:creationId xmlns:p14="http://schemas.microsoft.com/office/powerpoint/2010/main" xmlns="" val="4100062918"/>
       </p:ext>
     </p:extLst>
   </p:cSld>
@@ -3328,7 +3353,7 @@
           <p:cNvPr id="25" name="Group 24">
             <a:extLst>
               <a:ext uri="{FF2B5EF4-FFF2-40B4-BE49-F238E27FC236}">
-                <a16:creationId xmlns:a16="http://schemas.microsoft.com/office/drawing/2014/main" id="{66097652-ED98-4EFE-BBBD-15DA1BC42DCF}"/>
+                <a16:creationId xmlns:a16="http://schemas.microsoft.com/office/drawing/2014/main" xmlns="" id="{66097652-ED98-4EFE-BBBD-15DA1BC42DCF}"/>
               </a:ext>
             </a:extLst>
           </p:cNvPr>
@@ -3348,7 +3373,7 @@
             <p:cNvPr id="5" name="TextBox 4">
               <a:extLst>
                 <a:ext uri="{FF2B5EF4-FFF2-40B4-BE49-F238E27FC236}">
-                  <a16:creationId xmlns:a16="http://schemas.microsoft.com/office/drawing/2014/main" id="{56BE065E-1930-4003-886C-371FA26FCEBD}"/>
+                  <a16:creationId xmlns:a16="http://schemas.microsoft.com/office/drawing/2014/main" xmlns="" id="{56BE065E-1930-4003-886C-371FA26FCEBD}"/>
                 </a:ext>
               </a:extLst>
             </p:cNvPr>
@@ -3383,7 +3408,7 @@
             <p:cNvPr id="6" name="Rectangle 5">
               <a:extLst>
                 <a:ext uri="{FF2B5EF4-FFF2-40B4-BE49-F238E27FC236}">
-                  <a16:creationId xmlns:a16="http://schemas.microsoft.com/office/drawing/2014/main" id="{38EDEA2F-D225-4D5B-8066-5BC099D49041}"/>
+                  <a16:creationId xmlns:a16="http://schemas.microsoft.com/office/drawing/2014/main" xmlns="" id="{38EDEA2F-D225-4D5B-8066-5BC099D49041}"/>
                 </a:ext>
               </a:extLst>
             </p:cNvPr>
@@ -3435,7 +3460,7 @@
             <p:cNvPr id="7" name="Rectangle 6">
               <a:extLst>
                 <a:ext uri="{FF2B5EF4-FFF2-40B4-BE49-F238E27FC236}">
-                  <a16:creationId xmlns:a16="http://schemas.microsoft.com/office/drawing/2014/main" id="{122FDAC8-90E9-49BB-ACA2-B3FEFC332B1B}"/>
+                  <a16:creationId xmlns:a16="http://schemas.microsoft.com/office/drawing/2014/main" xmlns="" id="{122FDAC8-90E9-49BB-ACA2-B3FEFC332B1B}"/>
                 </a:ext>
               </a:extLst>
             </p:cNvPr>
@@ -3487,7 +3512,7 @@
             <p:cNvPr id="8" name="Rectangle 7">
               <a:extLst>
                 <a:ext uri="{FF2B5EF4-FFF2-40B4-BE49-F238E27FC236}">
-                  <a16:creationId xmlns:a16="http://schemas.microsoft.com/office/drawing/2014/main" id="{81561EC4-F0CE-47D7-B878-BA89E4BF216C}"/>
+                  <a16:creationId xmlns:a16="http://schemas.microsoft.com/office/drawing/2014/main" xmlns="" id="{81561EC4-F0CE-47D7-B878-BA89E4BF216C}"/>
                 </a:ext>
               </a:extLst>
             </p:cNvPr>
@@ -3539,7 +3564,7 @@
             <p:cNvPr id="10" name="Straight Arrow Connector 9">
               <a:extLst>
                 <a:ext uri="{FF2B5EF4-FFF2-40B4-BE49-F238E27FC236}">
-                  <a16:creationId xmlns:a16="http://schemas.microsoft.com/office/drawing/2014/main" id="{34EB9096-88A6-4FFB-BD80-042573C244EC}"/>
+                  <a16:creationId xmlns:a16="http://schemas.microsoft.com/office/drawing/2014/main" xmlns="" id="{34EB9096-88A6-4FFB-BD80-042573C244EC}"/>
                 </a:ext>
               </a:extLst>
             </p:cNvPr>
@@ -3581,7 +3606,7 @@
             <p:cNvPr id="11" name="TextBox 10">
               <a:extLst>
                 <a:ext uri="{FF2B5EF4-FFF2-40B4-BE49-F238E27FC236}">
-                  <a16:creationId xmlns:a16="http://schemas.microsoft.com/office/drawing/2014/main" id="{0C5AF5B1-B0CA-47B7-95D9-12C65C07BB5A}"/>
+                  <a16:creationId xmlns:a16="http://schemas.microsoft.com/office/drawing/2014/main" xmlns="" id="{0C5AF5B1-B0CA-47B7-95D9-12C65C07BB5A}"/>
                 </a:ext>
               </a:extLst>
             </p:cNvPr>
@@ -3616,7 +3641,7 @@
             <p:cNvPr id="13" name="Straight Arrow Connector 12">
               <a:extLst>
                 <a:ext uri="{FF2B5EF4-FFF2-40B4-BE49-F238E27FC236}">
-                  <a16:creationId xmlns:a16="http://schemas.microsoft.com/office/drawing/2014/main" id="{752650B5-7F90-41F9-B5AF-DE7E58785558}"/>
+                  <a16:creationId xmlns:a16="http://schemas.microsoft.com/office/drawing/2014/main" xmlns="" id="{752650B5-7F90-41F9-B5AF-DE7E58785558}"/>
                 </a:ext>
               </a:extLst>
             </p:cNvPr>
@@ -3661,7 +3686,7 @@
             <p:cNvPr id="16" name="TextBox 15">
               <a:extLst>
                 <a:ext uri="{FF2B5EF4-FFF2-40B4-BE49-F238E27FC236}">
-                  <a16:creationId xmlns:a16="http://schemas.microsoft.com/office/drawing/2014/main" id="{BC99DCF3-B9ED-4D65-A464-ADB0BB4968C9}"/>
+                  <a16:creationId xmlns:a16="http://schemas.microsoft.com/office/drawing/2014/main" xmlns="" id="{BC99DCF3-B9ED-4D65-A464-ADB0BB4968C9}"/>
                 </a:ext>
               </a:extLst>
             </p:cNvPr>
@@ -3696,7 +3721,7 @@
             <p:cNvPr id="20" name="Straight Arrow Connector 19">
               <a:extLst>
                 <a:ext uri="{FF2B5EF4-FFF2-40B4-BE49-F238E27FC236}">
-                  <a16:creationId xmlns:a16="http://schemas.microsoft.com/office/drawing/2014/main" id="{243944A9-C9B5-403B-982D-EEA30627BAF8}"/>
+                  <a16:creationId xmlns:a16="http://schemas.microsoft.com/office/drawing/2014/main" xmlns="" id="{243944A9-C9B5-403B-982D-EEA30627BAF8}"/>
                 </a:ext>
               </a:extLst>
             </p:cNvPr>
@@ -3742,7 +3767,7 @@
             <p:cNvPr id="22" name="TextBox 21">
               <a:extLst>
                 <a:ext uri="{FF2B5EF4-FFF2-40B4-BE49-F238E27FC236}">
-                  <a16:creationId xmlns:a16="http://schemas.microsoft.com/office/drawing/2014/main" id="{6E215ECF-23A0-4C81-AA15-8DD8C88E5285}"/>
+                  <a16:creationId xmlns:a16="http://schemas.microsoft.com/office/drawing/2014/main" xmlns="" id="{6E215ECF-23A0-4C81-AA15-8DD8C88E5285}"/>
                 </a:ext>
               </a:extLst>
             </p:cNvPr>
@@ -3778,7 +3803,7 @@
           <p:cNvPr id="26" name="TextBox 25">
             <a:extLst>
               <a:ext uri="{FF2B5EF4-FFF2-40B4-BE49-F238E27FC236}">
-                <a16:creationId xmlns:a16="http://schemas.microsoft.com/office/drawing/2014/main" id="{723B3EF4-8DCC-47EA-8F22-AAAFA1702B3D}"/>
+                <a16:creationId xmlns:a16="http://schemas.microsoft.com/office/drawing/2014/main" xmlns="" id="{723B3EF4-8DCC-47EA-8F22-AAAFA1702B3D}"/>
               </a:ext>
             </a:extLst>
           </p:cNvPr>
@@ -3824,7 +3849,7 @@
           <p:cNvPr id="28" name="TextBox 27">
             <a:extLst>
               <a:ext uri="{FF2B5EF4-FFF2-40B4-BE49-F238E27FC236}">
-                <a16:creationId xmlns:a16="http://schemas.microsoft.com/office/drawing/2014/main" id="{491713ED-A19D-477E-ACC7-92DFF8685E3E}"/>
+                <a16:creationId xmlns:a16="http://schemas.microsoft.com/office/drawing/2014/main" xmlns="" id="{491713ED-A19D-477E-ACC7-92DFF8685E3E}"/>
               </a:ext>
             </a:extLst>
           </p:cNvPr>
@@ -3859,7 +3884,7 @@
           <p:cNvPr id="30" name="TextBox 29">
             <a:extLst>
               <a:ext uri="{FF2B5EF4-FFF2-40B4-BE49-F238E27FC236}">
-                <a16:creationId xmlns:a16="http://schemas.microsoft.com/office/drawing/2014/main" id="{DFE811AD-A400-468C-B79E-B9243522C210}"/>
+                <a16:creationId xmlns:a16="http://schemas.microsoft.com/office/drawing/2014/main" xmlns="" id="{DFE811AD-A400-468C-B79E-B9243522C210}"/>
               </a:ext>
             </a:extLst>
           </p:cNvPr>
@@ -3894,7 +3919,7 @@
           <p:cNvPr id="31" name="TextBox 30">
             <a:extLst>
               <a:ext uri="{FF2B5EF4-FFF2-40B4-BE49-F238E27FC236}">
-                <a16:creationId xmlns:a16="http://schemas.microsoft.com/office/drawing/2014/main" id="{5F3E1325-2EC6-42BA-81D2-F505ABFB5256}"/>
+                <a16:creationId xmlns:a16="http://schemas.microsoft.com/office/drawing/2014/main" xmlns="" id="{5F3E1325-2EC6-42BA-81D2-F505ABFB5256}"/>
               </a:ext>
             </a:extLst>
           </p:cNvPr>
@@ -3933,7 +3958,7 @@
           <p:cNvPr id="33" name="TextBox 32">
             <a:extLst>
               <a:ext uri="{FF2B5EF4-FFF2-40B4-BE49-F238E27FC236}">
-                <a16:creationId xmlns:a16="http://schemas.microsoft.com/office/drawing/2014/main" id="{8DFBDA76-BC5B-4B5F-8B2D-17DC70C40DD6}"/>
+                <a16:creationId xmlns:a16="http://schemas.microsoft.com/office/drawing/2014/main" xmlns="" id="{8DFBDA76-BC5B-4B5F-8B2D-17DC70C40DD6}"/>
               </a:ext>
             </a:extLst>
           </p:cNvPr>
@@ -3972,7 +3997,7 @@
           <p:cNvPr id="34" name="Table 33">
             <a:extLst>
               <a:ext uri="{FF2B5EF4-FFF2-40B4-BE49-F238E27FC236}">
-                <a16:creationId xmlns:a16="http://schemas.microsoft.com/office/drawing/2014/main" id="{F2374274-9813-459A-86AC-F5EF8290DA04}"/>
+                <a16:creationId xmlns:a16="http://schemas.microsoft.com/office/drawing/2014/main" xmlns="" id="{F2374274-9813-459A-86AC-F5EF8290DA04}"/>
               </a:ext>
             </a:extLst>
           </p:cNvPr>
@@ -3982,7 +4007,7 @@
           <p:nvPr>
             <p:extLst>
               <p:ext uri="{D42A27DB-BD31-4B8C-83A1-F6EECF244321}">
-                <p14:modId xmlns:p14="http://schemas.microsoft.com/office/powerpoint/2010/main" val="269550060"/>
+                <p14:modId xmlns:p14="http://schemas.microsoft.com/office/powerpoint/2010/main" xmlns="" val="269550060"/>
               </p:ext>
             </p:extLst>
           </p:nvPr>
@@ -4001,14 +4026,14 @@
                 <a:gridCol w="1193800">
                   <a:extLst>
                     <a:ext uri="{9D8B030D-6E8A-4147-A177-3AD203B41FA5}">
-                      <a16:colId xmlns:a16="http://schemas.microsoft.com/office/drawing/2014/main" val="809735740"/>
+                      <a16:colId xmlns:a16="http://schemas.microsoft.com/office/drawing/2014/main" xmlns="" val="809735740"/>
                     </a:ext>
                   </a:extLst>
                 </a:gridCol>
                 <a:gridCol w="3200400">
                   <a:extLst>
                     <a:ext uri="{9D8B030D-6E8A-4147-A177-3AD203B41FA5}">
-                      <a16:colId xmlns:a16="http://schemas.microsoft.com/office/drawing/2014/main" val="4239455824"/>
+                      <a16:colId xmlns:a16="http://schemas.microsoft.com/office/drawing/2014/main" xmlns="" val="4239455824"/>
                     </a:ext>
                   </a:extLst>
                 </a:gridCol>
@@ -4062,7 +4087,7 @@
                 </a:tc>
                 <a:extLst>
                   <a:ext uri="{0D108BD9-81ED-4DB2-BD59-A6C34878D82A}">
-                    <a16:rowId xmlns:a16="http://schemas.microsoft.com/office/drawing/2014/main" val="2508049654"/>
+                    <a16:rowId xmlns:a16="http://schemas.microsoft.com/office/drawing/2014/main" xmlns="" val="2508049654"/>
                   </a:ext>
                 </a:extLst>
               </a:tr>
@@ -4115,7 +4140,7 @@
                 </a:tc>
                 <a:extLst>
                   <a:ext uri="{0D108BD9-81ED-4DB2-BD59-A6C34878D82A}">
-                    <a16:rowId xmlns:a16="http://schemas.microsoft.com/office/drawing/2014/main" val="2747170579"/>
+                    <a16:rowId xmlns:a16="http://schemas.microsoft.com/office/drawing/2014/main" xmlns="" val="2747170579"/>
                   </a:ext>
                 </a:extLst>
               </a:tr>
@@ -4168,7 +4193,7 @@
                 </a:tc>
                 <a:extLst>
                   <a:ext uri="{0D108BD9-81ED-4DB2-BD59-A6C34878D82A}">
-                    <a16:rowId xmlns:a16="http://schemas.microsoft.com/office/drawing/2014/main" val="1021497715"/>
+                    <a16:rowId xmlns:a16="http://schemas.microsoft.com/office/drawing/2014/main" xmlns="" val="1021497715"/>
                   </a:ext>
                 </a:extLst>
               </a:tr>
@@ -4221,7 +4246,7 @@
                 </a:tc>
                 <a:extLst>
                   <a:ext uri="{0D108BD9-81ED-4DB2-BD59-A6C34878D82A}">
-                    <a16:rowId xmlns:a16="http://schemas.microsoft.com/office/drawing/2014/main" val="1103180393"/>
+                    <a16:rowId xmlns:a16="http://schemas.microsoft.com/office/drawing/2014/main" xmlns="" val="1103180393"/>
                   </a:ext>
                 </a:extLst>
               </a:tr>
@@ -4274,7 +4299,7 @@
                 </a:tc>
                 <a:extLst>
                   <a:ext uri="{0D108BD9-81ED-4DB2-BD59-A6C34878D82A}">
-                    <a16:rowId xmlns:a16="http://schemas.microsoft.com/office/drawing/2014/main" val="3472329002"/>
+                    <a16:rowId xmlns:a16="http://schemas.microsoft.com/office/drawing/2014/main" xmlns="" val="3472329002"/>
                   </a:ext>
                 </a:extLst>
               </a:tr>
@@ -4327,7 +4352,7 @@
                 </a:tc>
                 <a:extLst>
                   <a:ext uri="{0D108BD9-81ED-4DB2-BD59-A6C34878D82A}">
-                    <a16:rowId xmlns:a16="http://schemas.microsoft.com/office/drawing/2014/main" val="96515116"/>
+                    <a16:rowId xmlns:a16="http://schemas.microsoft.com/office/drawing/2014/main" xmlns="" val="96515116"/>
                   </a:ext>
                 </a:extLst>
               </a:tr>
@@ -4380,7 +4405,7 @@
                 </a:tc>
                 <a:extLst>
                   <a:ext uri="{0D108BD9-81ED-4DB2-BD59-A6C34878D82A}">
-                    <a16:rowId xmlns:a16="http://schemas.microsoft.com/office/drawing/2014/main" val="1375975097"/>
+                    <a16:rowId xmlns:a16="http://schemas.microsoft.com/office/drawing/2014/main" xmlns="" val="1375975097"/>
                   </a:ext>
                 </a:extLst>
               </a:tr>
@@ -4433,7 +4458,7 @@
                 </a:tc>
                 <a:extLst>
                   <a:ext uri="{0D108BD9-81ED-4DB2-BD59-A6C34878D82A}">
-                    <a16:rowId xmlns:a16="http://schemas.microsoft.com/office/drawing/2014/main" val="1362266621"/>
+                    <a16:rowId xmlns:a16="http://schemas.microsoft.com/office/drawing/2014/main" xmlns="" val="1362266621"/>
                   </a:ext>
                 </a:extLst>
               </a:tr>
@@ -4486,7 +4511,7 @@
                 </a:tc>
                 <a:extLst>
                   <a:ext uri="{0D108BD9-81ED-4DB2-BD59-A6C34878D82A}">
-                    <a16:rowId xmlns:a16="http://schemas.microsoft.com/office/drawing/2014/main" val="1070044454"/>
+                    <a16:rowId xmlns:a16="http://schemas.microsoft.com/office/drawing/2014/main" xmlns="" val="1070044454"/>
                   </a:ext>
                 </a:extLst>
               </a:tr>
@@ -4499,7 +4524,7 @@
           <p:cNvPr id="35" name="TextBox 34">
             <a:extLst>
               <a:ext uri="{FF2B5EF4-FFF2-40B4-BE49-F238E27FC236}">
-                <a16:creationId xmlns:a16="http://schemas.microsoft.com/office/drawing/2014/main" id="{D4664896-69BC-4D0E-8797-91BA3A45AD5E}"/>
+                <a16:creationId xmlns:a16="http://schemas.microsoft.com/office/drawing/2014/main" xmlns="" id="{D4664896-69BC-4D0E-8797-91BA3A45AD5E}"/>
               </a:ext>
             </a:extLst>
           </p:cNvPr>
@@ -4546,7 +4571,7 @@
           <p:cNvPr id="36" name="TextBox 35">
             <a:extLst>
               <a:ext uri="{FF2B5EF4-FFF2-40B4-BE49-F238E27FC236}">
-                <a16:creationId xmlns:a16="http://schemas.microsoft.com/office/drawing/2014/main" id="{00C91D45-886D-4770-8385-468C803CD8C1}"/>
+                <a16:creationId xmlns:a16="http://schemas.microsoft.com/office/drawing/2014/main" xmlns="" id="{00C91D45-886D-4770-8385-468C803CD8C1}"/>
               </a:ext>
             </a:extLst>
           </p:cNvPr>
@@ -4579,7 +4604,7 @@
     </p:spTree>
     <p:extLst>
       <p:ext uri="{BB962C8B-B14F-4D97-AF65-F5344CB8AC3E}">
-        <p14:creationId xmlns:p14="http://schemas.microsoft.com/office/powerpoint/2010/main" val="2571629328"/>
+        <p14:creationId xmlns:p14="http://schemas.microsoft.com/office/powerpoint/2010/main" xmlns="" val="2571629328"/>
       </p:ext>
     </p:extLst>
   </p:cSld>
@@ -4611,7 +4636,7 @@
           <p:cNvPr id="4" name="Picture 3">
             <a:extLst>
               <a:ext uri="{FF2B5EF4-FFF2-40B4-BE49-F238E27FC236}">
-                <a16:creationId xmlns:a16="http://schemas.microsoft.com/office/drawing/2014/main" id="{B9AA8C4F-785C-429C-BA93-48E5ECE1CABA}"/>
+                <a16:creationId xmlns:a16="http://schemas.microsoft.com/office/drawing/2014/main" xmlns="" id="{B9AA8C4F-785C-429C-BA93-48E5ECE1CABA}"/>
               </a:ext>
             </a:extLst>
           </p:cNvPr>
@@ -4621,7 +4646,7 @@
           <p:nvPr/>
         </p:nvPicPr>
         <p:blipFill rotWithShape="1">
-          <a:blip r:embed="rId2"/>
+          <a:blip r:embed="rId2" cstate="print"/>
           <a:srcRect l="27857" t="25353" r="31429" b="33136"/>
           <a:stretch/>
         </p:blipFill>
@@ -4640,7 +4665,7 @@
           <p:cNvPr id="5" name="TextBox 4">
             <a:extLst>
               <a:ext uri="{FF2B5EF4-FFF2-40B4-BE49-F238E27FC236}">
-                <a16:creationId xmlns:a16="http://schemas.microsoft.com/office/drawing/2014/main" id="{1A15787A-1F2A-4909-A88F-A58B5F6014EC}"/>
+                <a16:creationId xmlns:a16="http://schemas.microsoft.com/office/drawing/2014/main" xmlns="" id="{1A15787A-1F2A-4909-A88F-A58B5F6014EC}"/>
               </a:ext>
             </a:extLst>
           </p:cNvPr>
@@ -4679,7 +4704,7 @@
           <p:cNvPr id="7" name="Straight Arrow Connector 6">
             <a:extLst>
               <a:ext uri="{FF2B5EF4-FFF2-40B4-BE49-F238E27FC236}">
-                <a16:creationId xmlns:a16="http://schemas.microsoft.com/office/drawing/2014/main" id="{43D82A80-2F98-4204-B58E-EB49BB41D3C5}"/>
+                <a16:creationId xmlns:a16="http://schemas.microsoft.com/office/drawing/2014/main" xmlns="" id="{43D82A80-2F98-4204-B58E-EB49BB41D3C5}"/>
               </a:ext>
             </a:extLst>
           </p:cNvPr>
@@ -4720,7 +4745,7 @@
           <p:cNvPr id="9" name="Straight Arrow Connector 8">
             <a:extLst>
               <a:ext uri="{FF2B5EF4-FFF2-40B4-BE49-F238E27FC236}">
-                <a16:creationId xmlns:a16="http://schemas.microsoft.com/office/drawing/2014/main" id="{2D27D6FE-29A9-420B-AB56-4AE9822D9B55}"/>
+                <a16:creationId xmlns:a16="http://schemas.microsoft.com/office/drawing/2014/main" xmlns="" id="{2D27D6FE-29A9-420B-AB56-4AE9822D9B55}"/>
               </a:ext>
             </a:extLst>
           </p:cNvPr>
@@ -4761,7 +4786,7 @@
           <p:cNvPr id="12" name="Straight Arrow Connector 11">
             <a:extLst>
               <a:ext uri="{FF2B5EF4-FFF2-40B4-BE49-F238E27FC236}">
-                <a16:creationId xmlns:a16="http://schemas.microsoft.com/office/drawing/2014/main" id="{BC5BD572-37D1-4C1B-AFAC-577E02232C90}"/>
+                <a16:creationId xmlns:a16="http://schemas.microsoft.com/office/drawing/2014/main" xmlns="" id="{BC5BD572-37D1-4C1B-AFAC-577E02232C90}"/>
               </a:ext>
             </a:extLst>
           </p:cNvPr>
@@ -4802,7 +4827,7 @@
           <p:cNvPr id="15" name="Straight Arrow Connector 14">
             <a:extLst>
               <a:ext uri="{FF2B5EF4-FFF2-40B4-BE49-F238E27FC236}">
-                <a16:creationId xmlns:a16="http://schemas.microsoft.com/office/drawing/2014/main" id="{9E9E969B-C9EA-43EA-9DFA-42D4CF60D5B3}"/>
+                <a16:creationId xmlns:a16="http://schemas.microsoft.com/office/drawing/2014/main" xmlns="" id="{9E9E969B-C9EA-43EA-9DFA-42D4CF60D5B3}"/>
               </a:ext>
             </a:extLst>
           </p:cNvPr>
@@ -4843,7 +4868,7 @@
           <p:cNvPr id="17" name="Straight Arrow Connector 16">
             <a:extLst>
               <a:ext uri="{FF2B5EF4-FFF2-40B4-BE49-F238E27FC236}">
-                <a16:creationId xmlns:a16="http://schemas.microsoft.com/office/drawing/2014/main" id="{6E88EA07-CCB2-4DE6-87D2-1377A39D4AF2}"/>
+                <a16:creationId xmlns:a16="http://schemas.microsoft.com/office/drawing/2014/main" xmlns="" id="{6E88EA07-CCB2-4DE6-87D2-1377A39D4AF2}"/>
               </a:ext>
             </a:extLst>
           </p:cNvPr>
@@ -4884,7 +4909,7 @@
           <p:cNvPr id="20" name="TextBox 19">
             <a:extLst>
               <a:ext uri="{FF2B5EF4-FFF2-40B4-BE49-F238E27FC236}">
-                <a16:creationId xmlns:a16="http://schemas.microsoft.com/office/drawing/2014/main" id="{978F5201-8D96-42D8-B697-537D5DB0E9E1}"/>
+                <a16:creationId xmlns:a16="http://schemas.microsoft.com/office/drawing/2014/main" xmlns="" id="{978F5201-8D96-42D8-B697-537D5DB0E9E1}"/>
               </a:ext>
             </a:extLst>
           </p:cNvPr>
@@ -4919,7 +4944,7 @@
           <p:cNvPr id="22" name="TextBox 21">
             <a:extLst>
               <a:ext uri="{FF2B5EF4-FFF2-40B4-BE49-F238E27FC236}">
-                <a16:creationId xmlns:a16="http://schemas.microsoft.com/office/drawing/2014/main" id="{6DDCB45D-5958-463D-AD04-EF10AB8F7B63}"/>
+                <a16:creationId xmlns:a16="http://schemas.microsoft.com/office/drawing/2014/main" xmlns="" id="{6DDCB45D-5958-463D-AD04-EF10AB8F7B63}"/>
               </a:ext>
             </a:extLst>
           </p:cNvPr>
@@ -4954,7 +4979,7 @@
           <p:cNvPr id="23" name="TextBox 22">
             <a:extLst>
               <a:ext uri="{FF2B5EF4-FFF2-40B4-BE49-F238E27FC236}">
-                <a16:creationId xmlns:a16="http://schemas.microsoft.com/office/drawing/2014/main" id="{7866F6D7-6BD0-4347-B219-67DECB38B554}"/>
+                <a16:creationId xmlns:a16="http://schemas.microsoft.com/office/drawing/2014/main" xmlns="" id="{7866F6D7-6BD0-4347-B219-67DECB38B554}"/>
               </a:ext>
             </a:extLst>
           </p:cNvPr>
@@ -4991,7 +5016,7 @@
     </p:spTree>
     <p:extLst>
       <p:ext uri="{BB962C8B-B14F-4D97-AF65-F5344CB8AC3E}">
-        <p14:creationId xmlns:p14="http://schemas.microsoft.com/office/powerpoint/2010/main" val="1441441428"/>
+        <p14:creationId xmlns:p14="http://schemas.microsoft.com/office/powerpoint/2010/main" xmlns="" val="1441441428"/>
       </p:ext>
     </p:extLst>
   </p:cSld>
@@ -5023,7 +5048,7 @@
           <p:cNvPr id="2" name="Title 1">
             <a:extLst>
               <a:ext uri="{FF2B5EF4-FFF2-40B4-BE49-F238E27FC236}">
-                <a16:creationId xmlns:a16="http://schemas.microsoft.com/office/drawing/2014/main" id="{B19683D0-1CA8-4529-A2B0-443AAB727B48}"/>
+                <a16:creationId xmlns:a16="http://schemas.microsoft.com/office/drawing/2014/main" xmlns="" id="{B19683D0-1CA8-4529-A2B0-443AAB727B48}"/>
               </a:ext>
             </a:extLst>
           </p:cNvPr>
@@ -5048,7 +5073,7 @@
           <p:cNvPr id="3" name="Content Placeholder 2">
             <a:extLst>
               <a:ext uri="{FF2B5EF4-FFF2-40B4-BE49-F238E27FC236}">
-                <a16:creationId xmlns:a16="http://schemas.microsoft.com/office/drawing/2014/main" id="{842448CD-68D1-4DB4-9330-31425027CFBA}"/>
+                <a16:creationId xmlns:a16="http://schemas.microsoft.com/office/drawing/2014/main" xmlns="" id="{842448CD-68D1-4DB4-9330-31425027CFBA}"/>
               </a:ext>
             </a:extLst>
           </p:cNvPr>
@@ -5073,7 +5098,7 @@
           <p:cNvPr id="4" name="Picture 3">
             <a:extLst>
               <a:ext uri="{FF2B5EF4-FFF2-40B4-BE49-F238E27FC236}">
-                <a16:creationId xmlns:a16="http://schemas.microsoft.com/office/drawing/2014/main" id="{79683984-6DE1-4928-855D-1D83CE4D3FAC}"/>
+                <a16:creationId xmlns:a16="http://schemas.microsoft.com/office/drawing/2014/main" xmlns="" id="{79683984-6DE1-4928-855D-1D83CE4D3FAC}"/>
               </a:ext>
             </a:extLst>
           </p:cNvPr>
@@ -5083,7 +5108,7 @@
           <p:nvPr/>
         </p:nvPicPr>
         <p:blipFill rotWithShape="1">
-          <a:blip r:embed="rId2"/>
+          <a:blip r:embed="rId2" cstate="print"/>
           <a:srcRect l="27229" t="14253" r="27365" b="2595"/>
           <a:stretch/>
         </p:blipFill>
@@ -5102,7 +5127,7 @@
           <p:cNvPr id="6" name="Straight Arrow Connector 5">
             <a:extLst>
               <a:ext uri="{FF2B5EF4-FFF2-40B4-BE49-F238E27FC236}">
-                <a16:creationId xmlns:a16="http://schemas.microsoft.com/office/drawing/2014/main" id="{278A8F1F-567E-4254-A0BE-9F782EE9987E}"/>
+                <a16:creationId xmlns:a16="http://schemas.microsoft.com/office/drawing/2014/main" xmlns="" id="{278A8F1F-567E-4254-A0BE-9F782EE9987E}"/>
               </a:ext>
             </a:extLst>
           </p:cNvPr>
@@ -5144,7 +5169,7 @@
           <p:cNvPr id="7" name="TextBox 6">
             <a:extLst>
               <a:ext uri="{FF2B5EF4-FFF2-40B4-BE49-F238E27FC236}">
-                <a16:creationId xmlns:a16="http://schemas.microsoft.com/office/drawing/2014/main" id="{81239A75-F7B2-4E7B-892E-BBC9D48EF9A1}"/>
+                <a16:creationId xmlns:a16="http://schemas.microsoft.com/office/drawing/2014/main" xmlns="" id="{81239A75-F7B2-4E7B-892E-BBC9D48EF9A1}"/>
               </a:ext>
             </a:extLst>
           </p:cNvPr>
@@ -5177,9 +5202,252 @@
     </p:spTree>
     <p:extLst>
       <p:ext uri="{BB962C8B-B14F-4D97-AF65-F5344CB8AC3E}">
-        <p14:creationId xmlns:p14="http://schemas.microsoft.com/office/powerpoint/2010/main" val="3179478293"/>
+        <p14:creationId xmlns:p14="http://schemas.microsoft.com/office/powerpoint/2010/main" xmlns="" val="3179478293"/>
       </p:ext>
     </p:extLst>
+  </p:cSld>
+  <p:clrMapOvr>
+    <a:masterClrMapping/>
+  </p:clrMapOvr>
+</p:sld>
+</file>
+
+<file path=ppt/slides/slide4.xml><?xml version="1.0" encoding="utf-8"?>
+<p:sld xmlns:a="http://schemas.openxmlformats.org/drawingml/2006/main" xmlns:r="http://schemas.openxmlformats.org/officeDocument/2006/relationships" xmlns:p="http://schemas.openxmlformats.org/presentationml/2006/main">
+  <p:cSld>
+    <p:spTree>
+      <p:nvGrpSpPr>
+        <p:cNvPr id="1" name=""/>
+        <p:cNvGrpSpPr/>
+        <p:nvPr/>
+      </p:nvGrpSpPr>
+      <p:grpSpPr>
+        <a:xfrm>
+          <a:off x="0" y="0"/>
+          <a:ext cx="0" cy="0"/>
+          <a:chOff x="0" y="0"/>
+          <a:chExt cx="0" cy="0"/>
+        </a:xfrm>
+      </p:grpSpPr>
+      <p:pic>
+        <p:nvPicPr>
+          <p:cNvPr id="4" name="图片 3" descr="Townsend.png"/>
+          <p:cNvPicPr>
+            <a:picLocks noChangeAspect="1"/>
+          </p:cNvPicPr>
+          <p:nvPr/>
+        </p:nvPicPr>
+        <p:blipFill>
+          <a:blip r:embed="rId2" cstate="print"/>
+          <a:stretch>
+            <a:fillRect/>
+          </a:stretch>
+        </p:blipFill>
+        <p:spPr>
+          <a:xfrm>
+            <a:off x="3181440" y="1176805"/>
+            <a:ext cx="5852172" cy="4389129"/>
+          </a:xfrm>
+          <a:prstGeom prst="rect">
+            <a:avLst/>
+          </a:prstGeom>
+        </p:spPr>
+      </p:pic>
+      <p:sp>
+        <p:nvSpPr>
+          <p:cNvPr id="5" name="TextBox 4"/>
+          <p:cNvSpPr txBox="1"/>
+          <p:nvPr/>
+        </p:nvSpPr>
+        <p:spPr>
+          <a:xfrm>
+            <a:off x="768403" y="441832"/>
+            <a:ext cx="898003" cy="369332"/>
+          </a:xfrm>
+          <a:prstGeom prst="rect">
+            <a:avLst/>
+          </a:prstGeom>
+          <a:noFill/>
+        </p:spPr>
+        <p:txBody>
+          <a:bodyPr wrap="none" rtlCol="0">
+            <a:spAutoFit/>
+          </a:bodyPr>
+          <a:lstStyle/>
+          <a:p>
+            <a:r>
+              <a:rPr lang="en-US" altLang="zh-CN" dirty="0" smtClean="0"/>
+              <a:t>189-0.0</a:t>
+            </a:r>
+            <a:endParaRPr lang="zh-CN" altLang="en-US" dirty="0"/>
+          </a:p>
+        </p:txBody>
+      </p:sp>
+      <p:cxnSp>
+        <p:nvCxnSpPr>
+          <p:cNvPr id="7" name="直接箭头连接符 6"/>
+          <p:cNvCxnSpPr/>
+          <p:nvPr/>
+        </p:nvCxnSpPr>
+        <p:spPr>
+          <a:xfrm flipH="1">
+            <a:off x="5359614" y="1944061"/>
+            <a:ext cx="641617" cy="234363"/>
+          </a:xfrm>
+          <a:prstGeom prst="straightConnector1">
+            <a:avLst/>
+          </a:prstGeom>
+          <a:ln>
+            <a:tailEnd type="arrow"/>
+          </a:ln>
+        </p:spPr>
+        <p:style>
+          <a:lnRef idx="1">
+            <a:schemeClr val="accent1"/>
+          </a:lnRef>
+          <a:fillRef idx="0">
+            <a:schemeClr val="accent1"/>
+          </a:fillRef>
+          <a:effectRef idx="0">
+            <a:schemeClr val="accent1"/>
+          </a:effectRef>
+          <a:fontRef idx="minor">
+            <a:schemeClr val="tx1"/>
+          </a:fontRef>
+        </p:style>
+      </p:cxnSp>
+      <p:sp>
+        <p:nvSpPr>
+          <p:cNvPr id="8" name="TextBox 7"/>
+          <p:cNvSpPr txBox="1"/>
+          <p:nvPr/>
+        </p:nvSpPr>
+        <p:spPr>
+          <a:xfrm>
+            <a:off x="6012756" y="1782696"/>
+            <a:ext cx="1558375" cy="369332"/>
+          </a:xfrm>
+          <a:prstGeom prst="rect">
+            <a:avLst/>
+          </a:prstGeom>
+          <a:noFill/>
+        </p:spPr>
+        <p:txBody>
+          <a:bodyPr wrap="none" rtlCol="0">
+            <a:spAutoFit/>
+          </a:bodyPr>
+          <a:lstStyle/>
+          <a:p>
+            <a:r>
+              <a:rPr lang="en-US" altLang="zh-CN" dirty="0" err="1" smtClean="0"/>
+              <a:t>Covid</a:t>
+            </a:r>
+            <a:r>
+              <a:rPr lang="en-US" altLang="zh-CN" dirty="0" smtClean="0"/>
+              <a:t> negative</a:t>
+            </a:r>
+            <a:endParaRPr lang="zh-CN" altLang="en-US" dirty="0"/>
+          </a:p>
+        </p:txBody>
+      </p:sp>
+      <p:sp>
+        <p:nvSpPr>
+          <p:cNvPr id="9" name="TextBox 8"/>
+          <p:cNvSpPr txBox="1"/>
+          <p:nvPr/>
+        </p:nvSpPr>
+        <p:spPr>
+          <a:xfrm>
+            <a:off x="6729933" y="3010861"/>
+            <a:ext cx="1494255" cy="369332"/>
+          </a:xfrm>
+          <a:prstGeom prst="rect">
+            <a:avLst/>
+          </a:prstGeom>
+          <a:noFill/>
+        </p:spPr>
+        <p:txBody>
+          <a:bodyPr wrap="none" rtlCol="0">
+            <a:spAutoFit/>
+          </a:bodyPr>
+          <a:lstStyle/>
+          <a:p>
+            <a:r>
+              <a:rPr lang="en-US" altLang="zh-CN" dirty="0" err="1" smtClean="0"/>
+              <a:t>Covid</a:t>
+            </a:r>
+            <a:r>
+              <a:rPr lang="en-US" altLang="zh-CN" dirty="0" smtClean="0"/>
+              <a:t> positive</a:t>
+            </a:r>
+            <a:endParaRPr lang="zh-CN" altLang="en-US" dirty="0"/>
+          </a:p>
+        </p:txBody>
+      </p:sp>
+      <p:cxnSp>
+        <p:nvCxnSpPr>
+          <p:cNvPr id="10" name="直接箭头连接符 9"/>
+          <p:cNvCxnSpPr/>
+          <p:nvPr/>
+        </p:nvCxnSpPr>
+        <p:spPr>
+          <a:xfrm flipH="1">
+            <a:off x="6149789" y="3268276"/>
+            <a:ext cx="641617" cy="234363"/>
+          </a:xfrm>
+          <a:prstGeom prst="straightConnector1">
+            <a:avLst/>
+          </a:prstGeom>
+          <a:ln>
+            <a:tailEnd type="arrow"/>
+          </a:ln>
+        </p:spPr>
+        <p:style>
+          <a:lnRef idx="1">
+            <a:schemeClr val="accent1"/>
+          </a:lnRef>
+          <a:fillRef idx="0">
+            <a:schemeClr val="accent1"/>
+          </a:fillRef>
+          <a:effectRef idx="0">
+            <a:schemeClr val="accent1"/>
+          </a:effectRef>
+          <a:fontRef idx="minor">
+            <a:schemeClr val="tx1"/>
+          </a:fontRef>
+        </p:style>
+      </p:cxnSp>
+      <p:sp>
+        <p:nvSpPr>
+          <p:cNvPr id="11" name="TextBox 10"/>
+          <p:cNvSpPr txBox="1"/>
+          <p:nvPr/>
+        </p:nvSpPr>
+        <p:spPr>
+          <a:xfrm>
+            <a:off x="8590750" y="2854619"/>
+            <a:ext cx="2816156" cy="369332"/>
+          </a:xfrm>
+          <a:prstGeom prst="rect">
+            <a:avLst/>
+          </a:prstGeom>
+          <a:noFill/>
+        </p:spPr>
+        <p:txBody>
+          <a:bodyPr wrap="none" rtlCol="0">
+            <a:spAutoFit/>
+          </a:bodyPr>
+          <a:lstStyle/>
+          <a:p>
+            <a:r>
+              <a:rPr lang="en-US" altLang="zh-CN" dirty="0" smtClean="0"/>
+              <a:t>Is the difference significant?</a:t>
+            </a:r>
+            <a:endParaRPr lang="zh-CN" altLang="en-US" dirty="0"/>
+          </a:p>
+        </p:txBody>
+      </p:sp>
+    </p:spTree>
   </p:cSld>
   <p:clrMapOvr>
     <a:masterClrMapping/>
@@ -5230,7 +5498,7 @@
     </a:clrScheme>
     <a:fontScheme name="Office">
       <a:majorFont>
-        <a:latin typeface="Calibri Light" panose="020F0302020204030204"/>
+        <a:latin typeface="Calibri Light"/>
         <a:ea typeface=""/>
         <a:cs typeface=""/>
         <a:font script="Jpan" typeface="游ゴシック Light"/>
@@ -5282,7 +5550,7 @@
         <a:font script="Tfng" typeface="Ebrima"/>
       </a:majorFont>
       <a:minorFont>
-        <a:latin typeface="Calibri" panose="020F0502020204030204"/>
+        <a:latin typeface="Calibri"/>
         <a:ea typeface=""/>
         <a:cs typeface=""/>
         <a:font script="Jpan" typeface="游ゴシック"/>
@@ -5476,7 +5744,7 @@
   <a:extraClrSchemeLst/>
   <a:extLst>
     <a:ext uri="{05A4C25C-085E-4340-85A3-A5531E510DB2}">
-      <thm15:themeFamily xmlns:thm15="http://schemas.microsoft.com/office/thememl/2012/main" name="Office Theme" id="{62F939B6-93AF-4DB8-9C6B-D6C7DFDC589F}" vid="{4A3C46E8-61CC-4603-A589-7422A47A8E4A}"/>
+      <thm15:themeFamily xmlns:thm15="http://schemas.microsoft.com/office/thememl/2012/main" xmlns="" name="Office Theme" id="{62F939B6-93AF-4DB8-9C6B-D6C7DFDC589F}" vid="{4A3C46E8-61CC-4603-A589-7422A47A8E4A}"/>
     </a:ext>
   </a:extLst>
 </a:theme>

</xml_diff>

<commit_message>
adding PCA for race
</commit_message>
<xml_diff>
--- a/DataClean.pptx
+++ b/DataClean.pptx
@@ -9,6 +9,8 @@
     <p:sldId id="257" r:id="rId3"/>
     <p:sldId id="258" r:id="rId4"/>
     <p:sldId id="259" r:id="rId5"/>
+    <p:sldId id="260" r:id="rId6"/>
+    <p:sldId id="261" r:id="rId7"/>
   </p:sldIdLst>
   <p:sldSz cx="12192000" cy="6858000"/>
   <p:notesSz cx="6858000" cy="9144000"/>
@@ -132,7 +134,7 @@
           <p:cNvPr id="2" name="Title 1">
             <a:extLst>
               <a:ext uri="{FF2B5EF4-FFF2-40B4-BE49-F238E27FC236}">
-                <a16:creationId xmlns:a16="http://schemas.microsoft.com/office/drawing/2014/main" xmlns="" id="{5A2FBCD9-46CE-4A1E-A062-ED7837F1C525}"/>
+                <a16:creationId xmlns="" xmlns:a16="http://schemas.microsoft.com/office/drawing/2014/main" id="{5A2FBCD9-46CE-4A1E-A062-ED7837F1C525}"/>
               </a:ext>
             </a:extLst>
           </p:cNvPr>
@@ -169,7 +171,7 @@
           <p:cNvPr id="3" name="Subtitle 2">
             <a:extLst>
               <a:ext uri="{FF2B5EF4-FFF2-40B4-BE49-F238E27FC236}">
-                <a16:creationId xmlns:a16="http://schemas.microsoft.com/office/drawing/2014/main" xmlns="" id="{8DE56C4E-87AA-4F7E-A589-A6AEB91B0215}"/>
+                <a16:creationId xmlns="" xmlns:a16="http://schemas.microsoft.com/office/drawing/2014/main" id="{8DE56C4E-87AA-4F7E-A589-A6AEB91B0215}"/>
               </a:ext>
             </a:extLst>
           </p:cNvPr>
@@ -239,7 +241,7 @@
           <p:cNvPr id="4" name="Date Placeholder 3">
             <a:extLst>
               <a:ext uri="{FF2B5EF4-FFF2-40B4-BE49-F238E27FC236}">
-                <a16:creationId xmlns:a16="http://schemas.microsoft.com/office/drawing/2014/main" xmlns="" id="{A834E252-A189-4C37-888E-FE6332545423}"/>
+                <a16:creationId xmlns="" xmlns:a16="http://schemas.microsoft.com/office/drawing/2014/main" id="{A834E252-A189-4C37-888E-FE6332545423}"/>
               </a:ext>
             </a:extLst>
           </p:cNvPr>
@@ -258,7 +260,7 @@
             <a:fld id="{A84BBA84-8968-45AA-A313-365A0906B983}" type="datetimeFigureOut">
               <a:rPr lang="en-US" smtClean="0"/>
               <a:pPr/>
-              <a:t>8/19/2020</a:t>
+              <a:t>9/16/2020</a:t>
             </a:fld>
             <a:endParaRPr lang="en-US"/>
           </a:p>
@@ -269,7 +271,7 @@
           <p:cNvPr id="5" name="Footer Placeholder 4">
             <a:extLst>
               <a:ext uri="{FF2B5EF4-FFF2-40B4-BE49-F238E27FC236}">
-                <a16:creationId xmlns:a16="http://schemas.microsoft.com/office/drawing/2014/main" xmlns="" id="{2ED073CA-2640-4402-8CFD-A707E4063979}"/>
+                <a16:creationId xmlns="" xmlns:a16="http://schemas.microsoft.com/office/drawing/2014/main" id="{2ED073CA-2640-4402-8CFD-A707E4063979}"/>
               </a:ext>
             </a:extLst>
           </p:cNvPr>
@@ -294,7 +296,7 @@
           <p:cNvPr id="6" name="Slide Number Placeholder 5">
             <a:extLst>
               <a:ext uri="{FF2B5EF4-FFF2-40B4-BE49-F238E27FC236}">
-                <a16:creationId xmlns:a16="http://schemas.microsoft.com/office/drawing/2014/main" xmlns="" id="{FCCC8ABB-0937-4FE4-94D5-EE2A1E2F019C}"/>
+                <a16:creationId xmlns="" xmlns:a16="http://schemas.microsoft.com/office/drawing/2014/main" id="{FCCC8ABB-0937-4FE4-94D5-EE2A1E2F019C}"/>
               </a:ext>
             </a:extLst>
           </p:cNvPr>
@@ -322,7 +324,7 @@
     </p:spTree>
     <p:extLst>
       <p:ext uri="{BB962C8B-B14F-4D97-AF65-F5344CB8AC3E}">
-        <p14:creationId xmlns:p14="http://schemas.microsoft.com/office/powerpoint/2010/main" xmlns="" val="1140682073"/>
+        <p14:creationId xmlns="" xmlns:p14="http://schemas.microsoft.com/office/powerpoint/2010/main" val="1140682073"/>
       </p:ext>
     </p:extLst>
   </p:cSld>
@@ -354,7 +356,7 @@
           <p:cNvPr id="2" name="Title 1">
             <a:extLst>
               <a:ext uri="{FF2B5EF4-FFF2-40B4-BE49-F238E27FC236}">
-                <a16:creationId xmlns:a16="http://schemas.microsoft.com/office/drawing/2014/main" xmlns="" id="{FDE9945E-9418-4871-9B0A-EE2877166D21}"/>
+                <a16:creationId xmlns="" xmlns:a16="http://schemas.microsoft.com/office/drawing/2014/main" id="{FDE9945E-9418-4871-9B0A-EE2877166D21}"/>
               </a:ext>
             </a:extLst>
           </p:cNvPr>
@@ -382,7 +384,7 @@
           <p:cNvPr id="3" name="Vertical Text Placeholder 2">
             <a:extLst>
               <a:ext uri="{FF2B5EF4-FFF2-40B4-BE49-F238E27FC236}">
-                <a16:creationId xmlns:a16="http://schemas.microsoft.com/office/drawing/2014/main" xmlns="" id="{4D5619E4-0B24-448D-9163-5249A9EA6A3F}"/>
+                <a16:creationId xmlns="" xmlns:a16="http://schemas.microsoft.com/office/drawing/2014/main" id="{4D5619E4-0B24-448D-9163-5249A9EA6A3F}"/>
               </a:ext>
             </a:extLst>
           </p:cNvPr>
@@ -439,7 +441,7 @@
           <p:cNvPr id="4" name="Date Placeholder 3">
             <a:extLst>
               <a:ext uri="{FF2B5EF4-FFF2-40B4-BE49-F238E27FC236}">
-                <a16:creationId xmlns:a16="http://schemas.microsoft.com/office/drawing/2014/main" xmlns="" id="{69476014-69FB-44A8-911C-7E906EB1F92C}"/>
+                <a16:creationId xmlns="" xmlns:a16="http://schemas.microsoft.com/office/drawing/2014/main" id="{69476014-69FB-44A8-911C-7E906EB1F92C}"/>
               </a:ext>
             </a:extLst>
           </p:cNvPr>
@@ -458,7 +460,7 @@
             <a:fld id="{A84BBA84-8968-45AA-A313-365A0906B983}" type="datetimeFigureOut">
               <a:rPr lang="en-US" smtClean="0"/>
               <a:pPr/>
-              <a:t>8/19/2020</a:t>
+              <a:t>9/16/2020</a:t>
             </a:fld>
             <a:endParaRPr lang="en-US"/>
           </a:p>
@@ -469,7 +471,7 @@
           <p:cNvPr id="5" name="Footer Placeholder 4">
             <a:extLst>
               <a:ext uri="{FF2B5EF4-FFF2-40B4-BE49-F238E27FC236}">
-                <a16:creationId xmlns:a16="http://schemas.microsoft.com/office/drawing/2014/main" xmlns="" id="{CAD36083-B379-4D93-859B-A314E3FD6A62}"/>
+                <a16:creationId xmlns="" xmlns:a16="http://schemas.microsoft.com/office/drawing/2014/main" id="{CAD36083-B379-4D93-859B-A314E3FD6A62}"/>
               </a:ext>
             </a:extLst>
           </p:cNvPr>
@@ -494,7 +496,7 @@
           <p:cNvPr id="6" name="Slide Number Placeholder 5">
             <a:extLst>
               <a:ext uri="{FF2B5EF4-FFF2-40B4-BE49-F238E27FC236}">
-                <a16:creationId xmlns:a16="http://schemas.microsoft.com/office/drawing/2014/main" xmlns="" id="{C8EE3A88-D710-44AE-90A1-E9DC05874C02}"/>
+                <a16:creationId xmlns="" xmlns:a16="http://schemas.microsoft.com/office/drawing/2014/main" id="{C8EE3A88-D710-44AE-90A1-E9DC05874C02}"/>
               </a:ext>
             </a:extLst>
           </p:cNvPr>
@@ -522,7 +524,7 @@
     </p:spTree>
     <p:extLst>
       <p:ext uri="{BB962C8B-B14F-4D97-AF65-F5344CB8AC3E}">
-        <p14:creationId xmlns:p14="http://schemas.microsoft.com/office/powerpoint/2010/main" xmlns="" val="1704559994"/>
+        <p14:creationId xmlns="" xmlns:p14="http://schemas.microsoft.com/office/powerpoint/2010/main" val="1704559994"/>
       </p:ext>
     </p:extLst>
   </p:cSld>
@@ -554,7 +556,7 @@
           <p:cNvPr id="2" name="Vertical Title 1">
             <a:extLst>
               <a:ext uri="{FF2B5EF4-FFF2-40B4-BE49-F238E27FC236}">
-                <a16:creationId xmlns:a16="http://schemas.microsoft.com/office/drawing/2014/main" xmlns="" id="{B23CEE0C-4F29-471A-A596-147F8D19308B}"/>
+                <a16:creationId xmlns="" xmlns:a16="http://schemas.microsoft.com/office/drawing/2014/main" id="{B23CEE0C-4F29-471A-A596-147F8D19308B}"/>
               </a:ext>
             </a:extLst>
           </p:cNvPr>
@@ -587,7 +589,7 @@
           <p:cNvPr id="3" name="Vertical Text Placeholder 2">
             <a:extLst>
               <a:ext uri="{FF2B5EF4-FFF2-40B4-BE49-F238E27FC236}">
-                <a16:creationId xmlns:a16="http://schemas.microsoft.com/office/drawing/2014/main" xmlns="" id="{8EBA662F-4513-4DE6-A81B-C97A1E00C353}"/>
+                <a16:creationId xmlns="" xmlns:a16="http://schemas.microsoft.com/office/drawing/2014/main" id="{8EBA662F-4513-4DE6-A81B-C97A1E00C353}"/>
               </a:ext>
             </a:extLst>
           </p:cNvPr>
@@ -649,7 +651,7 @@
           <p:cNvPr id="4" name="Date Placeholder 3">
             <a:extLst>
               <a:ext uri="{FF2B5EF4-FFF2-40B4-BE49-F238E27FC236}">
-                <a16:creationId xmlns:a16="http://schemas.microsoft.com/office/drawing/2014/main" xmlns="" id="{7F2B2ACE-630A-4DE3-9718-28307E0A7DBE}"/>
+                <a16:creationId xmlns="" xmlns:a16="http://schemas.microsoft.com/office/drawing/2014/main" id="{7F2B2ACE-630A-4DE3-9718-28307E0A7DBE}"/>
               </a:ext>
             </a:extLst>
           </p:cNvPr>
@@ -668,7 +670,7 @@
             <a:fld id="{A84BBA84-8968-45AA-A313-365A0906B983}" type="datetimeFigureOut">
               <a:rPr lang="en-US" smtClean="0"/>
               <a:pPr/>
-              <a:t>8/19/2020</a:t>
+              <a:t>9/16/2020</a:t>
             </a:fld>
             <a:endParaRPr lang="en-US"/>
           </a:p>
@@ -679,7 +681,7 @@
           <p:cNvPr id="5" name="Footer Placeholder 4">
             <a:extLst>
               <a:ext uri="{FF2B5EF4-FFF2-40B4-BE49-F238E27FC236}">
-                <a16:creationId xmlns:a16="http://schemas.microsoft.com/office/drawing/2014/main" xmlns="" id="{EE41BC99-2CEC-4DBB-906A-7CCCBC980F63}"/>
+                <a16:creationId xmlns="" xmlns:a16="http://schemas.microsoft.com/office/drawing/2014/main" id="{EE41BC99-2CEC-4DBB-906A-7CCCBC980F63}"/>
               </a:ext>
             </a:extLst>
           </p:cNvPr>
@@ -704,7 +706,7 @@
           <p:cNvPr id="6" name="Slide Number Placeholder 5">
             <a:extLst>
               <a:ext uri="{FF2B5EF4-FFF2-40B4-BE49-F238E27FC236}">
-                <a16:creationId xmlns:a16="http://schemas.microsoft.com/office/drawing/2014/main" xmlns="" id="{B4A90082-A214-4A05-BE78-124EFB6C2AC2}"/>
+                <a16:creationId xmlns="" xmlns:a16="http://schemas.microsoft.com/office/drawing/2014/main" id="{B4A90082-A214-4A05-BE78-124EFB6C2AC2}"/>
               </a:ext>
             </a:extLst>
           </p:cNvPr>
@@ -732,7 +734,7 @@
     </p:spTree>
     <p:extLst>
       <p:ext uri="{BB962C8B-B14F-4D97-AF65-F5344CB8AC3E}">
-        <p14:creationId xmlns:p14="http://schemas.microsoft.com/office/powerpoint/2010/main" xmlns="" val="3692220874"/>
+        <p14:creationId xmlns="" xmlns:p14="http://schemas.microsoft.com/office/powerpoint/2010/main" val="3692220874"/>
       </p:ext>
     </p:extLst>
   </p:cSld>
@@ -764,7 +766,7 @@
           <p:cNvPr id="2" name="Title 1">
             <a:extLst>
               <a:ext uri="{FF2B5EF4-FFF2-40B4-BE49-F238E27FC236}">
-                <a16:creationId xmlns:a16="http://schemas.microsoft.com/office/drawing/2014/main" xmlns="" id="{0A237CCD-70A4-4FD7-BB5D-574EECE34A10}"/>
+                <a16:creationId xmlns="" xmlns:a16="http://schemas.microsoft.com/office/drawing/2014/main" id="{0A237CCD-70A4-4FD7-BB5D-574EECE34A10}"/>
               </a:ext>
             </a:extLst>
           </p:cNvPr>
@@ -792,7 +794,7 @@
           <p:cNvPr id="3" name="Content Placeholder 2">
             <a:extLst>
               <a:ext uri="{FF2B5EF4-FFF2-40B4-BE49-F238E27FC236}">
-                <a16:creationId xmlns:a16="http://schemas.microsoft.com/office/drawing/2014/main" xmlns="" id="{C5CAF556-18BA-45E2-BC54-040897CAF3F5}"/>
+                <a16:creationId xmlns="" xmlns:a16="http://schemas.microsoft.com/office/drawing/2014/main" id="{C5CAF556-18BA-45E2-BC54-040897CAF3F5}"/>
               </a:ext>
             </a:extLst>
           </p:cNvPr>
@@ -849,7 +851,7 @@
           <p:cNvPr id="4" name="Date Placeholder 3">
             <a:extLst>
               <a:ext uri="{FF2B5EF4-FFF2-40B4-BE49-F238E27FC236}">
-                <a16:creationId xmlns:a16="http://schemas.microsoft.com/office/drawing/2014/main" xmlns="" id="{ACBEFC2A-1B69-4BCA-972C-181C7ADC863F}"/>
+                <a16:creationId xmlns="" xmlns:a16="http://schemas.microsoft.com/office/drawing/2014/main" id="{ACBEFC2A-1B69-4BCA-972C-181C7ADC863F}"/>
               </a:ext>
             </a:extLst>
           </p:cNvPr>
@@ -868,7 +870,7 @@
             <a:fld id="{A84BBA84-8968-45AA-A313-365A0906B983}" type="datetimeFigureOut">
               <a:rPr lang="en-US" smtClean="0"/>
               <a:pPr/>
-              <a:t>8/19/2020</a:t>
+              <a:t>9/16/2020</a:t>
             </a:fld>
             <a:endParaRPr lang="en-US"/>
           </a:p>
@@ -879,7 +881,7 @@
           <p:cNvPr id="5" name="Footer Placeholder 4">
             <a:extLst>
               <a:ext uri="{FF2B5EF4-FFF2-40B4-BE49-F238E27FC236}">
-                <a16:creationId xmlns:a16="http://schemas.microsoft.com/office/drawing/2014/main" xmlns="" id="{47DB737D-4934-4518-8160-E76A9762073F}"/>
+                <a16:creationId xmlns="" xmlns:a16="http://schemas.microsoft.com/office/drawing/2014/main" id="{47DB737D-4934-4518-8160-E76A9762073F}"/>
               </a:ext>
             </a:extLst>
           </p:cNvPr>
@@ -904,7 +906,7 @@
           <p:cNvPr id="6" name="Slide Number Placeholder 5">
             <a:extLst>
               <a:ext uri="{FF2B5EF4-FFF2-40B4-BE49-F238E27FC236}">
-                <a16:creationId xmlns:a16="http://schemas.microsoft.com/office/drawing/2014/main" xmlns="" id="{69CFE2F7-C5DE-4376-A0A7-A4A4B7E583A4}"/>
+                <a16:creationId xmlns="" xmlns:a16="http://schemas.microsoft.com/office/drawing/2014/main" id="{69CFE2F7-C5DE-4376-A0A7-A4A4B7E583A4}"/>
               </a:ext>
             </a:extLst>
           </p:cNvPr>
@@ -932,7 +934,7 @@
     </p:spTree>
     <p:extLst>
       <p:ext uri="{BB962C8B-B14F-4D97-AF65-F5344CB8AC3E}">
-        <p14:creationId xmlns:p14="http://schemas.microsoft.com/office/powerpoint/2010/main" xmlns="" val="3965573333"/>
+        <p14:creationId xmlns="" xmlns:p14="http://schemas.microsoft.com/office/powerpoint/2010/main" val="3965573333"/>
       </p:ext>
     </p:extLst>
   </p:cSld>
@@ -964,7 +966,7 @@
           <p:cNvPr id="2" name="Title 1">
             <a:extLst>
               <a:ext uri="{FF2B5EF4-FFF2-40B4-BE49-F238E27FC236}">
-                <a16:creationId xmlns:a16="http://schemas.microsoft.com/office/drawing/2014/main" xmlns="" id="{9D344DEB-AFAC-4A97-9179-894A3B52A6DB}"/>
+                <a16:creationId xmlns="" xmlns:a16="http://schemas.microsoft.com/office/drawing/2014/main" id="{9D344DEB-AFAC-4A97-9179-894A3B52A6DB}"/>
               </a:ext>
             </a:extLst>
           </p:cNvPr>
@@ -1001,7 +1003,7 @@
           <p:cNvPr id="3" name="Text Placeholder 2">
             <a:extLst>
               <a:ext uri="{FF2B5EF4-FFF2-40B4-BE49-F238E27FC236}">
-                <a16:creationId xmlns:a16="http://schemas.microsoft.com/office/drawing/2014/main" xmlns="" id="{4B8614A0-9E53-4E88-B2C8-C26CD08F443F}"/>
+                <a16:creationId xmlns="" xmlns:a16="http://schemas.microsoft.com/office/drawing/2014/main" id="{4B8614A0-9E53-4E88-B2C8-C26CD08F443F}"/>
               </a:ext>
             </a:extLst>
           </p:cNvPr>
@@ -1126,7 +1128,7 @@
           <p:cNvPr id="4" name="Date Placeholder 3">
             <a:extLst>
               <a:ext uri="{FF2B5EF4-FFF2-40B4-BE49-F238E27FC236}">
-                <a16:creationId xmlns:a16="http://schemas.microsoft.com/office/drawing/2014/main" xmlns="" id="{0AC6F37C-907A-457C-8D7F-943CABBB78E8}"/>
+                <a16:creationId xmlns="" xmlns:a16="http://schemas.microsoft.com/office/drawing/2014/main" id="{0AC6F37C-907A-457C-8D7F-943CABBB78E8}"/>
               </a:ext>
             </a:extLst>
           </p:cNvPr>
@@ -1145,7 +1147,7 @@
             <a:fld id="{A84BBA84-8968-45AA-A313-365A0906B983}" type="datetimeFigureOut">
               <a:rPr lang="en-US" smtClean="0"/>
               <a:pPr/>
-              <a:t>8/19/2020</a:t>
+              <a:t>9/16/2020</a:t>
             </a:fld>
             <a:endParaRPr lang="en-US"/>
           </a:p>
@@ -1156,7 +1158,7 @@
           <p:cNvPr id="5" name="Footer Placeholder 4">
             <a:extLst>
               <a:ext uri="{FF2B5EF4-FFF2-40B4-BE49-F238E27FC236}">
-                <a16:creationId xmlns:a16="http://schemas.microsoft.com/office/drawing/2014/main" xmlns="" id="{9783BEBE-67B2-4C3D-AC50-EB7697AA5771}"/>
+                <a16:creationId xmlns="" xmlns:a16="http://schemas.microsoft.com/office/drawing/2014/main" id="{9783BEBE-67B2-4C3D-AC50-EB7697AA5771}"/>
               </a:ext>
             </a:extLst>
           </p:cNvPr>
@@ -1181,7 +1183,7 @@
           <p:cNvPr id="6" name="Slide Number Placeholder 5">
             <a:extLst>
               <a:ext uri="{FF2B5EF4-FFF2-40B4-BE49-F238E27FC236}">
-                <a16:creationId xmlns:a16="http://schemas.microsoft.com/office/drawing/2014/main" xmlns="" id="{2C1C006D-D0DA-4BC7-A364-9542A229E852}"/>
+                <a16:creationId xmlns="" xmlns:a16="http://schemas.microsoft.com/office/drawing/2014/main" id="{2C1C006D-D0DA-4BC7-A364-9542A229E852}"/>
               </a:ext>
             </a:extLst>
           </p:cNvPr>
@@ -1209,7 +1211,7 @@
     </p:spTree>
     <p:extLst>
       <p:ext uri="{BB962C8B-B14F-4D97-AF65-F5344CB8AC3E}">
-        <p14:creationId xmlns:p14="http://schemas.microsoft.com/office/powerpoint/2010/main" xmlns="" val="192735273"/>
+        <p14:creationId xmlns="" xmlns:p14="http://schemas.microsoft.com/office/powerpoint/2010/main" val="192735273"/>
       </p:ext>
     </p:extLst>
   </p:cSld>
@@ -1241,7 +1243,7 @@
           <p:cNvPr id="2" name="Title 1">
             <a:extLst>
               <a:ext uri="{FF2B5EF4-FFF2-40B4-BE49-F238E27FC236}">
-                <a16:creationId xmlns:a16="http://schemas.microsoft.com/office/drawing/2014/main" xmlns="" id="{912E5EFD-E63A-420A-94BC-F51D7A4E9A6E}"/>
+                <a16:creationId xmlns="" xmlns:a16="http://schemas.microsoft.com/office/drawing/2014/main" id="{912E5EFD-E63A-420A-94BC-F51D7A4E9A6E}"/>
               </a:ext>
             </a:extLst>
           </p:cNvPr>
@@ -1269,7 +1271,7 @@
           <p:cNvPr id="3" name="Content Placeholder 2">
             <a:extLst>
               <a:ext uri="{FF2B5EF4-FFF2-40B4-BE49-F238E27FC236}">
-                <a16:creationId xmlns:a16="http://schemas.microsoft.com/office/drawing/2014/main" xmlns="" id="{FA9CD570-A823-4217-B2A4-D603BEC50095}"/>
+                <a16:creationId xmlns="" xmlns:a16="http://schemas.microsoft.com/office/drawing/2014/main" id="{FA9CD570-A823-4217-B2A4-D603BEC50095}"/>
               </a:ext>
             </a:extLst>
           </p:cNvPr>
@@ -1331,7 +1333,7 @@
           <p:cNvPr id="4" name="Content Placeholder 3">
             <a:extLst>
               <a:ext uri="{FF2B5EF4-FFF2-40B4-BE49-F238E27FC236}">
-                <a16:creationId xmlns:a16="http://schemas.microsoft.com/office/drawing/2014/main" xmlns="" id="{64520B0D-0C4F-41D5-A51A-B74A9C11FC8B}"/>
+                <a16:creationId xmlns="" xmlns:a16="http://schemas.microsoft.com/office/drawing/2014/main" id="{64520B0D-0C4F-41D5-A51A-B74A9C11FC8B}"/>
               </a:ext>
             </a:extLst>
           </p:cNvPr>
@@ -1393,7 +1395,7 @@
           <p:cNvPr id="5" name="Date Placeholder 4">
             <a:extLst>
               <a:ext uri="{FF2B5EF4-FFF2-40B4-BE49-F238E27FC236}">
-                <a16:creationId xmlns:a16="http://schemas.microsoft.com/office/drawing/2014/main" xmlns="" id="{8FC617D0-F9FA-46A9-A3BA-B731CB922B5B}"/>
+                <a16:creationId xmlns="" xmlns:a16="http://schemas.microsoft.com/office/drawing/2014/main" id="{8FC617D0-F9FA-46A9-A3BA-B731CB922B5B}"/>
               </a:ext>
             </a:extLst>
           </p:cNvPr>
@@ -1412,7 +1414,7 @@
             <a:fld id="{A84BBA84-8968-45AA-A313-365A0906B983}" type="datetimeFigureOut">
               <a:rPr lang="en-US" smtClean="0"/>
               <a:pPr/>
-              <a:t>8/19/2020</a:t>
+              <a:t>9/16/2020</a:t>
             </a:fld>
             <a:endParaRPr lang="en-US"/>
           </a:p>
@@ -1423,7 +1425,7 @@
           <p:cNvPr id="6" name="Footer Placeholder 5">
             <a:extLst>
               <a:ext uri="{FF2B5EF4-FFF2-40B4-BE49-F238E27FC236}">
-                <a16:creationId xmlns:a16="http://schemas.microsoft.com/office/drawing/2014/main" xmlns="" id="{5C11E06D-C874-4D48-8032-D878582A1D4E}"/>
+                <a16:creationId xmlns="" xmlns:a16="http://schemas.microsoft.com/office/drawing/2014/main" id="{5C11E06D-C874-4D48-8032-D878582A1D4E}"/>
               </a:ext>
             </a:extLst>
           </p:cNvPr>
@@ -1448,7 +1450,7 @@
           <p:cNvPr id="7" name="Slide Number Placeholder 6">
             <a:extLst>
               <a:ext uri="{FF2B5EF4-FFF2-40B4-BE49-F238E27FC236}">
-                <a16:creationId xmlns:a16="http://schemas.microsoft.com/office/drawing/2014/main" xmlns="" id="{083DB44E-3D44-4BBA-948C-4AA94933130B}"/>
+                <a16:creationId xmlns="" xmlns:a16="http://schemas.microsoft.com/office/drawing/2014/main" id="{083DB44E-3D44-4BBA-948C-4AA94933130B}"/>
               </a:ext>
             </a:extLst>
           </p:cNvPr>
@@ -1476,7 +1478,7 @@
     </p:spTree>
     <p:extLst>
       <p:ext uri="{BB962C8B-B14F-4D97-AF65-F5344CB8AC3E}">
-        <p14:creationId xmlns:p14="http://schemas.microsoft.com/office/powerpoint/2010/main" xmlns="" val="3387072206"/>
+        <p14:creationId xmlns="" xmlns:p14="http://schemas.microsoft.com/office/powerpoint/2010/main" val="3387072206"/>
       </p:ext>
     </p:extLst>
   </p:cSld>
@@ -1508,7 +1510,7 @@
           <p:cNvPr id="2" name="Title 1">
             <a:extLst>
               <a:ext uri="{FF2B5EF4-FFF2-40B4-BE49-F238E27FC236}">
-                <a16:creationId xmlns:a16="http://schemas.microsoft.com/office/drawing/2014/main" xmlns="" id="{D23DC820-7F7E-450F-A69D-3018B2F9FAFE}"/>
+                <a16:creationId xmlns="" xmlns:a16="http://schemas.microsoft.com/office/drawing/2014/main" id="{D23DC820-7F7E-450F-A69D-3018B2F9FAFE}"/>
               </a:ext>
             </a:extLst>
           </p:cNvPr>
@@ -1541,7 +1543,7 @@
           <p:cNvPr id="3" name="Text Placeholder 2">
             <a:extLst>
               <a:ext uri="{FF2B5EF4-FFF2-40B4-BE49-F238E27FC236}">
-                <a16:creationId xmlns:a16="http://schemas.microsoft.com/office/drawing/2014/main" xmlns="" id="{9D6427FD-AE22-4E6E-B7E3-6AE0D26FF7DD}"/>
+                <a16:creationId xmlns="" xmlns:a16="http://schemas.microsoft.com/office/drawing/2014/main" id="{9D6427FD-AE22-4E6E-B7E3-6AE0D26FF7DD}"/>
               </a:ext>
             </a:extLst>
           </p:cNvPr>
@@ -1612,7 +1614,7 @@
           <p:cNvPr id="4" name="Content Placeholder 3">
             <a:extLst>
               <a:ext uri="{FF2B5EF4-FFF2-40B4-BE49-F238E27FC236}">
-                <a16:creationId xmlns:a16="http://schemas.microsoft.com/office/drawing/2014/main" xmlns="" id="{12844B46-2F53-473C-B218-55B4A9E922FE}"/>
+                <a16:creationId xmlns="" xmlns:a16="http://schemas.microsoft.com/office/drawing/2014/main" id="{12844B46-2F53-473C-B218-55B4A9E922FE}"/>
               </a:ext>
             </a:extLst>
           </p:cNvPr>
@@ -1674,7 +1676,7 @@
           <p:cNvPr id="5" name="Text Placeholder 4">
             <a:extLst>
               <a:ext uri="{FF2B5EF4-FFF2-40B4-BE49-F238E27FC236}">
-                <a16:creationId xmlns:a16="http://schemas.microsoft.com/office/drawing/2014/main" xmlns="" id="{A1684A79-753D-4843-9070-5B4217EB7D87}"/>
+                <a16:creationId xmlns="" xmlns:a16="http://schemas.microsoft.com/office/drawing/2014/main" id="{A1684A79-753D-4843-9070-5B4217EB7D87}"/>
               </a:ext>
             </a:extLst>
           </p:cNvPr>
@@ -1745,7 +1747,7 @@
           <p:cNvPr id="6" name="Content Placeholder 5">
             <a:extLst>
               <a:ext uri="{FF2B5EF4-FFF2-40B4-BE49-F238E27FC236}">
-                <a16:creationId xmlns:a16="http://schemas.microsoft.com/office/drawing/2014/main" xmlns="" id="{5909271A-21FB-46B9-95E9-7639015BAB93}"/>
+                <a16:creationId xmlns="" xmlns:a16="http://schemas.microsoft.com/office/drawing/2014/main" id="{5909271A-21FB-46B9-95E9-7639015BAB93}"/>
               </a:ext>
             </a:extLst>
           </p:cNvPr>
@@ -1807,7 +1809,7 @@
           <p:cNvPr id="7" name="Date Placeholder 6">
             <a:extLst>
               <a:ext uri="{FF2B5EF4-FFF2-40B4-BE49-F238E27FC236}">
-                <a16:creationId xmlns:a16="http://schemas.microsoft.com/office/drawing/2014/main" xmlns="" id="{91E0EB70-D288-4C92-A2BD-2A62FF8A5996}"/>
+                <a16:creationId xmlns="" xmlns:a16="http://schemas.microsoft.com/office/drawing/2014/main" id="{91E0EB70-D288-4C92-A2BD-2A62FF8A5996}"/>
               </a:ext>
             </a:extLst>
           </p:cNvPr>
@@ -1826,7 +1828,7 @@
             <a:fld id="{A84BBA84-8968-45AA-A313-365A0906B983}" type="datetimeFigureOut">
               <a:rPr lang="en-US" smtClean="0"/>
               <a:pPr/>
-              <a:t>8/19/2020</a:t>
+              <a:t>9/16/2020</a:t>
             </a:fld>
             <a:endParaRPr lang="en-US"/>
           </a:p>
@@ -1837,7 +1839,7 @@
           <p:cNvPr id="8" name="Footer Placeholder 7">
             <a:extLst>
               <a:ext uri="{FF2B5EF4-FFF2-40B4-BE49-F238E27FC236}">
-                <a16:creationId xmlns:a16="http://schemas.microsoft.com/office/drawing/2014/main" xmlns="" id="{04D5A95B-C464-4223-B361-8D6C6BCA2413}"/>
+                <a16:creationId xmlns="" xmlns:a16="http://schemas.microsoft.com/office/drawing/2014/main" id="{04D5A95B-C464-4223-B361-8D6C6BCA2413}"/>
               </a:ext>
             </a:extLst>
           </p:cNvPr>
@@ -1862,7 +1864,7 @@
           <p:cNvPr id="9" name="Slide Number Placeholder 8">
             <a:extLst>
               <a:ext uri="{FF2B5EF4-FFF2-40B4-BE49-F238E27FC236}">
-                <a16:creationId xmlns:a16="http://schemas.microsoft.com/office/drawing/2014/main" xmlns="" id="{8654711D-0C39-4DF6-9F40-303010A0888A}"/>
+                <a16:creationId xmlns="" xmlns:a16="http://schemas.microsoft.com/office/drawing/2014/main" id="{8654711D-0C39-4DF6-9F40-303010A0888A}"/>
               </a:ext>
             </a:extLst>
           </p:cNvPr>
@@ -1890,7 +1892,7 @@
     </p:spTree>
     <p:extLst>
       <p:ext uri="{BB962C8B-B14F-4D97-AF65-F5344CB8AC3E}">
-        <p14:creationId xmlns:p14="http://schemas.microsoft.com/office/powerpoint/2010/main" xmlns="" val="4212819130"/>
+        <p14:creationId xmlns="" xmlns:p14="http://schemas.microsoft.com/office/powerpoint/2010/main" val="4212819130"/>
       </p:ext>
     </p:extLst>
   </p:cSld>
@@ -1922,7 +1924,7 @@
           <p:cNvPr id="2" name="Title 1">
             <a:extLst>
               <a:ext uri="{FF2B5EF4-FFF2-40B4-BE49-F238E27FC236}">
-                <a16:creationId xmlns:a16="http://schemas.microsoft.com/office/drawing/2014/main" xmlns="" id="{F391C774-8FF3-46CB-8D76-136030A24A64}"/>
+                <a16:creationId xmlns="" xmlns:a16="http://schemas.microsoft.com/office/drawing/2014/main" id="{F391C774-8FF3-46CB-8D76-136030A24A64}"/>
               </a:ext>
             </a:extLst>
           </p:cNvPr>
@@ -1950,7 +1952,7 @@
           <p:cNvPr id="3" name="Date Placeholder 2">
             <a:extLst>
               <a:ext uri="{FF2B5EF4-FFF2-40B4-BE49-F238E27FC236}">
-                <a16:creationId xmlns:a16="http://schemas.microsoft.com/office/drawing/2014/main" xmlns="" id="{CDAD0960-6549-4450-B1E8-C70677E89C67}"/>
+                <a16:creationId xmlns="" xmlns:a16="http://schemas.microsoft.com/office/drawing/2014/main" id="{CDAD0960-6549-4450-B1E8-C70677E89C67}"/>
               </a:ext>
             </a:extLst>
           </p:cNvPr>
@@ -1969,7 +1971,7 @@
             <a:fld id="{A84BBA84-8968-45AA-A313-365A0906B983}" type="datetimeFigureOut">
               <a:rPr lang="en-US" smtClean="0"/>
               <a:pPr/>
-              <a:t>8/19/2020</a:t>
+              <a:t>9/16/2020</a:t>
             </a:fld>
             <a:endParaRPr lang="en-US"/>
           </a:p>
@@ -1980,7 +1982,7 @@
           <p:cNvPr id="4" name="Footer Placeholder 3">
             <a:extLst>
               <a:ext uri="{FF2B5EF4-FFF2-40B4-BE49-F238E27FC236}">
-                <a16:creationId xmlns:a16="http://schemas.microsoft.com/office/drawing/2014/main" xmlns="" id="{5F42E338-C77C-4D73-B2D4-9DFB0B06EBFF}"/>
+                <a16:creationId xmlns="" xmlns:a16="http://schemas.microsoft.com/office/drawing/2014/main" id="{5F42E338-C77C-4D73-B2D4-9DFB0B06EBFF}"/>
               </a:ext>
             </a:extLst>
           </p:cNvPr>
@@ -2005,7 +2007,7 @@
           <p:cNvPr id="5" name="Slide Number Placeholder 4">
             <a:extLst>
               <a:ext uri="{FF2B5EF4-FFF2-40B4-BE49-F238E27FC236}">
-                <a16:creationId xmlns:a16="http://schemas.microsoft.com/office/drawing/2014/main" xmlns="" id="{B3772123-F29D-48E7-B5DC-C7DA5DE10BB7}"/>
+                <a16:creationId xmlns="" xmlns:a16="http://schemas.microsoft.com/office/drawing/2014/main" id="{B3772123-F29D-48E7-B5DC-C7DA5DE10BB7}"/>
               </a:ext>
             </a:extLst>
           </p:cNvPr>
@@ -2033,7 +2035,7 @@
     </p:spTree>
     <p:extLst>
       <p:ext uri="{BB962C8B-B14F-4D97-AF65-F5344CB8AC3E}">
-        <p14:creationId xmlns:p14="http://schemas.microsoft.com/office/powerpoint/2010/main" xmlns="" val="1966136104"/>
+        <p14:creationId xmlns="" xmlns:p14="http://schemas.microsoft.com/office/powerpoint/2010/main" val="1966136104"/>
       </p:ext>
     </p:extLst>
   </p:cSld>
@@ -2065,7 +2067,7 @@
           <p:cNvPr id="2" name="Date Placeholder 1">
             <a:extLst>
               <a:ext uri="{FF2B5EF4-FFF2-40B4-BE49-F238E27FC236}">
-                <a16:creationId xmlns:a16="http://schemas.microsoft.com/office/drawing/2014/main" xmlns="" id="{E2394FE1-93E7-47DB-BA64-3BB12F6FF8C4}"/>
+                <a16:creationId xmlns="" xmlns:a16="http://schemas.microsoft.com/office/drawing/2014/main" id="{E2394FE1-93E7-47DB-BA64-3BB12F6FF8C4}"/>
               </a:ext>
             </a:extLst>
           </p:cNvPr>
@@ -2084,7 +2086,7 @@
             <a:fld id="{A84BBA84-8968-45AA-A313-365A0906B983}" type="datetimeFigureOut">
               <a:rPr lang="en-US" smtClean="0"/>
               <a:pPr/>
-              <a:t>8/19/2020</a:t>
+              <a:t>9/16/2020</a:t>
             </a:fld>
             <a:endParaRPr lang="en-US"/>
           </a:p>
@@ -2095,7 +2097,7 @@
           <p:cNvPr id="3" name="Footer Placeholder 2">
             <a:extLst>
               <a:ext uri="{FF2B5EF4-FFF2-40B4-BE49-F238E27FC236}">
-                <a16:creationId xmlns:a16="http://schemas.microsoft.com/office/drawing/2014/main" xmlns="" id="{CEAEDF47-3057-4358-A889-1ACB0485BED3}"/>
+                <a16:creationId xmlns="" xmlns:a16="http://schemas.microsoft.com/office/drawing/2014/main" id="{CEAEDF47-3057-4358-A889-1ACB0485BED3}"/>
               </a:ext>
             </a:extLst>
           </p:cNvPr>
@@ -2120,7 +2122,7 @@
           <p:cNvPr id="4" name="Slide Number Placeholder 3">
             <a:extLst>
               <a:ext uri="{FF2B5EF4-FFF2-40B4-BE49-F238E27FC236}">
-                <a16:creationId xmlns:a16="http://schemas.microsoft.com/office/drawing/2014/main" xmlns="" id="{A9B833C9-2839-447D-9784-4ACB614B4AD5}"/>
+                <a16:creationId xmlns="" xmlns:a16="http://schemas.microsoft.com/office/drawing/2014/main" id="{A9B833C9-2839-447D-9784-4ACB614B4AD5}"/>
               </a:ext>
             </a:extLst>
           </p:cNvPr>
@@ -2148,7 +2150,7 @@
     </p:spTree>
     <p:extLst>
       <p:ext uri="{BB962C8B-B14F-4D97-AF65-F5344CB8AC3E}">
-        <p14:creationId xmlns:p14="http://schemas.microsoft.com/office/powerpoint/2010/main" xmlns="" val="2567972609"/>
+        <p14:creationId xmlns="" xmlns:p14="http://schemas.microsoft.com/office/powerpoint/2010/main" val="2567972609"/>
       </p:ext>
     </p:extLst>
   </p:cSld>
@@ -2180,7 +2182,7 @@
           <p:cNvPr id="2" name="Title 1">
             <a:extLst>
               <a:ext uri="{FF2B5EF4-FFF2-40B4-BE49-F238E27FC236}">
-                <a16:creationId xmlns:a16="http://schemas.microsoft.com/office/drawing/2014/main" xmlns="" id="{82782AD8-80E1-4370-B512-6447A2971FA6}"/>
+                <a16:creationId xmlns="" xmlns:a16="http://schemas.microsoft.com/office/drawing/2014/main" id="{82782AD8-80E1-4370-B512-6447A2971FA6}"/>
               </a:ext>
             </a:extLst>
           </p:cNvPr>
@@ -2217,7 +2219,7 @@
           <p:cNvPr id="3" name="Content Placeholder 2">
             <a:extLst>
               <a:ext uri="{FF2B5EF4-FFF2-40B4-BE49-F238E27FC236}">
-                <a16:creationId xmlns:a16="http://schemas.microsoft.com/office/drawing/2014/main" xmlns="" id="{DED47C82-9FAC-4952-8702-E83372186B1B}"/>
+                <a16:creationId xmlns="" xmlns:a16="http://schemas.microsoft.com/office/drawing/2014/main" id="{DED47C82-9FAC-4952-8702-E83372186B1B}"/>
               </a:ext>
             </a:extLst>
           </p:cNvPr>
@@ -2307,7 +2309,7 @@
           <p:cNvPr id="4" name="Text Placeholder 3">
             <a:extLst>
               <a:ext uri="{FF2B5EF4-FFF2-40B4-BE49-F238E27FC236}">
-                <a16:creationId xmlns:a16="http://schemas.microsoft.com/office/drawing/2014/main" xmlns="" id="{7B8CD5E5-4A7D-45AB-AAFB-A29CDC64F4C0}"/>
+                <a16:creationId xmlns="" xmlns:a16="http://schemas.microsoft.com/office/drawing/2014/main" id="{7B8CD5E5-4A7D-45AB-AAFB-A29CDC64F4C0}"/>
               </a:ext>
             </a:extLst>
           </p:cNvPr>
@@ -2378,7 +2380,7 @@
           <p:cNvPr id="5" name="Date Placeholder 4">
             <a:extLst>
               <a:ext uri="{FF2B5EF4-FFF2-40B4-BE49-F238E27FC236}">
-                <a16:creationId xmlns:a16="http://schemas.microsoft.com/office/drawing/2014/main" xmlns="" id="{7ED281A6-3BD3-4226-B9A6-EE4448B5EBE4}"/>
+                <a16:creationId xmlns="" xmlns:a16="http://schemas.microsoft.com/office/drawing/2014/main" id="{7ED281A6-3BD3-4226-B9A6-EE4448B5EBE4}"/>
               </a:ext>
             </a:extLst>
           </p:cNvPr>
@@ -2397,7 +2399,7 @@
             <a:fld id="{A84BBA84-8968-45AA-A313-365A0906B983}" type="datetimeFigureOut">
               <a:rPr lang="en-US" smtClean="0"/>
               <a:pPr/>
-              <a:t>8/19/2020</a:t>
+              <a:t>9/16/2020</a:t>
             </a:fld>
             <a:endParaRPr lang="en-US"/>
           </a:p>
@@ -2408,7 +2410,7 @@
           <p:cNvPr id="6" name="Footer Placeholder 5">
             <a:extLst>
               <a:ext uri="{FF2B5EF4-FFF2-40B4-BE49-F238E27FC236}">
-                <a16:creationId xmlns:a16="http://schemas.microsoft.com/office/drawing/2014/main" xmlns="" id="{2188E19C-1785-4E00-8B16-8788691D89F7}"/>
+                <a16:creationId xmlns="" xmlns:a16="http://schemas.microsoft.com/office/drawing/2014/main" id="{2188E19C-1785-4E00-8B16-8788691D89F7}"/>
               </a:ext>
             </a:extLst>
           </p:cNvPr>
@@ -2433,7 +2435,7 @@
           <p:cNvPr id="7" name="Slide Number Placeholder 6">
             <a:extLst>
               <a:ext uri="{FF2B5EF4-FFF2-40B4-BE49-F238E27FC236}">
-                <a16:creationId xmlns:a16="http://schemas.microsoft.com/office/drawing/2014/main" xmlns="" id="{BA1A4871-0240-46DB-A59C-3AACCF8C4A2E}"/>
+                <a16:creationId xmlns="" xmlns:a16="http://schemas.microsoft.com/office/drawing/2014/main" id="{BA1A4871-0240-46DB-A59C-3AACCF8C4A2E}"/>
               </a:ext>
             </a:extLst>
           </p:cNvPr>
@@ -2461,7 +2463,7 @@
     </p:spTree>
     <p:extLst>
       <p:ext uri="{BB962C8B-B14F-4D97-AF65-F5344CB8AC3E}">
-        <p14:creationId xmlns:p14="http://schemas.microsoft.com/office/powerpoint/2010/main" xmlns="" val="713821137"/>
+        <p14:creationId xmlns="" xmlns:p14="http://schemas.microsoft.com/office/powerpoint/2010/main" val="713821137"/>
       </p:ext>
     </p:extLst>
   </p:cSld>
@@ -2493,7 +2495,7 @@
           <p:cNvPr id="2" name="Title 1">
             <a:extLst>
               <a:ext uri="{FF2B5EF4-FFF2-40B4-BE49-F238E27FC236}">
-                <a16:creationId xmlns:a16="http://schemas.microsoft.com/office/drawing/2014/main" xmlns="" id="{857821D8-6B03-40FB-BD5B-1538B5C5F495}"/>
+                <a16:creationId xmlns="" xmlns:a16="http://schemas.microsoft.com/office/drawing/2014/main" id="{857821D8-6B03-40FB-BD5B-1538B5C5F495}"/>
               </a:ext>
             </a:extLst>
           </p:cNvPr>
@@ -2530,7 +2532,7 @@
           <p:cNvPr id="3" name="Picture Placeholder 2">
             <a:extLst>
               <a:ext uri="{FF2B5EF4-FFF2-40B4-BE49-F238E27FC236}">
-                <a16:creationId xmlns:a16="http://schemas.microsoft.com/office/drawing/2014/main" xmlns="" id="{F9CD0DEF-0ECE-4162-A607-9F2D4DD5709E}"/>
+                <a16:creationId xmlns="" xmlns:a16="http://schemas.microsoft.com/office/drawing/2014/main" id="{F9CD0DEF-0ECE-4162-A607-9F2D4DD5709E}"/>
               </a:ext>
             </a:extLst>
           </p:cNvPr>
@@ -2597,7 +2599,7 @@
           <p:cNvPr id="4" name="Text Placeholder 3">
             <a:extLst>
               <a:ext uri="{FF2B5EF4-FFF2-40B4-BE49-F238E27FC236}">
-                <a16:creationId xmlns:a16="http://schemas.microsoft.com/office/drawing/2014/main" xmlns="" id="{5E44282F-C820-4F35-8D40-D59DAF03FF3E}"/>
+                <a16:creationId xmlns="" xmlns:a16="http://schemas.microsoft.com/office/drawing/2014/main" id="{5E44282F-C820-4F35-8D40-D59DAF03FF3E}"/>
               </a:ext>
             </a:extLst>
           </p:cNvPr>
@@ -2668,7 +2670,7 @@
           <p:cNvPr id="5" name="Date Placeholder 4">
             <a:extLst>
               <a:ext uri="{FF2B5EF4-FFF2-40B4-BE49-F238E27FC236}">
-                <a16:creationId xmlns:a16="http://schemas.microsoft.com/office/drawing/2014/main" xmlns="" id="{7B753E33-C360-49F9-845E-C92BDA4CEF49}"/>
+                <a16:creationId xmlns="" xmlns:a16="http://schemas.microsoft.com/office/drawing/2014/main" id="{7B753E33-C360-49F9-845E-C92BDA4CEF49}"/>
               </a:ext>
             </a:extLst>
           </p:cNvPr>
@@ -2687,7 +2689,7 @@
             <a:fld id="{A84BBA84-8968-45AA-A313-365A0906B983}" type="datetimeFigureOut">
               <a:rPr lang="en-US" smtClean="0"/>
               <a:pPr/>
-              <a:t>8/19/2020</a:t>
+              <a:t>9/16/2020</a:t>
             </a:fld>
             <a:endParaRPr lang="en-US"/>
           </a:p>
@@ -2698,7 +2700,7 @@
           <p:cNvPr id="6" name="Footer Placeholder 5">
             <a:extLst>
               <a:ext uri="{FF2B5EF4-FFF2-40B4-BE49-F238E27FC236}">
-                <a16:creationId xmlns:a16="http://schemas.microsoft.com/office/drawing/2014/main" xmlns="" id="{3172D3A9-EE08-4EF1-B45F-9B24FE4ACBC1}"/>
+                <a16:creationId xmlns="" xmlns:a16="http://schemas.microsoft.com/office/drawing/2014/main" id="{3172D3A9-EE08-4EF1-B45F-9B24FE4ACBC1}"/>
               </a:ext>
             </a:extLst>
           </p:cNvPr>
@@ -2723,7 +2725,7 @@
           <p:cNvPr id="7" name="Slide Number Placeholder 6">
             <a:extLst>
               <a:ext uri="{FF2B5EF4-FFF2-40B4-BE49-F238E27FC236}">
-                <a16:creationId xmlns:a16="http://schemas.microsoft.com/office/drawing/2014/main" xmlns="" id="{2FD0B004-39D4-45CC-BF5F-8239C652EAA8}"/>
+                <a16:creationId xmlns="" xmlns:a16="http://schemas.microsoft.com/office/drawing/2014/main" id="{2FD0B004-39D4-45CC-BF5F-8239C652EAA8}"/>
               </a:ext>
             </a:extLst>
           </p:cNvPr>
@@ -2751,7 +2753,7 @@
     </p:spTree>
     <p:extLst>
       <p:ext uri="{BB962C8B-B14F-4D97-AF65-F5344CB8AC3E}">
-        <p14:creationId xmlns:p14="http://schemas.microsoft.com/office/powerpoint/2010/main" xmlns="" val="3904715898"/>
+        <p14:creationId xmlns="" xmlns:p14="http://schemas.microsoft.com/office/powerpoint/2010/main" val="3904715898"/>
       </p:ext>
     </p:extLst>
   </p:cSld>
@@ -2788,7 +2790,7 @@
           <p:cNvPr id="2" name="Title Placeholder 1">
             <a:extLst>
               <a:ext uri="{FF2B5EF4-FFF2-40B4-BE49-F238E27FC236}">
-                <a16:creationId xmlns:a16="http://schemas.microsoft.com/office/drawing/2014/main" xmlns="" id="{FC3F75B9-2CEB-4B11-8B58-978A157EA64A}"/>
+                <a16:creationId xmlns="" xmlns:a16="http://schemas.microsoft.com/office/drawing/2014/main" id="{FC3F75B9-2CEB-4B11-8B58-978A157EA64A}"/>
               </a:ext>
             </a:extLst>
           </p:cNvPr>
@@ -2826,7 +2828,7 @@
           <p:cNvPr id="3" name="Text Placeholder 2">
             <a:extLst>
               <a:ext uri="{FF2B5EF4-FFF2-40B4-BE49-F238E27FC236}">
-                <a16:creationId xmlns:a16="http://schemas.microsoft.com/office/drawing/2014/main" xmlns="" id="{5532F74E-87BF-4D75-9E28-AE4CE3EFED08}"/>
+                <a16:creationId xmlns="" xmlns:a16="http://schemas.microsoft.com/office/drawing/2014/main" id="{5532F74E-87BF-4D75-9E28-AE4CE3EFED08}"/>
               </a:ext>
             </a:extLst>
           </p:cNvPr>
@@ -2893,7 +2895,7 @@
           <p:cNvPr id="4" name="Date Placeholder 3">
             <a:extLst>
               <a:ext uri="{FF2B5EF4-FFF2-40B4-BE49-F238E27FC236}">
-                <a16:creationId xmlns:a16="http://schemas.microsoft.com/office/drawing/2014/main" xmlns="" id="{ED64AC65-7791-4E14-86C5-8A05AECBAEDF}"/>
+                <a16:creationId xmlns="" xmlns:a16="http://schemas.microsoft.com/office/drawing/2014/main" id="{ED64AC65-7791-4E14-86C5-8A05AECBAEDF}"/>
               </a:ext>
             </a:extLst>
           </p:cNvPr>
@@ -2930,7 +2932,7 @@
             <a:fld id="{A84BBA84-8968-45AA-A313-365A0906B983}" type="datetimeFigureOut">
               <a:rPr lang="en-US" smtClean="0"/>
               <a:pPr/>
-              <a:t>8/19/2020</a:t>
+              <a:t>9/16/2020</a:t>
             </a:fld>
             <a:endParaRPr lang="en-US"/>
           </a:p>
@@ -2941,7 +2943,7 @@
           <p:cNvPr id="5" name="Footer Placeholder 4">
             <a:extLst>
               <a:ext uri="{FF2B5EF4-FFF2-40B4-BE49-F238E27FC236}">
-                <a16:creationId xmlns:a16="http://schemas.microsoft.com/office/drawing/2014/main" xmlns="" id="{639CCDB6-CABA-455A-B6A1-8EB158E30465}"/>
+                <a16:creationId xmlns="" xmlns:a16="http://schemas.microsoft.com/office/drawing/2014/main" id="{639CCDB6-CABA-455A-B6A1-8EB158E30465}"/>
               </a:ext>
             </a:extLst>
           </p:cNvPr>
@@ -2984,7 +2986,7 @@
           <p:cNvPr id="6" name="Slide Number Placeholder 5">
             <a:extLst>
               <a:ext uri="{FF2B5EF4-FFF2-40B4-BE49-F238E27FC236}">
-                <a16:creationId xmlns:a16="http://schemas.microsoft.com/office/drawing/2014/main" xmlns="" id="{D9EB3522-F593-41BA-8F0E-B255F34AE975}"/>
+                <a16:creationId xmlns="" xmlns:a16="http://schemas.microsoft.com/office/drawing/2014/main" id="{D9EB3522-F593-41BA-8F0E-B255F34AE975}"/>
               </a:ext>
             </a:extLst>
           </p:cNvPr>
@@ -3030,7 +3032,7 @@
     </p:spTree>
     <p:extLst>
       <p:ext uri="{BB962C8B-B14F-4D97-AF65-F5344CB8AC3E}">
-        <p14:creationId xmlns:p14="http://schemas.microsoft.com/office/powerpoint/2010/main" xmlns="" val="4100062918"/>
+        <p14:creationId xmlns="" xmlns:p14="http://schemas.microsoft.com/office/powerpoint/2010/main" val="4100062918"/>
       </p:ext>
     </p:extLst>
   </p:cSld>
@@ -3353,7 +3355,7 @@
           <p:cNvPr id="25" name="Group 24">
             <a:extLst>
               <a:ext uri="{FF2B5EF4-FFF2-40B4-BE49-F238E27FC236}">
-                <a16:creationId xmlns:a16="http://schemas.microsoft.com/office/drawing/2014/main" xmlns="" id="{66097652-ED98-4EFE-BBBD-15DA1BC42DCF}"/>
+                <a16:creationId xmlns="" xmlns:a16="http://schemas.microsoft.com/office/drawing/2014/main" id="{66097652-ED98-4EFE-BBBD-15DA1BC42DCF}"/>
               </a:ext>
             </a:extLst>
           </p:cNvPr>
@@ -3373,7 +3375,7 @@
             <p:cNvPr id="5" name="TextBox 4">
               <a:extLst>
                 <a:ext uri="{FF2B5EF4-FFF2-40B4-BE49-F238E27FC236}">
-                  <a16:creationId xmlns:a16="http://schemas.microsoft.com/office/drawing/2014/main" xmlns="" id="{56BE065E-1930-4003-886C-371FA26FCEBD}"/>
+                  <a16:creationId xmlns="" xmlns:a16="http://schemas.microsoft.com/office/drawing/2014/main" id="{56BE065E-1930-4003-886C-371FA26FCEBD}"/>
                 </a:ext>
               </a:extLst>
             </p:cNvPr>
@@ -3408,7 +3410,7 @@
             <p:cNvPr id="6" name="Rectangle 5">
               <a:extLst>
                 <a:ext uri="{FF2B5EF4-FFF2-40B4-BE49-F238E27FC236}">
-                  <a16:creationId xmlns:a16="http://schemas.microsoft.com/office/drawing/2014/main" xmlns="" id="{38EDEA2F-D225-4D5B-8066-5BC099D49041}"/>
+                  <a16:creationId xmlns="" xmlns:a16="http://schemas.microsoft.com/office/drawing/2014/main" id="{38EDEA2F-D225-4D5B-8066-5BC099D49041}"/>
                 </a:ext>
               </a:extLst>
             </p:cNvPr>
@@ -3460,7 +3462,7 @@
             <p:cNvPr id="7" name="Rectangle 6">
               <a:extLst>
                 <a:ext uri="{FF2B5EF4-FFF2-40B4-BE49-F238E27FC236}">
-                  <a16:creationId xmlns:a16="http://schemas.microsoft.com/office/drawing/2014/main" xmlns="" id="{122FDAC8-90E9-49BB-ACA2-B3FEFC332B1B}"/>
+                  <a16:creationId xmlns="" xmlns:a16="http://schemas.microsoft.com/office/drawing/2014/main" id="{122FDAC8-90E9-49BB-ACA2-B3FEFC332B1B}"/>
                 </a:ext>
               </a:extLst>
             </p:cNvPr>
@@ -3512,7 +3514,7 @@
             <p:cNvPr id="8" name="Rectangle 7">
               <a:extLst>
                 <a:ext uri="{FF2B5EF4-FFF2-40B4-BE49-F238E27FC236}">
-                  <a16:creationId xmlns:a16="http://schemas.microsoft.com/office/drawing/2014/main" xmlns="" id="{81561EC4-F0CE-47D7-B878-BA89E4BF216C}"/>
+                  <a16:creationId xmlns="" xmlns:a16="http://schemas.microsoft.com/office/drawing/2014/main" id="{81561EC4-F0CE-47D7-B878-BA89E4BF216C}"/>
                 </a:ext>
               </a:extLst>
             </p:cNvPr>
@@ -3564,7 +3566,7 @@
             <p:cNvPr id="10" name="Straight Arrow Connector 9">
               <a:extLst>
                 <a:ext uri="{FF2B5EF4-FFF2-40B4-BE49-F238E27FC236}">
-                  <a16:creationId xmlns:a16="http://schemas.microsoft.com/office/drawing/2014/main" xmlns="" id="{34EB9096-88A6-4FFB-BD80-042573C244EC}"/>
+                  <a16:creationId xmlns="" xmlns:a16="http://schemas.microsoft.com/office/drawing/2014/main" id="{34EB9096-88A6-4FFB-BD80-042573C244EC}"/>
                 </a:ext>
               </a:extLst>
             </p:cNvPr>
@@ -3606,7 +3608,7 @@
             <p:cNvPr id="11" name="TextBox 10">
               <a:extLst>
                 <a:ext uri="{FF2B5EF4-FFF2-40B4-BE49-F238E27FC236}">
-                  <a16:creationId xmlns:a16="http://schemas.microsoft.com/office/drawing/2014/main" xmlns="" id="{0C5AF5B1-B0CA-47B7-95D9-12C65C07BB5A}"/>
+                  <a16:creationId xmlns="" xmlns:a16="http://schemas.microsoft.com/office/drawing/2014/main" id="{0C5AF5B1-B0CA-47B7-95D9-12C65C07BB5A}"/>
                 </a:ext>
               </a:extLst>
             </p:cNvPr>
@@ -3641,7 +3643,7 @@
             <p:cNvPr id="13" name="Straight Arrow Connector 12">
               <a:extLst>
                 <a:ext uri="{FF2B5EF4-FFF2-40B4-BE49-F238E27FC236}">
-                  <a16:creationId xmlns:a16="http://schemas.microsoft.com/office/drawing/2014/main" xmlns="" id="{752650B5-7F90-41F9-B5AF-DE7E58785558}"/>
+                  <a16:creationId xmlns="" xmlns:a16="http://schemas.microsoft.com/office/drawing/2014/main" id="{752650B5-7F90-41F9-B5AF-DE7E58785558}"/>
                 </a:ext>
               </a:extLst>
             </p:cNvPr>
@@ -3686,7 +3688,7 @@
             <p:cNvPr id="16" name="TextBox 15">
               <a:extLst>
                 <a:ext uri="{FF2B5EF4-FFF2-40B4-BE49-F238E27FC236}">
-                  <a16:creationId xmlns:a16="http://schemas.microsoft.com/office/drawing/2014/main" xmlns="" id="{BC99DCF3-B9ED-4D65-A464-ADB0BB4968C9}"/>
+                  <a16:creationId xmlns="" xmlns:a16="http://schemas.microsoft.com/office/drawing/2014/main" id="{BC99DCF3-B9ED-4D65-A464-ADB0BB4968C9}"/>
                 </a:ext>
               </a:extLst>
             </p:cNvPr>
@@ -3721,7 +3723,7 @@
             <p:cNvPr id="20" name="Straight Arrow Connector 19">
               <a:extLst>
                 <a:ext uri="{FF2B5EF4-FFF2-40B4-BE49-F238E27FC236}">
-                  <a16:creationId xmlns:a16="http://schemas.microsoft.com/office/drawing/2014/main" xmlns="" id="{243944A9-C9B5-403B-982D-EEA30627BAF8}"/>
+                  <a16:creationId xmlns="" xmlns:a16="http://schemas.microsoft.com/office/drawing/2014/main" id="{243944A9-C9B5-403B-982D-EEA30627BAF8}"/>
                 </a:ext>
               </a:extLst>
             </p:cNvPr>
@@ -3767,7 +3769,7 @@
             <p:cNvPr id="22" name="TextBox 21">
               <a:extLst>
                 <a:ext uri="{FF2B5EF4-FFF2-40B4-BE49-F238E27FC236}">
-                  <a16:creationId xmlns:a16="http://schemas.microsoft.com/office/drawing/2014/main" xmlns="" id="{6E215ECF-23A0-4C81-AA15-8DD8C88E5285}"/>
+                  <a16:creationId xmlns="" xmlns:a16="http://schemas.microsoft.com/office/drawing/2014/main" id="{6E215ECF-23A0-4C81-AA15-8DD8C88E5285}"/>
                 </a:ext>
               </a:extLst>
             </p:cNvPr>
@@ -3803,7 +3805,7 @@
           <p:cNvPr id="26" name="TextBox 25">
             <a:extLst>
               <a:ext uri="{FF2B5EF4-FFF2-40B4-BE49-F238E27FC236}">
-                <a16:creationId xmlns:a16="http://schemas.microsoft.com/office/drawing/2014/main" xmlns="" id="{723B3EF4-8DCC-47EA-8F22-AAAFA1702B3D}"/>
+                <a16:creationId xmlns="" xmlns:a16="http://schemas.microsoft.com/office/drawing/2014/main" id="{723B3EF4-8DCC-47EA-8F22-AAAFA1702B3D}"/>
               </a:ext>
             </a:extLst>
           </p:cNvPr>
@@ -3849,7 +3851,7 @@
           <p:cNvPr id="28" name="TextBox 27">
             <a:extLst>
               <a:ext uri="{FF2B5EF4-FFF2-40B4-BE49-F238E27FC236}">
-                <a16:creationId xmlns:a16="http://schemas.microsoft.com/office/drawing/2014/main" xmlns="" id="{491713ED-A19D-477E-ACC7-92DFF8685E3E}"/>
+                <a16:creationId xmlns="" xmlns:a16="http://schemas.microsoft.com/office/drawing/2014/main" id="{491713ED-A19D-477E-ACC7-92DFF8685E3E}"/>
               </a:ext>
             </a:extLst>
           </p:cNvPr>
@@ -3884,7 +3886,7 @@
           <p:cNvPr id="30" name="TextBox 29">
             <a:extLst>
               <a:ext uri="{FF2B5EF4-FFF2-40B4-BE49-F238E27FC236}">
-                <a16:creationId xmlns:a16="http://schemas.microsoft.com/office/drawing/2014/main" xmlns="" id="{DFE811AD-A400-468C-B79E-B9243522C210}"/>
+                <a16:creationId xmlns="" xmlns:a16="http://schemas.microsoft.com/office/drawing/2014/main" id="{DFE811AD-A400-468C-B79E-B9243522C210}"/>
               </a:ext>
             </a:extLst>
           </p:cNvPr>
@@ -3919,7 +3921,7 @@
           <p:cNvPr id="31" name="TextBox 30">
             <a:extLst>
               <a:ext uri="{FF2B5EF4-FFF2-40B4-BE49-F238E27FC236}">
-                <a16:creationId xmlns:a16="http://schemas.microsoft.com/office/drawing/2014/main" xmlns="" id="{5F3E1325-2EC6-42BA-81D2-F505ABFB5256}"/>
+                <a16:creationId xmlns="" xmlns:a16="http://schemas.microsoft.com/office/drawing/2014/main" id="{5F3E1325-2EC6-42BA-81D2-F505ABFB5256}"/>
               </a:ext>
             </a:extLst>
           </p:cNvPr>
@@ -3958,7 +3960,7 @@
           <p:cNvPr id="33" name="TextBox 32">
             <a:extLst>
               <a:ext uri="{FF2B5EF4-FFF2-40B4-BE49-F238E27FC236}">
-                <a16:creationId xmlns:a16="http://schemas.microsoft.com/office/drawing/2014/main" xmlns="" id="{8DFBDA76-BC5B-4B5F-8B2D-17DC70C40DD6}"/>
+                <a16:creationId xmlns="" xmlns:a16="http://schemas.microsoft.com/office/drawing/2014/main" id="{8DFBDA76-BC5B-4B5F-8B2D-17DC70C40DD6}"/>
               </a:ext>
             </a:extLst>
           </p:cNvPr>
@@ -3997,7 +3999,7 @@
           <p:cNvPr id="34" name="Table 33">
             <a:extLst>
               <a:ext uri="{FF2B5EF4-FFF2-40B4-BE49-F238E27FC236}">
-                <a16:creationId xmlns:a16="http://schemas.microsoft.com/office/drawing/2014/main" xmlns="" id="{F2374274-9813-459A-86AC-F5EF8290DA04}"/>
+                <a16:creationId xmlns="" xmlns:a16="http://schemas.microsoft.com/office/drawing/2014/main" id="{F2374274-9813-459A-86AC-F5EF8290DA04}"/>
               </a:ext>
             </a:extLst>
           </p:cNvPr>
@@ -4007,7 +4009,7 @@
           <p:nvPr>
             <p:extLst>
               <p:ext uri="{D42A27DB-BD31-4B8C-83A1-F6EECF244321}">
-                <p14:modId xmlns:p14="http://schemas.microsoft.com/office/powerpoint/2010/main" xmlns="" val="269550060"/>
+                <p14:modId xmlns="" xmlns:p14="http://schemas.microsoft.com/office/powerpoint/2010/main" val="269550060"/>
               </p:ext>
             </p:extLst>
           </p:nvPr>
@@ -4026,14 +4028,14 @@
                 <a:gridCol w="1193800">
                   <a:extLst>
                     <a:ext uri="{9D8B030D-6E8A-4147-A177-3AD203B41FA5}">
-                      <a16:colId xmlns:a16="http://schemas.microsoft.com/office/drawing/2014/main" xmlns="" val="809735740"/>
+                      <a16:colId xmlns="" xmlns:a16="http://schemas.microsoft.com/office/drawing/2014/main" val="809735740"/>
                     </a:ext>
                   </a:extLst>
                 </a:gridCol>
                 <a:gridCol w="3200400">
                   <a:extLst>
                     <a:ext uri="{9D8B030D-6E8A-4147-A177-3AD203B41FA5}">
-                      <a16:colId xmlns:a16="http://schemas.microsoft.com/office/drawing/2014/main" xmlns="" val="4239455824"/>
+                      <a16:colId xmlns="" xmlns:a16="http://schemas.microsoft.com/office/drawing/2014/main" val="4239455824"/>
                     </a:ext>
                   </a:extLst>
                 </a:gridCol>
@@ -4087,7 +4089,7 @@
                 </a:tc>
                 <a:extLst>
                   <a:ext uri="{0D108BD9-81ED-4DB2-BD59-A6C34878D82A}">
-                    <a16:rowId xmlns:a16="http://schemas.microsoft.com/office/drawing/2014/main" xmlns="" val="2508049654"/>
+                    <a16:rowId xmlns="" xmlns:a16="http://schemas.microsoft.com/office/drawing/2014/main" val="2508049654"/>
                   </a:ext>
                 </a:extLst>
               </a:tr>
@@ -4140,7 +4142,7 @@
                 </a:tc>
                 <a:extLst>
                   <a:ext uri="{0D108BD9-81ED-4DB2-BD59-A6C34878D82A}">
-                    <a16:rowId xmlns:a16="http://schemas.microsoft.com/office/drawing/2014/main" xmlns="" val="2747170579"/>
+                    <a16:rowId xmlns="" xmlns:a16="http://schemas.microsoft.com/office/drawing/2014/main" val="2747170579"/>
                   </a:ext>
                 </a:extLst>
               </a:tr>
@@ -4193,7 +4195,7 @@
                 </a:tc>
                 <a:extLst>
                   <a:ext uri="{0D108BD9-81ED-4DB2-BD59-A6C34878D82A}">
-                    <a16:rowId xmlns:a16="http://schemas.microsoft.com/office/drawing/2014/main" xmlns="" val="1021497715"/>
+                    <a16:rowId xmlns="" xmlns:a16="http://schemas.microsoft.com/office/drawing/2014/main" val="1021497715"/>
                   </a:ext>
                 </a:extLst>
               </a:tr>
@@ -4246,7 +4248,7 @@
                 </a:tc>
                 <a:extLst>
                   <a:ext uri="{0D108BD9-81ED-4DB2-BD59-A6C34878D82A}">
-                    <a16:rowId xmlns:a16="http://schemas.microsoft.com/office/drawing/2014/main" xmlns="" val="1103180393"/>
+                    <a16:rowId xmlns="" xmlns:a16="http://schemas.microsoft.com/office/drawing/2014/main" val="1103180393"/>
                   </a:ext>
                 </a:extLst>
               </a:tr>
@@ -4299,7 +4301,7 @@
                 </a:tc>
                 <a:extLst>
                   <a:ext uri="{0D108BD9-81ED-4DB2-BD59-A6C34878D82A}">
-                    <a16:rowId xmlns:a16="http://schemas.microsoft.com/office/drawing/2014/main" xmlns="" val="3472329002"/>
+                    <a16:rowId xmlns="" xmlns:a16="http://schemas.microsoft.com/office/drawing/2014/main" val="3472329002"/>
                   </a:ext>
                 </a:extLst>
               </a:tr>
@@ -4352,7 +4354,7 @@
                 </a:tc>
                 <a:extLst>
                   <a:ext uri="{0D108BD9-81ED-4DB2-BD59-A6C34878D82A}">
-                    <a16:rowId xmlns:a16="http://schemas.microsoft.com/office/drawing/2014/main" xmlns="" val="96515116"/>
+                    <a16:rowId xmlns="" xmlns:a16="http://schemas.microsoft.com/office/drawing/2014/main" val="96515116"/>
                   </a:ext>
                 </a:extLst>
               </a:tr>
@@ -4405,7 +4407,7 @@
                 </a:tc>
                 <a:extLst>
                   <a:ext uri="{0D108BD9-81ED-4DB2-BD59-A6C34878D82A}">
-                    <a16:rowId xmlns:a16="http://schemas.microsoft.com/office/drawing/2014/main" xmlns="" val="1375975097"/>
+                    <a16:rowId xmlns="" xmlns:a16="http://schemas.microsoft.com/office/drawing/2014/main" val="1375975097"/>
                   </a:ext>
                 </a:extLst>
               </a:tr>
@@ -4458,7 +4460,7 @@
                 </a:tc>
                 <a:extLst>
                   <a:ext uri="{0D108BD9-81ED-4DB2-BD59-A6C34878D82A}">
-                    <a16:rowId xmlns:a16="http://schemas.microsoft.com/office/drawing/2014/main" xmlns="" val="1362266621"/>
+                    <a16:rowId xmlns="" xmlns:a16="http://schemas.microsoft.com/office/drawing/2014/main" val="1362266621"/>
                   </a:ext>
                 </a:extLst>
               </a:tr>
@@ -4511,7 +4513,7 @@
                 </a:tc>
                 <a:extLst>
                   <a:ext uri="{0D108BD9-81ED-4DB2-BD59-A6C34878D82A}">
-                    <a16:rowId xmlns:a16="http://schemas.microsoft.com/office/drawing/2014/main" xmlns="" val="1070044454"/>
+                    <a16:rowId xmlns="" xmlns:a16="http://schemas.microsoft.com/office/drawing/2014/main" val="1070044454"/>
                   </a:ext>
                 </a:extLst>
               </a:tr>
@@ -4524,7 +4526,7 @@
           <p:cNvPr id="35" name="TextBox 34">
             <a:extLst>
               <a:ext uri="{FF2B5EF4-FFF2-40B4-BE49-F238E27FC236}">
-                <a16:creationId xmlns:a16="http://schemas.microsoft.com/office/drawing/2014/main" xmlns="" id="{D4664896-69BC-4D0E-8797-91BA3A45AD5E}"/>
+                <a16:creationId xmlns="" xmlns:a16="http://schemas.microsoft.com/office/drawing/2014/main" id="{D4664896-69BC-4D0E-8797-91BA3A45AD5E}"/>
               </a:ext>
             </a:extLst>
           </p:cNvPr>
@@ -4571,7 +4573,7 @@
           <p:cNvPr id="36" name="TextBox 35">
             <a:extLst>
               <a:ext uri="{FF2B5EF4-FFF2-40B4-BE49-F238E27FC236}">
-                <a16:creationId xmlns:a16="http://schemas.microsoft.com/office/drawing/2014/main" xmlns="" id="{00C91D45-886D-4770-8385-468C803CD8C1}"/>
+                <a16:creationId xmlns="" xmlns:a16="http://schemas.microsoft.com/office/drawing/2014/main" id="{00C91D45-886D-4770-8385-468C803CD8C1}"/>
               </a:ext>
             </a:extLst>
           </p:cNvPr>
@@ -4604,7 +4606,7 @@
     </p:spTree>
     <p:extLst>
       <p:ext uri="{BB962C8B-B14F-4D97-AF65-F5344CB8AC3E}">
-        <p14:creationId xmlns:p14="http://schemas.microsoft.com/office/powerpoint/2010/main" xmlns="" val="2571629328"/>
+        <p14:creationId xmlns="" xmlns:p14="http://schemas.microsoft.com/office/powerpoint/2010/main" val="2571629328"/>
       </p:ext>
     </p:extLst>
   </p:cSld>
@@ -4636,7 +4638,7 @@
           <p:cNvPr id="4" name="Picture 3">
             <a:extLst>
               <a:ext uri="{FF2B5EF4-FFF2-40B4-BE49-F238E27FC236}">
-                <a16:creationId xmlns:a16="http://schemas.microsoft.com/office/drawing/2014/main" xmlns="" id="{B9AA8C4F-785C-429C-BA93-48E5ECE1CABA}"/>
+                <a16:creationId xmlns="" xmlns:a16="http://schemas.microsoft.com/office/drawing/2014/main" id="{B9AA8C4F-785C-429C-BA93-48E5ECE1CABA}"/>
               </a:ext>
             </a:extLst>
           </p:cNvPr>
@@ -4665,7 +4667,7 @@
           <p:cNvPr id="5" name="TextBox 4">
             <a:extLst>
               <a:ext uri="{FF2B5EF4-FFF2-40B4-BE49-F238E27FC236}">
-                <a16:creationId xmlns:a16="http://schemas.microsoft.com/office/drawing/2014/main" xmlns="" id="{1A15787A-1F2A-4909-A88F-A58B5F6014EC}"/>
+                <a16:creationId xmlns="" xmlns:a16="http://schemas.microsoft.com/office/drawing/2014/main" id="{1A15787A-1F2A-4909-A88F-A58B5F6014EC}"/>
               </a:ext>
             </a:extLst>
           </p:cNvPr>
@@ -4704,7 +4706,7 @@
           <p:cNvPr id="7" name="Straight Arrow Connector 6">
             <a:extLst>
               <a:ext uri="{FF2B5EF4-FFF2-40B4-BE49-F238E27FC236}">
-                <a16:creationId xmlns:a16="http://schemas.microsoft.com/office/drawing/2014/main" xmlns="" id="{43D82A80-2F98-4204-B58E-EB49BB41D3C5}"/>
+                <a16:creationId xmlns="" xmlns:a16="http://schemas.microsoft.com/office/drawing/2014/main" id="{43D82A80-2F98-4204-B58E-EB49BB41D3C5}"/>
               </a:ext>
             </a:extLst>
           </p:cNvPr>
@@ -4745,7 +4747,7 @@
           <p:cNvPr id="9" name="Straight Arrow Connector 8">
             <a:extLst>
               <a:ext uri="{FF2B5EF4-FFF2-40B4-BE49-F238E27FC236}">
-                <a16:creationId xmlns:a16="http://schemas.microsoft.com/office/drawing/2014/main" xmlns="" id="{2D27D6FE-29A9-420B-AB56-4AE9822D9B55}"/>
+                <a16:creationId xmlns="" xmlns:a16="http://schemas.microsoft.com/office/drawing/2014/main" id="{2D27D6FE-29A9-420B-AB56-4AE9822D9B55}"/>
               </a:ext>
             </a:extLst>
           </p:cNvPr>
@@ -4786,7 +4788,7 @@
           <p:cNvPr id="12" name="Straight Arrow Connector 11">
             <a:extLst>
               <a:ext uri="{FF2B5EF4-FFF2-40B4-BE49-F238E27FC236}">
-                <a16:creationId xmlns:a16="http://schemas.microsoft.com/office/drawing/2014/main" xmlns="" id="{BC5BD572-37D1-4C1B-AFAC-577E02232C90}"/>
+                <a16:creationId xmlns="" xmlns:a16="http://schemas.microsoft.com/office/drawing/2014/main" id="{BC5BD572-37D1-4C1B-AFAC-577E02232C90}"/>
               </a:ext>
             </a:extLst>
           </p:cNvPr>
@@ -4827,7 +4829,7 @@
           <p:cNvPr id="15" name="Straight Arrow Connector 14">
             <a:extLst>
               <a:ext uri="{FF2B5EF4-FFF2-40B4-BE49-F238E27FC236}">
-                <a16:creationId xmlns:a16="http://schemas.microsoft.com/office/drawing/2014/main" xmlns="" id="{9E9E969B-C9EA-43EA-9DFA-42D4CF60D5B3}"/>
+                <a16:creationId xmlns="" xmlns:a16="http://schemas.microsoft.com/office/drawing/2014/main" id="{9E9E969B-C9EA-43EA-9DFA-42D4CF60D5B3}"/>
               </a:ext>
             </a:extLst>
           </p:cNvPr>
@@ -4868,7 +4870,7 @@
           <p:cNvPr id="17" name="Straight Arrow Connector 16">
             <a:extLst>
               <a:ext uri="{FF2B5EF4-FFF2-40B4-BE49-F238E27FC236}">
-                <a16:creationId xmlns:a16="http://schemas.microsoft.com/office/drawing/2014/main" xmlns="" id="{6E88EA07-CCB2-4DE6-87D2-1377A39D4AF2}"/>
+                <a16:creationId xmlns="" xmlns:a16="http://schemas.microsoft.com/office/drawing/2014/main" id="{6E88EA07-CCB2-4DE6-87D2-1377A39D4AF2}"/>
               </a:ext>
             </a:extLst>
           </p:cNvPr>
@@ -4909,7 +4911,7 @@
           <p:cNvPr id="20" name="TextBox 19">
             <a:extLst>
               <a:ext uri="{FF2B5EF4-FFF2-40B4-BE49-F238E27FC236}">
-                <a16:creationId xmlns:a16="http://schemas.microsoft.com/office/drawing/2014/main" xmlns="" id="{978F5201-8D96-42D8-B697-537D5DB0E9E1}"/>
+                <a16:creationId xmlns="" xmlns:a16="http://schemas.microsoft.com/office/drawing/2014/main" id="{978F5201-8D96-42D8-B697-537D5DB0E9E1}"/>
               </a:ext>
             </a:extLst>
           </p:cNvPr>
@@ -4944,7 +4946,7 @@
           <p:cNvPr id="22" name="TextBox 21">
             <a:extLst>
               <a:ext uri="{FF2B5EF4-FFF2-40B4-BE49-F238E27FC236}">
-                <a16:creationId xmlns:a16="http://schemas.microsoft.com/office/drawing/2014/main" xmlns="" id="{6DDCB45D-5958-463D-AD04-EF10AB8F7B63}"/>
+                <a16:creationId xmlns="" xmlns:a16="http://schemas.microsoft.com/office/drawing/2014/main" id="{6DDCB45D-5958-463D-AD04-EF10AB8F7B63}"/>
               </a:ext>
             </a:extLst>
           </p:cNvPr>
@@ -4979,7 +4981,7 @@
           <p:cNvPr id="23" name="TextBox 22">
             <a:extLst>
               <a:ext uri="{FF2B5EF4-FFF2-40B4-BE49-F238E27FC236}">
-                <a16:creationId xmlns:a16="http://schemas.microsoft.com/office/drawing/2014/main" xmlns="" id="{7866F6D7-6BD0-4347-B219-67DECB38B554}"/>
+                <a16:creationId xmlns="" xmlns:a16="http://schemas.microsoft.com/office/drawing/2014/main" id="{7866F6D7-6BD0-4347-B219-67DECB38B554}"/>
               </a:ext>
             </a:extLst>
           </p:cNvPr>
@@ -5016,7 +5018,7 @@
     </p:spTree>
     <p:extLst>
       <p:ext uri="{BB962C8B-B14F-4D97-AF65-F5344CB8AC3E}">
-        <p14:creationId xmlns:p14="http://schemas.microsoft.com/office/powerpoint/2010/main" xmlns="" val="1441441428"/>
+        <p14:creationId xmlns="" xmlns:p14="http://schemas.microsoft.com/office/powerpoint/2010/main" val="1441441428"/>
       </p:ext>
     </p:extLst>
   </p:cSld>
@@ -5048,7 +5050,7 @@
           <p:cNvPr id="2" name="Title 1">
             <a:extLst>
               <a:ext uri="{FF2B5EF4-FFF2-40B4-BE49-F238E27FC236}">
-                <a16:creationId xmlns:a16="http://schemas.microsoft.com/office/drawing/2014/main" xmlns="" id="{B19683D0-1CA8-4529-A2B0-443AAB727B48}"/>
+                <a16:creationId xmlns="" xmlns:a16="http://schemas.microsoft.com/office/drawing/2014/main" id="{B19683D0-1CA8-4529-A2B0-443AAB727B48}"/>
               </a:ext>
             </a:extLst>
           </p:cNvPr>
@@ -5073,7 +5075,7 @@
           <p:cNvPr id="3" name="Content Placeholder 2">
             <a:extLst>
               <a:ext uri="{FF2B5EF4-FFF2-40B4-BE49-F238E27FC236}">
-                <a16:creationId xmlns:a16="http://schemas.microsoft.com/office/drawing/2014/main" xmlns="" id="{842448CD-68D1-4DB4-9330-31425027CFBA}"/>
+                <a16:creationId xmlns="" xmlns:a16="http://schemas.microsoft.com/office/drawing/2014/main" id="{842448CD-68D1-4DB4-9330-31425027CFBA}"/>
               </a:ext>
             </a:extLst>
           </p:cNvPr>
@@ -5098,7 +5100,7 @@
           <p:cNvPr id="4" name="Picture 3">
             <a:extLst>
               <a:ext uri="{FF2B5EF4-FFF2-40B4-BE49-F238E27FC236}">
-                <a16:creationId xmlns:a16="http://schemas.microsoft.com/office/drawing/2014/main" xmlns="" id="{79683984-6DE1-4928-855D-1D83CE4D3FAC}"/>
+                <a16:creationId xmlns="" xmlns:a16="http://schemas.microsoft.com/office/drawing/2014/main" id="{79683984-6DE1-4928-855D-1D83CE4D3FAC}"/>
               </a:ext>
             </a:extLst>
           </p:cNvPr>
@@ -5127,7 +5129,7 @@
           <p:cNvPr id="6" name="Straight Arrow Connector 5">
             <a:extLst>
               <a:ext uri="{FF2B5EF4-FFF2-40B4-BE49-F238E27FC236}">
-                <a16:creationId xmlns:a16="http://schemas.microsoft.com/office/drawing/2014/main" xmlns="" id="{278A8F1F-567E-4254-A0BE-9F782EE9987E}"/>
+                <a16:creationId xmlns="" xmlns:a16="http://schemas.microsoft.com/office/drawing/2014/main" id="{278A8F1F-567E-4254-A0BE-9F782EE9987E}"/>
               </a:ext>
             </a:extLst>
           </p:cNvPr>
@@ -5169,7 +5171,7 @@
           <p:cNvPr id="7" name="TextBox 6">
             <a:extLst>
               <a:ext uri="{FF2B5EF4-FFF2-40B4-BE49-F238E27FC236}">
-                <a16:creationId xmlns:a16="http://schemas.microsoft.com/office/drawing/2014/main" xmlns="" id="{81239A75-F7B2-4E7B-892E-BBC9D48EF9A1}"/>
+                <a16:creationId xmlns="" xmlns:a16="http://schemas.microsoft.com/office/drawing/2014/main" id="{81239A75-F7B2-4E7B-892E-BBC9D48EF9A1}"/>
               </a:ext>
             </a:extLst>
           </p:cNvPr>
@@ -5202,7 +5204,7 @@
     </p:spTree>
     <p:extLst>
       <p:ext uri="{BB962C8B-B14F-4D97-AF65-F5344CB8AC3E}">
-        <p14:creationId xmlns:p14="http://schemas.microsoft.com/office/powerpoint/2010/main" xmlns="" val="3179478293"/>
+        <p14:creationId xmlns="" xmlns:p14="http://schemas.microsoft.com/office/powerpoint/2010/main" val="3179478293"/>
       </p:ext>
     </p:extLst>
   </p:cSld>
@@ -5442,6 +5444,536 @@
             <a:r>
               <a:rPr lang="en-US" altLang="zh-CN" dirty="0" smtClean="0"/>
               <a:t>Is the difference significant?</a:t>
+            </a:r>
+            <a:endParaRPr lang="zh-CN" altLang="en-US" dirty="0"/>
+          </a:p>
+        </p:txBody>
+      </p:sp>
+    </p:spTree>
+  </p:cSld>
+  <p:clrMapOvr>
+    <a:masterClrMapping/>
+  </p:clrMapOvr>
+</p:sld>
+</file>
+
+<file path=ppt/slides/slide5.xml><?xml version="1.0" encoding="utf-8"?>
+<p:sld xmlns:a="http://schemas.openxmlformats.org/drawingml/2006/main" xmlns:r="http://schemas.openxmlformats.org/officeDocument/2006/relationships" xmlns:p="http://schemas.openxmlformats.org/presentationml/2006/main">
+  <p:cSld>
+    <p:spTree>
+      <p:nvGrpSpPr>
+        <p:cNvPr id="1" name=""/>
+        <p:cNvGrpSpPr/>
+        <p:nvPr/>
+      </p:nvGrpSpPr>
+      <p:grpSpPr>
+        <a:xfrm>
+          <a:off x="0" y="0"/>
+          <a:ext cx="0" cy="0"/>
+          <a:chOff x="0" y="0"/>
+          <a:chExt cx="0" cy="0"/>
+        </a:xfrm>
+      </p:grpSpPr>
+      <p:pic>
+        <p:nvPicPr>
+          <p:cNvPr id="4" name="图片 3" descr="ukb_1kg_random10000.png"/>
+          <p:cNvPicPr>
+            <a:picLocks noChangeAspect="1"/>
+          </p:cNvPicPr>
+          <p:nvPr/>
+        </p:nvPicPr>
+        <p:blipFill>
+          <a:blip r:embed="rId2" cstate="print"/>
+          <a:stretch>
+            <a:fillRect/>
+          </a:stretch>
+        </p:blipFill>
+        <p:spPr>
+          <a:xfrm>
+            <a:off x="473223" y="1204216"/>
+            <a:ext cx="5852172" cy="4389129"/>
+          </a:xfrm>
+          <a:prstGeom prst="rect">
+            <a:avLst/>
+          </a:prstGeom>
+        </p:spPr>
+      </p:pic>
+      <p:sp>
+        <p:nvSpPr>
+          <p:cNvPr id="5" name="TextBox 4"/>
+          <p:cNvSpPr txBox="1"/>
+          <p:nvPr/>
+        </p:nvSpPr>
+        <p:spPr>
+          <a:xfrm>
+            <a:off x="1487575" y="3858843"/>
+            <a:ext cx="1236236" cy="923330"/>
+          </a:xfrm>
+          <a:prstGeom prst="rect">
+            <a:avLst/>
+          </a:prstGeom>
+          <a:noFill/>
+        </p:spPr>
+        <p:txBody>
+          <a:bodyPr wrap="none" rtlCol="0">
+            <a:spAutoFit/>
+          </a:bodyPr>
+          <a:lstStyle/>
+          <a:p>
+            <a:r>
+              <a:rPr lang="en-US" altLang="zh-CN" dirty="0" smtClean="0">
+                <a:solidFill>
+                  <a:srgbClr val="0000FF"/>
+                </a:solidFill>
+              </a:rPr>
+              <a:t>+</a:t>
+            </a:r>
+            <a:r>
+              <a:rPr lang="en-US" altLang="zh-CN" dirty="0" smtClean="0"/>
+              <a:t>: CEU (85)</a:t>
+            </a:r>
+          </a:p>
+          <a:p>
+            <a:r>
+              <a:rPr lang="en-US" altLang="zh-CN" dirty="0" smtClean="0">
+                <a:solidFill>
+                  <a:srgbClr val="00B050"/>
+                </a:solidFill>
+              </a:rPr>
+              <a:t>+</a:t>
+            </a:r>
+            <a:r>
+              <a:rPr lang="en-US" altLang="zh-CN" dirty="0" smtClean="0"/>
+              <a:t>: YRI (88)</a:t>
+            </a:r>
+          </a:p>
+          <a:p>
+            <a:r>
+              <a:rPr lang="en-US" altLang="zh-CN" dirty="0" smtClean="0">
+                <a:solidFill>
+                  <a:srgbClr val="FF0000"/>
+                </a:solidFill>
+              </a:rPr>
+              <a:t>+</a:t>
+            </a:r>
+            <a:r>
+              <a:rPr lang="en-US" altLang="zh-CN" dirty="0" smtClean="0"/>
+              <a:t>: CHB (97)</a:t>
+            </a:r>
+          </a:p>
+        </p:txBody>
+      </p:sp>
+      <p:sp>
+        <p:nvSpPr>
+          <p:cNvPr id="6" name="TextBox 5"/>
+          <p:cNvSpPr txBox="1"/>
+          <p:nvPr/>
+        </p:nvSpPr>
+        <p:spPr>
+          <a:xfrm>
+            <a:off x="473223" y="5596704"/>
+            <a:ext cx="5473614" cy="369332"/>
+          </a:xfrm>
+          <a:prstGeom prst="rect">
+            <a:avLst/>
+          </a:prstGeom>
+          <a:noFill/>
+        </p:spPr>
+        <p:txBody>
+          <a:bodyPr wrap="none" rtlCol="0">
+            <a:spAutoFit/>
+          </a:bodyPr>
+          <a:lstStyle/>
+          <a:p>
+            <a:r>
+              <a:rPr lang="en-US" altLang="zh-CN" dirty="0" smtClean="0"/>
+              <a:t>Randomly choose 5000 CEU and 500 AFR by self-report</a:t>
+            </a:r>
+            <a:endParaRPr lang="zh-CN" altLang="en-US" dirty="0"/>
+          </a:p>
+        </p:txBody>
+      </p:sp>
+      <p:sp>
+        <p:nvSpPr>
+          <p:cNvPr id="7" name="TextBox 6"/>
+          <p:cNvSpPr txBox="1"/>
+          <p:nvPr/>
+        </p:nvSpPr>
+        <p:spPr>
+          <a:xfrm>
+            <a:off x="473223" y="1132208"/>
+            <a:ext cx="1656184" cy="369332"/>
+          </a:xfrm>
+          <a:prstGeom prst="rect">
+            <a:avLst/>
+          </a:prstGeom>
+          <a:noFill/>
+        </p:spPr>
+        <p:txBody>
+          <a:bodyPr wrap="square" rtlCol="0">
+            <a:spAutoFit/>
+          </a:bodyPr>
+          <a:lstStyle/>
+          <a:p>
+            <a:r>
+              <a:rPr lang="en-US" altLang="zh-CN" dirty="0" smtClean="0"/>
+              <a:t>10000 SNPs</a:t>
+            </a:r>
+            <a:endParaRPr lang="zh-CN" altLang="en-US" dirty="0"/>
+          </a:p>
+        </p:txBody>
+      </p:sp>
+      <p:sp>
+        <p:nvSpPr>
+          <p:cNvPr id="8" name="TextBox 7"/>
+          <p:cNvSpPr txBox="1"/>
+          <p:nvPr/>
+        </p:nvSpPr>
+        <p:spPr>
+          <a:xfrm>
+            <a:off x="623285" y="201541"/>
+            <a:ext cx="3382657" cy="369332"/>
+          </a:xfrm>
+          <a:prstGeom prst="rect">
+            <a:avLst/>
+          </a:prstGeom>
+          <a:noFill/>
+        </p:spPr>
+        <p:txBody>
+          <a:bodyPr wrap="none" rtlCol="0">
+            <a:spAutoFit/>
+          </a:bodyPr>
+          <a:lstStyle/>
+          <a:p>
+            <a:r>
+              <a:rPr lang="en-US" altLang="zh-CN" dirty="0" smtClean="0"/>
+              <a:t>Using genetic data to identify race</a:t>
+            </a:r>
+            <a:endParaRPr lang="zh-CN" altLang="en-US" dirty="0"/>
+          </a:p>
+        </p:txBody>
+      </p:sp>
+      <p:pic>
+        <p:nvPicPr>
+          <p:cNvPr id="9" name="图片 8" descr="PCA_tested..png"/>
+          <p:cNvPicPr>
+            <a:picLocks noChangeAspect="1"/>
+          </p:cNvPicPr>
+          <p:nvPr/>
+        </p:nvPicPr>
+        <p:blipFill>
+          <a:blip r:embed="rId3" cstate="print"/>
+          <a:stretch>
+            <a:fillRect/>
+          </a:stretch>
+        </p:blipFill>
+        <p:spPr>
+          <a:xfrm>
+            <a:off x="6313091" y="1407314"/>
+            <a:ext cx="5878909" cy="4409182"/>
+          </a:xfrm>
+          <a:prstGeom prst="rect">
+            <a:avLst/>
+          </a:prstGeom>
+        </p:spPr>
+      </p:pic>
+    </p:spTree>
+  </p:cSld>
+  <p:clrMapOvr>
+    <a:masterClrMapping/>
+  </p:clrMapOvr>
+</p:sld>
+</file>
+
+<file path=ppt/slides/slide6.xml><?xml version="1.0" encoding="utf-8"?>
+<p:sld xmlns:a="http://schemas.openxmlformats.org/drawingml/2006/main" xmlns:r="http://schemas.openxmlformats.org/officeDocument/2006/relationships" xmlns:p="http://schemas.openxmlformats.org/presentationml/2006/main">
+  <p:cSld>
+    <p:spTree>
+      <p:nvGrpSpPr>
+        <p:cNvPr id="1" name=""/>
+        <p:cNvGrpSpPr/>
+        <p:nvPr/>
+      </p:nvGrpSpPr>
+      <p:grpSpPr>
+        <a:xfrm>
+          <a:off x="0" y="0"/>
+          <a:ext cx="0" cy="0"/>
+          <a:chOff x="0" y="0"/>
+          <a:chExt cx="0" cy="0"/>
+        </a:xfrm>
+      </p:grpSpPr>
+      <p:sp>
+        <p:nvSpPr>
+          <p:cNvPr id="4" name="矩形 3"/>
+          <p:cNvSpPr/>
+          <p:nvPr/>
+        </p:nvSpPr>
+        <p:spPr>
+          <a:xfrm>
+            <a:off x="2626256" y="1265730"/>
+            <a:ext cx="7316444" cy="4832092"/>
+          </a:xfrm>
+          <a:prstGeom prst="rect">
+            <a:avLst/>
+          </a:prstGeom>
+        </p:spPr>
+        <p:txBody>
+          <a:bodyPr wrap="square">
+            <a:spAutoFit/>
+          </a:bodyPr>
+          <a:lstStyle/>
+          <a:p>
+            <a:r>
+              <a:rPr lang="en-US" altLang="zh-CN" sz="1100" dirty="0" smtClean="0"/>
+              <a:t>Optimization terminated successfully.</a:t>
+            </a:r>
+          </a:p>
+          <a:p>
+            <a:r>
+              <a:rPr lang="en-US" altLang="zh-CN" sz="1100" dirty="0" smtClean="0"/>
+              <a:t>         Current function value: 0.367092</a:t>
+            </a:r>
+          </a:p>
+          <a:p>
+            <a:r>
+              <a:rPr lang="en-US" altLang="zh-CN" sz="1100" dirty="0" smtClean="0"/>
+              <a:t>         Iterations 8</a:t>
+            </a:r>
+          </a:p>
+          <a:p>
+            <a:r>
+              <a:rPr lang="en-US" altLang="zh-CN" sz="1100" dirty="0" smtClean="0"/>
+              <a:t>                           </a:t>
+            </a:r>
+            <a:r>
+              <a:rPr lang="en-US" altLang="zh-CN" sz="1100" dirty="0" err="1" smtClean="0"/>
+              <a:t>Logit</a:t>
+            </a:r>
+            <a:r>
+              <a:rPr lang="en-US" altLang="zh-CN" sz="1100" dirty="0" smtClean="0"/>
+              <a:t> Regression Results                           </a:t>
+            </a:r>
+          </a:p>
+          <a:p>
+            <a:r>
+              <a:rPr lang="en-US" altLang="zh-CN" sz="1100" dirty="0" smtClean="0"/>
+              <a:t>==============================================================================</a:t>
+            </a:r>
+          </a:p>
+          <a:p>
+            <a:r>
+              <a:rPr lang="en-US" altLang="zh-CN" sz="1100" dirty="0" smtClean="0"/>
+              <a:t>Dep. Variable:           </a:t>
+            </a:r>
+            <a:r>
+              <a:rPr lang="en-US" altLang="zh-CN" sz="1100" dirty="0" err="1" smtClean="0"/>
+              <a:t>final_result</a:t>
+            </a:r>
+            <a:r>
+              <a:rPr lang="en-US" altLang="zh-CN" sz="1100" dirty="0" smtClean="0"/>
+              <a:t>   No. Observations:                13034</a:t>
+            </a:r>
+          </a:p>
+          <a:p>
+            <a:r>
+              <a:rPr lang="en-US" altLang="zh-CN" sz="1100" dirty="0" smtClean="0"/>
+              <a:t>Model:                          </a:t>
+            </a:r>
+            <a:r>
+              <a:rPr lang="en-US" altLang="zh-CN" sz="1100" dirty="0" err="1" smtClean="0"/>
+              <a:t>Logit</a:t>
+            </a:r>
+            <a:r>
+              <a:rPr lang="en-US" altLang="zh-CN" sz="1100" dirty="0" smtClean="0"/>
+              <a:t>   </a:t>
+            </a:r>
+            <a:r>
+              <a:rPr lang="en-US" altLang="zh-CN" sz="1100" dirty="0" err="1" smtClean="0"/>
+              <a:t>Df</a:t>
+            </a:r>
+            <a:r>
+              <a:rPr lang="en-US" altLang="zh-CN" sz="1100" dirty="0" smtClean="0"/>
+              <a:t> Residuals:                    13028</a:t>
+            </a:r>
+          </a:p>
+          <a:p>
+            <a:r>
+              <a:rPr lang="en-US" altLang="zh-CN" sz="1100" dirty="0" smtClean="0"/>
+              <a:t>Method:                           MLE   </a:t>
+            </a:r>
+            <a:r>
+              <a:rPr lang="en-US" altLang="zh-CN" sz="1100" dirty="0" err="1" smtClean="0"/>
+              <a:t>Df</a:t>
+            </a:r>
+            <a:r>
+              <a:rPr lang="en-US" altLang="zh-CN" sz="1100" dirty="0" smtClean="0"/>
+              <a:t> Model:                            5</a:t>
+            </a:r>
+          </a:p>
+          <a:p>
+            <a:r>
+              <a:rPr lang="en-US" altLang="zh-CN" sz="1100" dirty="0" smtClean="0"/>
+              <a:t>Date:                Wed, 16 Sep 2020   Pseudo R-</a:t>
+            </a:r>
+            <a:r>
+              <a:rPr lang="en-US" altLang="zh-CN" sz="1100" dirty="0" err="1" smtClean="0"/>
+              <a:t>squ</a:t>
+            </a:r>
+            <a:r>
+              <a:rPr lang="en-US" altLang="zh-CN" sz="1100" dirty="0" smtClean="0"/>
+              <a:t>.:                0.006936</a:t>
+            </a:r>
+          </a:p>
+          <a:p>
+            <a:r>
+              <a:rPr lang="en-US" altLang="zh-CN" sz="1100" dirty="0" smtClean="0"/>
+              <a:t>Time:                        21:20:04   Log-Likelihood:                -4784.7</a:t>
+            </a:r>
+          </a:p>
+          <a:p>
+            <a:r>
+              <a:rPr lang="en-US" altLang="zh-CN" sz="1100" dirty="0" smtClean="0"/>
+              <a:t>converged:                       True   LL-Null:                       -4818.1</a:t>
+            </a:r>
+          </a:p>
+          <a:p>
+            <a:r>
+              <a:rPr lang="en-US" altLang="zh-CN" sz="1100" dirty="0" smtClean="0"/>
+              <a:t>                                        LLR p-value:                 4.663e-13</a:t>
+            </a:r>
+          </a:p>
+          <a:p>
+            <a:r>
+              <a:rPr lang="en-US" altLang="zh-CN" sz="1100" dirty="0" smtClean="0"/>
+              <a:t>==============================================================================</a:t>
+            </a:r>
+          </a:p>
+          <a:p>
+            <a:r>
+              <a:rPr lang="en-US" altLang="zh-CN" sz="1100" dirty="0" smtClean="0"/>
+              <a:t>                 </a:t>
+            </a:r>
+            <a:r>
+              <a:rPr lang="en-US" altLang="zh-CN" sz="1100" dirty="0" err="1" smtClean="0"/>
+              <a:t>coef</a:t>
+            </a:r>
+            <a:r>
+              <a:rPr lang="en-US" altLang="zh-CN" sz="1100" dirty="0" smtClean="0"/>
+              <a:t>    std err          z      P&gt;|z|      [0.025      0.975]</a:t>
+            </a:r>
+          </a:p>
+          <a:p>
+            <a:r>
+              <a:rPr lang="en-US" altLang="zh-CN" sz="1100" dirty="0" smtClean="0"/>
+              <a:t>------------------------------------------------------------------------------</a:t>
+            </a:r>
+          </a:p>
+          <a:p>
+            <a:r>
+              <a:rPr lang="en-US" altLang="zh-CN" sz="1100" dirty="0" smtClean="0"/>
+              <a:t>PC1          107.8168     18.285      5.896      0.000      71.979     143.655</a:t>
+            </a:r>
+          </a:p>
+          <a:p>
+            <a:r>
+              <a:rPr lang="en-US" altLang="zh-CN" sz="1100" dirty="0" smtClean="0"/>
+              <a:t>PC2          -54.0916     21.901     -2.470      0.014     -97.016     -11.167</a:t>
+            </a:r>
+          </a:p>
+          <a:p>
+            <a:r>
+              <a:rPr lang="en-US" altLang="zh-CN" sz="1100" dirty="0" smtClean="0"/>
+              <a:t>PC3            8.9904     37.868      0.237      0.812     -65.229      83.209</a:t>
+            </a:r>
+          </a:p>
+          <a:p>
+            <a:r>
+              <a:rPr lang="en-US" altLang="zh-CN" sz="1100" dirty="0" smtClean="0"/>
+              <a:t>PC4          -67.4371     95.996     -0.703      0.482    -255.585     120.711</a:t>
+            </a:r>
+          </a:p>
+          <a:p>
+            <a:r>
+              <a:rPr lang="en-US" altLang="zh-CN" sz="1100" dirty="0" smtClean="0"/>
+              <a:t>PC5           -0.2066     18.470     -0.011      0.991     -36.407      35.993</a:t>
+            </a:r>
+          </a:p>
+          <a:p>
+            <a:r>
+              <a:rPr lang="en-US" altLang="zh-CN" sz="1100" dirty="0" smtClean="0"/>
+              <a:t>intercept     -2.0031      0.028    -70.996      0.000      -2.058      -1.948</a:t>
+            </a:r>
+          </a:p>
+          <a:p>
+            <a:r>
+              <a:rPr lang="en-US" altLang="zh-CN" sz="1100" dirty="0" smtClean="0"/>
+              <a:t>==============================================================================</a:t>
+            </a:r>
+          </a:p>
+          <a:p>
+            <a:r>
+              <a:rPr lang="en-US" altLang="zh-CN" sz="1100" dirty="0" smtClean="0"/>
+              <a:t>PC1	 p value is: 3.714282582341431e-09</a:t>
+            </a:r>
+          </a:p>
+          <a:p>
+            <a:r>
+              <a:rPr lang="en-US" altLang="zh-CN" sz="1100" dirty="0" smtClean="0"/>
+              <a:t>PC2	 p value is: 0.01351690692258477</a:t>
+            </a:r>
+          </a:p>
+          <a:p>
+            <a:r>
+              <a:rPr lang="en-US" altLang="zh-CN" sz="1100" dirty="0" smtClean="0"/>
+              <a:t>PC3	 p value is: 0.8123327081630767</a:t>
+            </a:r>
+          </a:p>
+          <a:p>
+            <a:r>
+              <a:rPr lang="en-US" altLang="zh-CN" sz="1100" dirty="0" smtClean="0"/>
+              <a:t>PC4	 p value is: 0.482366276197408</a:t>
+            </a:r>
+          </a:p>
+          <a:p>
+            <a:r>
+              <a:rPr lang="en-US" altLang="zh-CN" sz="1100" dirty="0" smtClean="0"/>
+              <a:t>PC5	 p value is: 0.9910749259003474</a:t>
+            </a:r>
+          </a:p>
+          <a:p>
+            <a:r>
+              <a:rPr lang="en-US" altLang="zh-CN" sz="1100" dirty="0" smtClean="0"/>
+              <a:t>intercept	 p value is: 0.0</a:t>
+            </a:r>
+            <a:endParaRPr lang="zh-CN" altLang="en-US" sz="1100" dirty="0"/>
+          </a:p>
+        </p:txBody>
+      </p:sp>
+      <p:sp>
+        <p:nvSpPr>
+          <p:cNvPr id="5" name="TextBox 4"/>
+          <p:cNvSpPr txBox="1"/>
+          <p:nvPr/>
+        </p:nvSpPr>
+        <p:spPr>
+          <a:xfrm>
+            <a:off x="4377923" y="496389"/>
+            <a:ext cx="3353226" cy="369332"/>
+          </a:xfrm>
+          <a:prstGeom prst="rect">
+            <a:avLst/>
+          </a:prstGeom>
+          <a:noFill/>
+        </p:spPr>
+        <p:txBody>
+          <a:bodyPr wrap="none" rtlCol="0">
+            <a:spAutoFit/>
+          </a:bodyPr>
+          <a:lstStyle/>
+          <a:p>
+            <a:r>
+              <a:rPr lang="en-US" altLang="zh-CN" dirty="0" smtClean="0"/>
+              <a:t>Multiple logistic regression model</a:t>
             </a:r>
             <a:endParaRPr lang="zh-CN" altLang="en-US" dirty="0"/>
           </a:p>
@@ -5744,7 +6276,7 @@
   <a:extraClrSchemeLst/>
   <a:extLst>
     <a:ext uri="{05A4C25C-085E-4340-85A3-A5531E510DB2}">
-      <thm15:themeFamily xmlns:thm15="http://schemas.microsoft.com/office/thememl/2012/main" xmlns="" name="Office Theme" id="{62F939B6-93AF-4DB8-9C6B-D6C7DFDC589F}" vid="{4A3C46E8-61CC-4603-A589-7422A47A8E4A}"/>
+      <thm15:themeFamily xmlns="" xmlns:thm15="http://schemas.microsoft.com/office/thememl/2012/main" name="Office Theme" id="{62F939B6-93AF-4DB8-9C6B-D6C7DFDC589F}" vid="{4A3C46E8-61CC-4603-A589-7422A47A8E4A}"/>
     </a:ext>
   </a:extLst>
 </a:theme>

</xml_diff>